<commit_message>
Updated developer guide with new UI Class Diagram
</commit_message>
<xml_diff>
--- a/docs/diagrams/UiComponentClassDiagram.pptx
+++ b/docs/diagrams/UiComponentClassDiagram.pptx
@@ -208,7 +208,7 @@
           <a:p>
             <a:fld id="{F5CC4B3F-88C1-4FFA-B1B6-F41C21DC6924}" type="datetimeFigureOut">
               <a:rPr lang="en-US" smtClean="0"/>
-              <a:t>1/7/2017</a:t>
+              <a:t>7/9/2017</a:t>
             </a:fld>
             <a:endParaRPr lang="en-US"/>
           </a:p>
@@ -654,7 +654,7 @@
           <a:p>
             <a:fld id="{78C97017-6FC3-485B-9764-EAC9E56C1D49}" type="datetimeFigureOut">
               <a:rPr lang="en-US" smtClean="0"/>
-              <a:t>1/7/2017</a:t>
+              <a:t>7/9/2017</a:t>
             </a:fld>
             <a:endParaRPr lang="en-US"/>
           </a:p>
@@ -822,7 +822,7 @@
           <a:p>
             <a:fld id="{78C97017-6FC3-485B-9764-EAC9E56C1D49}" type="datetimeFigureOut">
               <a:rPr lang="en-US" smtClean="0"/>
-              <a:t>1/7/2017</a:t>
+              <a:t>7/9/2017</a:t>
             </a:fld>
             <a:endParaRPr lang="en-US"/>
           </a:p>
@@ -1000,7 +1000,7 @@
           <a:p>
             <a:fld id="{78C97017-6FC3-485B-9764-EAC9E56C1D49}" type="datetimeFigureOut">
               <a:rPr lang="en-US" smtClean="0"/>
-              <a:t>1/7/2017</a:t>
+              <a:t>7/9/2017</a:t>
             </a:fld>
             <a:endParaRPr lang="en-US"/>
           </a:p>
@@ -1168,7 +1168,7 @@
           <a:p>
             <a:fld id="{78C97017-6FC3-485B-9764-EAC9E56C1D49}" type="datetimeFigureOut">
               <a:rPr lang="en-US" smtClean="0"/>
-              <a:t>1/7/2017</a:t>
+              <a:t>7/9/2017</a:t>
             </a:fld>
             <a:endParaRPr lang="en-US"/>
           </a:p>
@@ -1413,7 +1413,7 @@
           <a:p>
             <a:fld id="{78C97017-6FC3-485B-9764-EAC9E56C1D49}" type="datetimeFigureOut">
               <a:rPr lang="en-US" smtClean="0"/>
-              <a:t>1/7/2017</a:t>
+              <a:t>7/9/2017</a:t>
             </a:fld>
             <a:endParaRPr lang="en-US"/>
           </a:p>
@@ -1698,7 +1698,7 @@
           <a:p>
             <a:fld id="{78C97017-6FC3-485B-9764-EAC9E56C1D49}" type="datetimeFigureOut">
               <a:rPr lang="en-US" smtClean="0"/>
-              <a:t>1/7/2017</a:t>
+              <a:t>7/9/2017</a:t>
             </a:fld>
             <a:endParaRPr lang="en-US"/>
           </a:p>
@@ -2117,7 +2117,7 @@
           <a:p>
             <a:fld id="{78C97017-6FC3-485B-9764-EAC9E56C1D49}" type="datetimeFigureOut">
               <a:rPr lang="en-US" smtClean="0"/>
-              <a:t>1/7/2017</a:t>
+              <a:t>7/9/2017</a:t>
             </a:fld>
             <a:endParaRPr lang="en-US"/>
           </a:p>
@@ -2234,7 +2234,7 @@
           <a:p>
             <a:fld id="{78C97017-6FC3-485B-9764-EAC9E56C1D49}" type="datetimeFigureOut">
               <a:rPr lang="en-US" smtClean="0"/>
-              <a:t>1/7/2017</a:t>
+              <a:t>7/9/2017</a:t>
             </a:fld>
             <a:endParaRPr lang="en-US"/>
           </a:p>
@@ -2329,7 +2329,7 @@
           <a:p>
             <a:fld id="{78C97017-6FC3-485B-9764-EAC9E56C1D49}" type="datetimeFigureOut">
               <a:rPr lang="en-US" smtClean="0"/>
-              <a:t>1/7/2017</a:t>
+              <a:t>7/9/2017</a:t>
             </a:fld>
             <a:endParaRPr lang="en-US"/>
           </a:p>
@@ -2604,7 +2604,7 @@
           <a:p>
             <a:fld id="{78C97017-6FC3-485B-9764-EAC9E56C1D49}" type="datetimeFigureOut">
               <a:rPr lang="en-US" smtClean="0"/>
-              <a:t>1/7/2017</a:t>
+              <a:t>7/9/2017</a:t>
             </a:fld>
             <a:endParaRPr lang="en-US"/>
           </a:p>
@@ -2856,7 +2856,7 @@
           <a:p>
             <a:fld id="{78C97017-6FC3-485B-9764-EAC9E56C1D49}" type="datetimeFigureOut">
               <a:rPr lang="en-US" smtClean="0"/>
-              <a:t>1/7/2017</a:t>
+              <a:t>7/9/2017</a:t>
             </a:fld>
             <a:endParaRPr lang="en-US"/>
           </a:p>
@@ -3067,7 +3067,7 @@
           <a:p>
             <a:fld id="{78C97017-6FC3-485B-9764-EAC9E56C1D49}" type="datetimeFigureOut">
               <a:rPr lang="en-US" smtClean="0"/>
-              <a:t>1/7/2017</a:t>
+              <a:t>7/9/2017</a:t>
             </a:fld>
             <a:endParaRPr lang="en-US"/>
           </a:p>
@@ -3451,7 +3451,7 @@
         <p:spPr>
           <a:xfrm>
             <a:off x="1217465" y="1447800"/>
-            <a:ext cx="4917083" cy="3962400"/>
+            <a:ext cx="5792935" cy="5257800"/>
           </a:xfrm>
           <a:prstGeom prst="roundRect">
             <a:avLst>
@@ -3504,6 +3504,292 @@
           </a:p>
         </p:txBody>
       </p:sp>
+      <p:cxnSp>
+        <p:nvCxnSpPr>
+          <p:cNvPr id="77" name="Elbow Connector 63"/>
+          <p:cNvCxnSpPr>
+            <a:stCxn id="16" idx="3"/>
+            <a:endCxn id="37" idx="3"/>
+          </p:cNvCxnSpPr>
+          <p:nvPr/>
+        </p:nvCxnSpPr>
+        <p:spPr>
+          <a:xfrm rot="5400000">
+            <a:off x="4298524" y="2765789"/>
+            <a:ext cx="1711234" cy="751656"/>
+          </a:xfrm>
+          <a:prstGeom prst="bentConnector2">
+            <a:avLst/>
+          </a:prstGeom>
+          <a:ln w="6350">
+            <a:solidFill>
+              <a:schemeClr val="accent3"/>
+            </a:solidFill>
+            <a:headEnd type="none" w="med" len="med"/>
+            <a:tailEnd type="none" w="med" len="med"/>
+          </a:ln>
+          <a:effectLst/>
+        </p:spPr>
+        <p:style>
+          <a:lnRef idx="1">
+            <a:schemeClr val="accent2"/>
+          </a:lnRef>
+          <a:fillRef idx="2">
+            <a:schemeClr val="accent2"/>
+          </a:fillRef>
+          <a:effectRef idx="1">
+            <a:schemeClr val="accent2"/>
+          </a:effectRef>
+          <a:fontRef idx="minor">
+            <a:schemeClr val="dk1"/>
+          </a:fontRef>
+        </p:style>
+      </p:cxnSp>
+      <p:cxnSp>
+        <p:nvCxnSpPr>
+          <p:cNvPr id="115" name="Elbow Connector 63"/>
+          <p:cNvCxnSpPr>
+            <a:stCxn id="16" idx="3"/>
+            <a:endCxn id="100" idx="3"/>
+          </p:cNvCxnSpPr>
+          <p:nvPr/>
+        </p:nvCxnSpPr>
+        <p:spPr>
+          <a:xfrm rot="5400000">
+            <a:off x="4280283" y="2989316"/>
+            <a:ext cx="1953003" cy="546371"/>
+          </a:xfrm>
+          <a:prstGeom prst="bentConnector2">
+            <a:avLst/>
+          </a:prstGeom>
+          <a:ln w="6350">
+            <a:solidFill>
+              <a:schemeClr val="accent3"/>
+            </a:solidFill>
+            <a:headEnd type="none" w="med" len="med"/>
+            <a:tailEnd type="none" w="med" len="med"/>
+          </a:ln>
+          <a:effectLst/>
+        </p:spPr>
+        <p:style>
+          <a:lnRef idx="1">
+            <a:schemeClr val="accent2"/>
+          </a:lnRef>
+          <a:fillRef idx="2">
+            <a:schemeClr val="accent2"/>
+          </a:fillRef>
+          <a:effectRef idx="1">
+            <a:schemeClr val="accent2"/>
+          </a:effectRef>
+          <a:fontRef idx="minor">
+            <a:schemeClr val="dk1"/>
+          </a:fontRef>
+        </p:style>
+      </p:cxnSp>
+      <p:cxnSp>
+        <p:nvCxnSpPr>
+          <p:cNvPr id="70" name="Elbow Connector 63"/>
+          <p:cNvCxnSpPr>
+            <a:stCxn id="16" idx="3"/>
+            <a:endCxn id="69" idx="3"/>
+          </p:cNvCxnSpPr>
+          <p:nvPr/>
+        </p:nvCxnSpPr>
+        <p:spPr>
+          <a:xfrm rot="5400000">
+            <a:off x="3962940" y="3305469"/>
+            <a:ext cx="2586499" cy="547560"/>
+          </a:xfrm>
+          <a:prstGeom prst="bentConnector2">
+            <a:avLst/>
+          </a:prstGeom>
+          <a:ln w="6350">
+            <a:solidFill>
+              <a:schemeClr val="accent3"/>
+            </a:solidFill>
+            <a:headEnd type="none" w="med" len="med"/>
+            <a:tailEnd type="none" w="med" len="med"/>
+          </a:ln>
+          <a:effectLst/>
+        </p:spPr>
+        <p:style>
+          <a:lnRef idx="1">
+            <a:schemeClr val="accent2"/>
+          </a:lnRef>
+          <a:fillRef idx="2">
+            <a:schemeClr val="accent2"/>
+          </a:fillRef>
+          <a:effectRef idx="1">
+            <a:schemeClr val="accent2"/>
+          </a:effectRef>
+          <a:fontRef idx="minor">
+            <a:schemeClr val="dk1"/>
+          </a:fontRef>
+        </p:style>
+      </p:cxnSp>
+      <p:cxnSp>
+        <p:nvCxnSpPr>
+          <p:cNvPr id="122" name="Elbow Connector 63"/>
+          <p:cNvCxnSpPr>
+            <a:stCxn id="16" idx="3"/>
+            <a:endCxn id="95" idx="3"/>
+          </p:cNvCxnSpPr>
+          <p:nvPr/>
+        </p:nvCxnSpPr>
+        <p:spPr>
+          <a:xfrm rot="5400000">
+            <a:off x="4032968" y="3612337"/>
+            <a:ext cx="2823339" cy="170665"/>
+          </a:xfrm>
+          <a:prstGeom prst="bentConnector2">
+            <a:avLst/>
+          </a:prstGeom>
+          <a:ln w="6350">
+            <a:solidFill>
+              <a:schemeClr val="accent3"/>
+            </a:solidFill>
+            <a:headEnd type="none" w="med" len="med"/>
+            <a:tailEnd type="none" w="med" len="med"/>
+          </a:ln>
+          <a:effectLst/>
+        </p:spPr>
+        <p:style>
+          <a:lnRef idx="1">
+            <a:schemeClr val="accent2"/>
+          </a:lnRef>
+          <a:fillRef idx="2">
+            <a:schemeClr val="accent2"/>
+          </a:fillRef>
+          <a:effectRef idx="1">
+            <a:schemeClr val="accent2"/>
+          </a:effectRef>
+          <a:fontRef idx="minor">
+            <a:schemeClr val="dk1"/>
+          </a:fontRef>
+        </p:style>
+      </p:cxnSp>
+      <p:cxnSp>
+        <p:nvCxnSpPr>
+          <p:cNvPr id="76" name="Elbow Connector 63"/>
+          <p:cNvCxnSpPr>
+            <a:stCxn id="16" idx="3"/>
+            <a:endCxn id="75" idx="3"/>
+          </p:cNvCxnSpPr>
+          <p:nvPr/>
+        </p:nvCxnSpPr>
+        <p:spPr>
+          <a:xfrm rot="5400000">
+            <a:off x="3657492" y="3820301"/>
+            <a:ext cx="3406778" cy="338176"/>
+          </a:xfrm>
+          <a:prstGeom prst="bentConnector2">
+            <a:avLst/>
+          </a:prstGeom>
+          <a:ln w="6350">
+            <a:solidFill>
+              <a:schemeClr val="accent3"/>
+            </a:solidFill>
+            <a:headEnd type="none" w="med" len="med"/>
+            <a:tailEnd type="none" w="med" len="med"/>
+          </a:ln>
+          <a:effectLst/>
+        </p:spPr>
+        <p:style>
+          <a:lnRef idx="1">
+            <a:schemeClr val="accent2"/>
+          </a:lnRef>
+          <a:fillRef idx="2">
+            <a:schemeClr val="accent2"/>
+          </a:fillRef>
+          <a:effectRef idx="1">
+            <a:schemeClr val="accent2"/>
+          </a:effectRef>
+          <a:fontRef idx="minor">
+            <a:schemeClr val="dk1"/>
+          </a:fontRef>
+        </p:style>
+      </p:cxnSp>
+      <p:cxnSp>
+        <p:nvCxnSpPr>
+          <p:cNvPr id="66" name="Elbow Connector 63"/>
+          <p:cNvCxnSpPr>
+            <a:endCxn id="56" idx="3"/>
+          </p:cNvCxnSpPr>
+          <p:nvPr/>
+        </p:nvCxnSpPr>
+        <p:spPr>
+          <a:xfrm rot="5400000">
+            <a:off x="3425338" y="3398418"/>
+            <a:ext cx="2642732" cy="1567570"/>
+          </a:xfrm>
+          <a:prstGeom prst="bentConnector2">
+            <a:avLst/>
+          </a:prstGeom>
+          <a:ln w="6350">
+            <a:solidFill>
+              <a:schemeClr val="accent3"/>
+            </a:solidFill>
+            <a:headEnd type="none" w="med" len="med"/>
+            <a:tailEnd type="none" w="med" len="med"/>
+          </a:ln>
+          <a:effectLst/>
+        </p:spPr>
+        <p:style>
+          <a:lnRef idx="1">
+            <a:schemeClr val="accent2"/>
+          </a:lnRef>
+          <a:fillRef idx="2">
+            <a:schemeClr val="accent2"/>
+          </a:fillRef>
+          <a:effectRef idx="1">
+            <a:schemeClr val="accent2"/>
+          </a:effectRef>
+          <a:fontRef idx="minor">
+            <a:schemeClr val="dk1"/>
+          </a:fontRef>
+        </p:style>
+      </p:cxnSp>
+      <p:cxnSp>
+        <p:nvCxnSpPr>
+          <p:cNvPr id="63" name="Elbow Connector 63"/>
+          <p:cNvCxnSpPr>
+            <a:stCxn id="16" idx="3"/>
+            <a:endCxn id="55" idx="3"/>
+          </p:cNvCxnSpPr>
+          <p:nvPr/>
+        </p:nvCxnSpPr>
+        <p:spPr>
+          <a:xfrm rot="5400000">
+            <a:off x="3458515" y="2639460"/>
+            <a:ext cx="2424915" cy="1717994"/>
+          </a:xfrm>
+          <a:prstGeom prst="bentConnector2">
+            <a:avLst/>
+          </a:prstGeom>
+          <a:ln w="6350">
+            <a:solidFill>
+              <a:schemeClr val="accent3"/>
+            </a:solidFill>
+            <a:headEnd type="none" w="med" len="med"/>
+            <a:tailEnd type="none" w="med" len="med"/>
+          </a:ln>
+          <a:effectLst/>
+        </p:spPr>
+        <p:style>
+          <a:lnRef idx="1">
+            <a:schemeClr val="accent2"/>
+          </a:lnRef>
+          <a:fillRef idx="2">
+            <a:schemeClr val="accent2"/>
+          </a:fillRef>
+          <a:effectRef idx="1">
+            <a:schemeClr val="accent2"/>
+          </a:effectRef>
+          <a:fontRef idx="minor">
+            <a:schemeClr val="dk1"/>
+          </a:fontRef>
+        </p:style>
+      </p:cxnSp>
       <p:sp>
         <p:nvSpPr>
           <p:cNvPr id="2" name="Rectangle 8"/>
@@ -3825,8 +4111,8 @@
         </p:nvSpPr>
         <p:spPr>
           <a:xfrm rot="16200000">
-            <a:off x="5703829" y="2464877"/>
-            <a:ext cx="2362201" cy="328045"/>
+            <a:off x="7067997" y="2065428"/>
+            <a:ext cx="1584203" cy="328045"/>
           </a:xfrm>
           <a:prstGeom prst="roundRect">
             <a:avLst/>
@@ -3879,13 +4165,13 @@
       </p:sp>
       <p:sp>
         <p:nvSpPr>
-          <p:cNvPr id="34" name="Rectangle 11"/>
+          <p:cNvPr id="35" name="Rectangle 11"/>
           <p:cNvSpPr/>
           <p:nvPr/>
         </p:nvSpPr>
         <p:spPr>
           <a:xfrm>
-            <a:off x="2592528" y="3649359"/>
+            <a:off x="2592524" y="5917823"/>
             <a:ext cx="1093635" cy="236841"/>
           </a:xfrm>
           <a:prstGeom prst="rect">
@@ -3925,7 +4211,7 @@
                   </a:schemeClr>
                 </a:solidFill>
               </a:rPr>
-              <a:t>BrowserPanel</a:t>
+              <a:t>StatusBarFooter</a:t>
             </a:r>
             <a:endParaRPr lang="en-SG" sz="1050" b="1" dirty="0">
               <a:solidFill>
@@ -3939,13 +4225,13 @@
       </p:sp>
       <p:sp>
         <p:nvSpPr>
-          <p:cNvPr id="35" name="Rectangle 11"/>
+          <p:cNvPr id="36" name="Rectangle 11"/>
           <p:cNvSpPr/>
           <p:nvPr/>
         </p:nvSpPr>
         <p:spPr>
           <a:xfrm>
-            <a:off x="2592527" y="4563759"/>
+            <a:off x="2588824" y="3698685"/>
             <a:ext cx="1093635" cy="236841"/>
           </a:xfrm>
           <a:prstGeom prst="rect">
@@ -3978,14 +4264,14 @@
           <a:p>
             <a:pPr algn="ctr"/>
             <a:r>
-              <a:rPr lang="en-US" sz="1050" b="1" dirty="0" err="1">
+              <a:rPr lang="en-US" sz="1050" b="1" dirty="0" smtClean="0">
                 <a:solidFill>
                   <a:schemeClr val="accent3">
                     <a:lumMod val="75000"/>
                   </a:schemeClr>
                 </a:solidFill>
               </a:rPr>
-              <a:t>StatusBarFooter</a:t>
+              <a:t>EventListPanel</a:t>
             </a:r>
             <a:endParaRPr lang="en-SG" sz="1050" b="1" dirty="0">
               <a:solidFill>
@@ -3999,14 +4285,14 @@
       </p:sp>
       <p:sp>
         <p:nvSpPr>
-          <p:cNvPr id="36" name="Rectangle 11"/>
+          <p:cNvPr id="37" name="Rectangle 11"/>
           <p:cNvSpPr/>
           <p:nvPr/>
         </p:nvSpPr>
         <p:spPr>
           <a:xfrm>
-            <a:off x="2592526" y="3991960"/>
-            <a:ext cx="1093635" cy="236841"/>
+            <a:off x="3737407" y="3878813"/>
+            <a:ext cx="1040906" cy="236841"/>
           </a:xfrm>
           <a:prstGeom prst="rect">
             <a:avLst/>
@@ -4038,14 +4324,24 @@
           <a:p>
             <a:pPr algn="ctr"/>
             <a:r>
-              <a:rPr lang="en-US" sz="1050" b="1" dirty="0" err="1">
+              <a:rPr lang="en-US" sz="1050" b="1" dirty="0" smtClean="0">
                 <a:solidFill>
                   <a:schemeClr val="accent3">
                     <a:lumMod val="75000"/>
                   </a:schemeClr>
                 </a:solidFill>
               </a:rPr>
-              <a:t>PersonListPanel</a:t>
+              <a:t>Event</a:t>
+            </a:r>
+            <a:r>
+              <a:rPr lang="en-US" sz="1050" b="1" dirty="0" smtClean="0">
+                <a:solidFill>
+                  <a:schemeClr val="accent3">
+                    <a:lumMod val="75000"/>
+                  </a:schemeClr>
+                </a:solidFill>
+              </a:rPr>
+              <a:t>Card</a:t>
             </a:r>
             <a:endParaRPr lang="en-SG" sz="1050" b="1" dirty="0">
               <a:solidFill>
@@ -4059,73 +4355,13 @@
       </p:sp>
       <p:sp>
         <p:nvSpPr>
-          <p:cNvPr id="37" name="Rectangle 11"/>
-          <p:cNvSpPr/>
-          <p:nvPr/>
-        </p:nvSpPr>
-        <p:spPr>
-          <a:xfrm>
-            <a:off x="3839323" y="4228801"/>
-            <a:ext cx="1040906" cy="236841"/>
-          </a:xfrm>
-          <a:prstGeom prst="rect">
-            <a:avLst/>
-          </a:prstGeom>
-          <a:ln w="19050">
-            <a:solidFill>
-              <a:schemeClr val="accent3"/>
-            </a:solidFill>
-          </a:ln>
-          <a:effectLst/>
-        </p:spPr>
-        <p:style>
-          <a:lnRef idx="1">
-            <a:schemeClr val="accent3"/>
-          </a:lnRef>
-          <a:fillRef idx="2">
-            <a:schemeClr val="accent3"/>
-          </a:fillRef>
-          <a:effectRef idx="1">
-            <a:schemeClr val="accent3"/>
-          </a:effectRef>
-          <a:fontRef idx="minor">
-            <a:schemeClr val="dk1"/>
-          </a:fontRef>
-        </p:style>
-        <p:txBody>
-          <a:bodyPr rtlCol="0" anchor="ctr"/>
-          <a:lstStyle/>
-          <a:p>
-            <a:pPr algn="ctr"/>
-            <a:r>
-              <a:rPr lang="en-US" sz="1050" b="1" dirty="0" err="1">
-                <a:solidFill>
-                  <a:schemeClr val="accent3">
-                    <a:lumMod val="75000"/>
-                  </a:schemeClr>
-                </a:solidFill>
-              </a:rPr>
-              <a:t>PersonCard</a:t>
-            </a:r>
-            <a:endParaRPr lang="en-SG" sz="1050" b="1" dirty="0">
-              <a:solidFill>
-                <a:schemeClr val="accent3">
-                  <a:lumMod val="75000"/>
-                </a:schemeClr>
-              </a:solidFill>
-            </a:endParaRPr>
-          </a:p>
-        </p:txBody>
-      </p:sp>
-      <p:sp>
-        <p:nvSpPr>
           <p:cNvPr id="38" name="Rectangle 11"/>
           <p:cNvSpPr/>
           <p:nvPr/>
         </p:nvSpPr>
         <p:spPr>
           <a:xfrm>
-            <a:off x="2592528" y="4966000"/>
+            <a:off x="2592525" y="6260425"/>
             <a:ext cx="1093635" cy="236841"/>
           </a:xfrm>
           <a:prstGeom prst="rect">
@@ -4328,47 +4564,6 @@
       </p:sp>
       <p:cxnSp>
         <p:nvCxnSpPr>
-          <p:cNvPr id="44" name="Elbow Connector 63"/>
-          <p:cNvCxnSpPr>
-            <a:stCxn id="39" idx="2"/>
-            <a:endCxn id="34" idx="1"/>
-          </p:cNvCxnSpPr>
-          <p:nvPr/>
-        </p:nvCxnSpPr>
-        <p:spPr>
-          <a:xfrm rot="16200000" flipH="1">
-            <a:off x="2054450" y="3229701"/>
-            <a:ext cx="899755" cy="176402"/>
-          </a:xfrm>
-          <a:prstGeom prst="bentConnector2">
-            <a:avLst/>
-          </a:prstGeom>
-          <a:ln w="19050">
-            <a:solidFill>
-              <a:schemeClr val="accent3"/>
-            </a:solidFill>
-            <a:headEnd type="none" w="med" len="med"/>
-            <a:tailEnd type="arrow" w="med" len="med"/>
-          </a:ln>
-          <a:effectLst/>
-        </p:spPr>
-        <p:style>
-          <a:lnRef idx="1">
-            <a:schemeClr val="accent2"/>
-          </a:lnRef>
-          <a:fillRef idx="2">
-            <a:schemeClr val="accent2"/>
-          </a:fillRef>
-          <a:effectRef idx="1">
-            <a:schemeClr val="accent2"/>
-          </a:effectRef>
-          <a:fontRef idx="minor">
-            <a:schemeClr val="dk1"/>
-          </a:fontRef>
-        </p:style>
-      </p:cxnSp>
-      <p:cxnSp>
-        <p:nvCxnSpPr>
           <p:cNvPr id="47" name="Elbow Connector 63"/>
           <p:cNvCxnSpPr>
             <a:stCxn id="39" idx="2"/>
@@ -4378,8 +4573,8 @@
         </p:nvCxnSpPr>
         <p:spPr>
           <a:xfrm rot="16200000" flipH="1">
-            <a:off x="1883148" y="3401003"/>
-            <a:ext cx="1242356" cy="176400"/>
+            <a:off x="2027935" y="3256216"/>
+            <a:ext cx="949081" cy="172698"/>
           </a:xfrm>
           <a:prstGeom prst="bentConnector2">
             <a:avLst/>
@@ -4419,8 +4614,8 @@
         </p:nvCxnSpPr>
         <p:spPr>
           <a:xfrm rot="16200000" flipH="1">
-            <a:off x="1597249" y="3686901"/>
-            <a:ext cx="1814155" cy="176401"/>
+            <a:off x="920216" y="4363935"/>
+            <a:ext cx="3168219" cy="176398"/>
           </a:xfrm>
           <a:prstGeom prst="bentConnector2">
             <a:avLst/>
@@ -4459,8 +4654,8 @@
         </p:nvCxnSpPr>
         <p:spPr>
           <a:xfrm rot="16200000" flipH="1">
-            <a:off x="1184119" y="3676012"/>
-            <a:ext cx="2396440" cy="420377"/>
+            <a:off x="527903" y="4314224"/>
+            <a:ext cx="3690866" cy="438377"/>
           </a:xfrm>
           <a:prstGeom prst="bentConnector2">
             <a:avLst/>
@@ -4581,88 +4776,6 @@
           <a:xfrm flipV="1">
             <a:off x="3686160" y="2286000"/>
             <a:ext cx="1843809" cy="1136729"/>
-          </a:xfrm>
-          <a:prstGeom prst="bentConnector2">
-            <a:avLst/>
-          </a:prstGeom>
-          <a:ln w="6350">
-            <a:solidFill>
-              <a:schemeClr val="accent3"/>
-            </a:solidFill>
-            <a:headEnd type="none" w="med" len="med"/>
-            <a:tailEnd type="none" w="med" len="med"/>
-          </a:ln>
-          <a:effectLst/>
-        </p:spPr>
-        <p:style>
-          <a:lnRef idx="1">
-            <a:schemeClr val="accent2"/>
-          </a:lnRef>
-          <a:fillRef idx="2">
-            <a:schemeClr val="accent2"/>
-          </a:fillRef>
-          <a:effectRef idx="1">
-            <a:schemeClr val="accent2"/>
-          </a:effectRef>
-          <a:fontRef idx="minor">
-            <a:schemeClr val="dk1"/>
-          </a:fontRef>
-        </p:style>
-      </p:cxnSp>
-      <p:cxnSp>
-        <p:nvCxnSpPr>
-          <p:cNvPr id="77" name="Elbow Connector 63"/>
-          <p:cNvCxnSpPr>
-            <a:stCxn id="16" idx="3"/>
-            <a:endCxn id="37" idx="3"/>
-          </p:cNvCxnSpPr>
-          <p:nvPr/>
-        </p:nvCxnSpPr>
-        <p:spPr>
-          <a:xfrm rot="5400000">
-            <a:off x="4174488" y="2991741"/>
-            <a:ext cx="2061222" cy="649740"/>
-          </a:xfrm>
-          <a:prstGeom prst="bentConnector2">
-            <a:avLst/>
-          </a:prstGeom>
-          <a:ln w="6350">
-            <a:solidFill>
-              <a:schemeClr val="accent3"/>
-            </a:solidFill>
-            <a:headEnd type="none" w="med" len="med"/>
-            <a:tailEnd type="none" w="med" len="med"/>
-          </a:ln>
-          <a:effectLst/>
-        </p:spPr>
-        <p:style>
-          <a:lnRef idx="1">
-            <a:schemeClr val="accent2"/>
-          </a:lnRef>
-          <a:fillRef idx="2">
-            <a:schemeClr val="accent2"/>
-          </a:fillRef>
-          <a:effectRef idx="1">
-            <a:schemeClr val="accent2"/>
-          </a:effectRef>
-          <a:fontRef idx="minor">
-            <a:schemeClr val="dk1"/>
-          </a:fontRef>
-        </p:style>
-      </p:cxnSp>
-      <p:cxnSp>
-        <p:nvCxnSpPr>
-          <p:cNvPr id="82" name="Elbow Connector 63"/>
-          <p:cNvCxnSpPr>
-            <a:stCxn id="16" idx="3"/>
-            <a:endCxn id="34" idx="3"/>
-          </p:cNvCxnSpPr>
-          <p:nvPr/>
-        </p:nvCxnSpPr>
-        <p:spPr>
-          <a:xfrm rot="5400000">
-            <a:off x="3867176" y="2104987"/>
-            <a:ext cx="1481780" cy="1843806"/>
           </a:xfrm>
           <a:prstGeom prst="bentConnector2">
             <a:avLst/>
@@ -4743,8 +4856,8 @@
         </p:nvCxnSpPr>
         <p:spPr>
           <a:xfrm rot="5400000">
-            <a:off x="3409976" y="2562187"/>
-            <a:ext cx="2396180" cy="1843807"/>
+            <a:off x="2732942" y="3239217"/>
+            <a:ext cx="3750244" cy="1843810"/>
           </a:xfrm>
           <a:prstGeom prst="bentConnector2">
             <a:avLst/>
@@ -4784,8 +4897,8 @@
         </p:nvCxnSpPr>
         <p:spPr>
           <a:xfrm rot="5400000">
-            <a:off x="3208856" y="2763307"/>
-            <a:ext cx="2798421" cy="1843806"/>
+            <a:off x="2561642" y="3410519"/>
+            <a:ext cx="4092846" cy="1843809"/>
           </a:xfrm>
           <a:prstGeom prst="bentConnector2">
             <a:avLst/>
@@ -4824,8 +4937,8 @@
         </p:nvCxnSpPr>
         <p:spPr>
           <a:xfrm rot="5400000" flipH="1" flipV="1">
-            <a:off x="4594921" y="-355061"/>
-            <a:ext cx="170724" cy="4081246"/>
+            <a:off x="5076660" y="-848492"/>
+            <a:ext cx="182417" cy="5056416"/>
           </a:xfrm>
           <a:prstGeom prst="bentConnector2">
             <a:avLst/>
@@ -4863,8 +4976,8 @@
         </p:nvSpPr>
         <p:spPr>
           <a:xfrm rot="16200000">
-            <a:off x="6213739" y="4560376"/>
-            <a:ext cx="1371599" cy="328045"/>
+            <a:off x="6156577" y="4624491"/>
+            <a:ext cx="3407044" cy="328045"/>
           </a:xfrm>
           <a:prstGeom prst="roundRect">
             <a:avLst/>
@@ -5168,8 +5281,8 @@
         </p:nvCxnSpPr>
         <p:spPr>
           <a:xfrm rot="16200000" flipH="1">
-            <a:off x="3430123" y="3938021"/>
-            <a:ext cx="118421" cy="699979"/>
+            <a:off x="3405670" y="3665497"/>
+            <a:ext cx="61708" cy="601765"/>
           </a:xfrm>
           <a:prstGeom prst="bentConnector2">
             <a:avLst/>
@@ -5209,8 +5322,8 @@
         </p:nvCxnSpPr>
         <p:spPr>
           <a:xfrm rot="5400000">
-            <a:off x="3695875" y="2276286"/>
-            <a:ext cx="1824381" cy="1843808"/>
+            <a:off x="3840661" y="2127798"/>
+            <a:ext cx="1531106" cy="1847510"/>
           </a:xfrm>
           <a:prstGeom prst="bentConnector2">
             <a:avLst/>
@@ -5300,8 +5413,8 @@
         </p:nvSpPr>
         <p:spPr>
           <a:xfrm>
-            <a:off x="3687515" y="2828802"/>
-            <a:ext cx="3048000" cy="203200"/>
+            <a:off x="3687515" y="2820071"/>
+            <a:ext cx="4008560" cy="211931"/>
           </a:xfrm>
           <a:custGeom>
             <a:avLst/>
@@ -5382,7 +5495,7 @@
         </p:nvSpPr>
         <p:spPr>
           <a:xfrm>
-            <a:off x="5431573" y="4488138"/>
+            <a:off x="5415307" y="3468965"/>
             <a:ext cx="229325" cy="160062"/>
           </a:xfrm>
           <a:prstGeom prst="rect">
@@ -5429,14 +5542,746 @@
       </p:sp>
       <p:sp>
         <p:nvSpPr>
-          <p:cNvPr id="118" name="Freeform 117"/>
+          <p:cNvPr id="55" name="Rectangle 11"/>
           <p:cNvSpPr/>
           <p:nvPr/>
         </p:nvSpPr>
         <p:spPr>
-          <a:xfrm flipV="1">
-            <a:off x="4114799" y="4472708"/>
-            <a:ext cx="2642195" cy="101600"/>
+          <a:xfrm>
+            <a:off x="2590799" y="4592494"/>
+            <a:ext cx="1221176" cy="236841"/>
+          </a:xfrm>
+          <a:prstGeom prst="rect">
+            <a:avLst/>
+          </a:prstGeom>
+          <a:ln w="19050">
+            <a:solidFill>
+              <a:schemeClr val="accent3"/>
+            </a:solidFill>
+          </a:ln>
+          <a:effectLst/>
+        </p:spPr>
+        <p:style>
+          <a:lnRef idx="1">
+            <a:schemeClr val="accent3"/>
+          </a:lnRef>
+          <a:fillRef idx="2">
+            <a:schemeClr val="accent3"/>
+          </a:fillRef>
+          <a:effectRef idx="1">
+            <a:schemeClr val="accent3"/>
+          </a:effectRef>
+          <a:fontRef idx="minor">
+            <a:schemeClr val="dk1"/>
+          </a:fontRef>
+        </p:style>
+        <p:txBody>
+          <a:bodyPr rtlCol="0" anchor="ctr"/>
+          <a:lstStyle/>
+          <a:p>
+            <a:pPr algn="ctr"/>
+            <a:r>
+              <a:rPr lang="en-US" sz="1050" b="1" dirty="0" smtClean="0">
+                <a:solidFill>
+                  <a:schemeClr val="accent3">
+                    <a:lumMod val="75000"/>
+                  </a:schemeClr>
+                </a:solidFill>
+              </a:rPr>
+              <a:t>Deadline</a:t>
+            </a:r>
+            <a:r>
+              <a:rPr lang="en-US" sz="1050" b="1" dirty="0" smtClean="0">
+                <a:solidFill>
+                  <a:schemeClr val="accent3">
+                    <a:lumMod val="75000"/>
+                  </a:schemeClr>
+                </a:solidFill>
+              </a:rPr>
+              <a:t>ListPanel</a:t>
+            </a:r>
+            <a:endParaRPr lang="en-SG" sz="1050" b="1" dirty="0">
+              <a:solidFill>
+                <a:schemeClr val="accent3">
+                  <a:lumMod val="75000"/>
+                </a:schemeClr>
+              </a:solidFill>
+            </a:endParaRPr>
+          </a:p>
+        </p:txBody>
+      </p:sp>
+      <p:sp>
+        <p:nvSpPr>
+          <p:cNvPr id="56" name="Rectangle 11"/>
+          <p:cNvSpPr/>
+          <p:nvPr/>
+        </p:nvSpPr>
+        <p:spPr>
+          <a:xfrm>
+            <a:off x="2583424" y="5385148"/>
+            <a:ext cx="1379495" cy="236841"/>
+          </a:xfrm>
+          <a:prstGeom prst="rect">
+            <a:avLst/>
+          </a:prstGeom>
+          <a:ln w="19050">
+            <a:solidFill>
+              <a:schemeClr val="accent3"/>
+            </a:solidFill>
+          </a:ln>
+          <a:effectLst/>
+        </p:spPr>
+        <p:style>
+          <a:lnRef idx="1">
+            <a:schemeClr val="accent3"/>
+          </a:lnRef>
+          <a:fillRef idx="2">
+            <a:schemeClr val="accent3"/>
+          </a:fillRef>
+          <a:effectRef idx="1">
+            <a:schemeClr val="accent3"/>
+          </a:effectRef>
+          <a:fontRef idx="minor">
+            <a:schemeClr val="dk1"/>
+          </a:fontRef>
+        </p:style>
+        <p:txBody>
+          <a:bodyPr rtlCol="0" anchor="ctr"/>
+          <a:lstStyle/>
+          <a:p>
+            <a:pPr algn="ctr"/>
+            <a:r>
+              <a:rPr lang="en-US" sz="1050" b="1" dirty="0" smtClean="0">
+                <a:solidFill>
+                  <a:schemeClr val="accent3">
+                    <a:lumMod val="75000"/>
+                  </a:schemeClr>
+                </a:solidFill>
+              </a:rPr>
+              <a:t>FloatingTaskListPanel</a:t>
+            </a:r>
+            <a:endParaRPr lang="en-SG" sz="1050" b="1" dirty="0">
+              <a:solidFill>
+                <a:schemeClr val="accent3">
+                  <a:lumMod val="75000"/>
+                </a:schemeClr>
+              </a:solidFill>
+            </a:endParaRPr>
+          </a:p>
+        </p:txBody>
+      </p:sp>
+      <p:cxnSp>
+        <p:nvCxnSpPr>
+          <p:cNvPr id="57" name="Elbow Connector 63"/>
+          <p:cNvCxnSpPr>
+            <a:stCxn id="39" idx="2"/>
+            <a:endCxn id="55" idx="1"/>
+          </p:cNvCxnSpPr>
+          <p:nvPr/>
+        </p:nvCxnSpPr>
+        <p:spPr>
+          <a:xfrm rot="16200000" flipH="1">
+            <a:off x="1582017" y="3702133"/>
+            <a:ext cx="1842890" cy="174673"/>
+          </a:xfrm>
+          <a:prstGeom prst="bentConnector2">
+            <a:avLst/>
+          </a:prstGeom>
+          <a:ln w="19050">
+            <a:solidFill>
+              <a:schemeClr val="accent3"/>
+            </a:solidFill>
+            <a:headEnd type="none" w="med" len="med"/>
+            <a:tailEnd type="arrow" w="med" len="med"/>
+          </a:ln>
+          <a:effectLst/>
+        </p:spPr>
+        <p:style>
+          <a:lnRef idx="1">
+            <a:schemeClr val="accent2"/>
+          </a:lnRef>
+          <a:fillRef idx="2">
+            <a:schemeClr val="accent2"/>
+          </a:fillRef>
+          <a:effectRef idx="1">
+            <a:schemeClr val="accent2"/>
+          </a:effectRef>
+          <a:fontRef idx="minor">
+            <a:schemeClr val="dk1"/>
+          </a:fontRef>
+        </p:style>
+      </p:cxnSp>
+      <p:cxnSp>
+        <p:nvCxnSpPr>
+          <p:cNvPr id="60" name="Elbow Connector 63"/>
+          <p:cNvCxnSpPr>
+            <a:stCxn id="39" idx="2"/>
+            <a:endCxn id="56" idx="1"/>
+          </p:cNvCxnSpPr>
+          <p:nvPr/>
+        </p:nvCxnSpPr>
+        <p:spPr>
+          <a:xfrm rot="16200000" flipH="1">
+            <a:off x="1182003" y="4102148"/>
+            <a:ext cx="2635544" cy="167298"/>
+          </a:xfrm>
+          <a:prstGeom prst="bentConnector2">
+            <a:avLst/>
+          </a:prstGeom>
+          <a:ln w="19050">
+            <a:solidFill>
+              <a:schemeClr val="accent3"/>
+            </a:solidFill>
+            <a:headEnd type="none" w="med" len="med"/>
+            <a:tailEnd type="arrow" w="med" len="med"/>
+          </a:ln>
+          <a:effectLst/>
+        </p:spPr>
+        <p:style>
+          <a:lnRef idx="1">
+            <a:schemeClr val="accent2"/>
+          </a:lnRef>
+          <a:fillRef idx="2">
+            <a:schemeClr val="accent2"/>
+          </a:fillRef>
+          <a:effectRef idx="1">
+            <a:schemeClr val="accent2"/>
+          </a:effectRef>
+          <a:fontRef idx="minor">
+            <a:schemeClr val="dk1"/>
+          </a:fontRef>
+        </p:style>
+      </p:cxnSp>
+      <p:sp>
+        <p:nvSpPr>
+          <p:cNvPr id="69" name="Rectangle 11"/>
+          <p:cNvSpPr/>
+          <p:nvPr/>
+        </p:nvSpPr>
+        <p:spPr>
+          <a:xfrm>
+            <a:off x="3941503" y="4754078"/>
+            <a:ext cx="1040906" cy="236841"/>
+          </a:xfrm>
+          <a:prstGeom prst="rect">
+            <a:avLst/>
+          </a:prstGeom>
+          <a:ln w="19050">
+            <a:solidFill>
+              <a:schemeClr val="accent3"/>
+            </a:solidFill>
+          </a:ln>
+          <a:effectLst/>
+        </p:spPr>
+        <p:style>
+          <a:lnRef idx="1">
+            <a:schemeClr val="accent3"/>
+          </a:lnRef>
+          <a:fillRef idx="2">
+            <a:schemeClr val="accent3"/>
+          </a:fillRef>
+          <a:effectRef idx="1">
+            <a:schemeClr val="accent3"/>
+          </a:effectRef>
+          <a:fontRef idx="minor">
+            <a:schemeClr val="dk1"/>
+          </a:fontRef>
+        </p:style>
+        <p:txBody>
+          <a:bodyPr rtlCol="0" anchor="ctr"/>
+          <a:lstStyle/>
+          <a:p>
+            <a:pPr algn="ctr"/>
+            <a:r>
+              <a:rPr lang="en-US" sz="1050" b="1" dirty="0" smtClean="0">
+                <a:solidFill>
+                  <a:schemeClr val="accent3">
+                    <a:lumMod val="75000"/>
+                  </a:schemeClr>
+                </a:solidFill>
+              </a:rPr>
+              <a:t>DeadlineCard</a:t>
+            </a:r>
+            <a:endParaRPr lang="en-SG" sz="1050" b="1" dirty="0">
+              <a:solidFill>
+                <a:schemeClr val="accent3">
+                  <a:lumMod val="75000"/>
+                </a:schemeClr>
+              </a:solidFill>
+            </a:endParaRPr>
+          </a:p>
+        </p:txBody>
+      </p:sp>
+      <p:cxnSp>
+        <p:nvCxnSpPr>
+          <p:cNvPr id="71" name="Elbow Connector 70"/>
+          <p:cNvCxnSpPr>
+            <a:stCxn id="55" idx="2"/>
+            <a:endCxn id="69" idx="1"/>
+          </p:cNvCxnSpPr>
+          <p:nvPr/>
+        </p:nvCxnSpPr>
+        <p:spPr>
+          <a:xfrm rot="16200000" flipH="1">
+            <a:off x="3549863" y="4480859"/>
+            <a:ext cx="43164" cy="740116"/>
+          </a:xfrm>
+          <a:prstGeom prst="bentConnector2">
+            <a:avLst/>
+          </a:prstGeom>
+          <a:ln w="19050">
+            <a:solidFill>
+              <a:schemeClr val="accent3"/>
+            </a:solidFill>
+            <a:headEnd type="none" w="med" len="med"/>
+            <a:tailEnd type="arrow" w="med" len="med"/>
+          </a:ln>
+          <a:effectLst/>
+        </p:spPr>
+        <p:style>
+          <a:lnRef idx="1">
+            <a:schemeClr val="accent2"/>
+          </a:lnRef>
+          <a:fillRef idx="2">
+            <a:schemeClr val="accent2"/>
+          </a:fillRef>
+          <a:effectRef idx="1">
+            <a:schemeClr val="accent2"/>
+          </a:effectRef>
+          <a:fontRef idx="minor">
+            <a:schemeClr val="dk1"/>
+          </a:fontRef>
+        </p:style>
+      </p:cxnSp>
+      <p:sp>
+        <p:nvSpPr>
+          <p:cNvPr id="75" name="Rectangle 11"/>
+          <p:cNvSpPr/>
+          <p:nvPr/>
+        </p:nvSpPr>
+        <p:spPr>
+          <a:xfrm>
+            <a:off x="3982871" y="5574357"/>
+            <a:ext cx="1208922" cy="236841"/>
+          </a:xfrm>
+          <a:prstGeom prst="rect">
+            <a:avLst/>
+          </a:prstGeom>
+          <a:ln w="19050">
+            <a:solidFill>
+              <a:schemeClr val="accent3"/>
+            </a:solidFill>
+          </a:ln>
+          <a:effectLst/>
+        </p:spPr>
+        <p:style>
+          <a:lnRef idx="1">
+            <a:schemeClr val="accent3"/>
+          </a:lnRef>
+          <a:fillRef idx="2">
+            <a:schemeClr val="accent3"/>
+          </a:fillRef>
+          <a:effectRef idx="1">
+            <a:schemeClr val="accent3"/>
+          </a:effectRef>
+          <a:fontRef idx="minor">
+            <a:schemeClr val="dk1"/>
+          </a:fontRef>
+        </p:style>
+        <p:txBody>
+          <a:bodyPr rtlCol="0" anchor="ctr"/>
+          <a:lstStyle/>
+          <a:p>
+            <a:pPr algn="ctr"/>
+            <a:r>
+              <a:rPr lang="en-US" sz="1050" b="1" dirty="0" smtClean="0">
+                <a:solidFill>
+                  <a:schemeClr val="accent3">
+                    <a:lumMod val="75000"/>
+                  </a:schemeClr>
+                </a:solidFill>
+              </a:rPr>
+              <a:t>FloatingTaskCard</a:t>
+            </a:r>
+            <a:endParaRPr lang="en-SG" sz="1050" b="1" dirty="0">
+              <a:solidFill>
+                <a:schemeClr val="accent3">
+                  <a:lumMod val="75000"/>
+                </a:schemeClr>
+              </a:solidFill>
+            </a:endParaRPr>
+          </a:p>
+        </p:txBody>
+      </p:sp>
+      <p:cxnSp>
+        <p:nvCxnSpPr>
+          <p:cNvPr id="78" name="Elbow Connector 77"/>
+          <p:cNvCxnSpPr>
+            <a:stCxn id="56" idx="2"/>
+            <a:endCxn id="75" idx="1"/>
+          </p:cNvCxnSpPr>
+          <p:nvPr/>
+        </p:nvCxnSpPr>
+        <p:spPr>
+          <a:xfrm rot="16200000" flipH="1">
+            <a:off x="3592627" y="5302533"/>
+            <a:ext cx="70789" cy="709699"/>
+          </a:xfrm>
+          <a:prstGeom prst="bentConnector2">
+            <a:avLst/>
+          </a:prstGeom>
+          <a:ln w="19050">
+            <a:solidFill>
+              <a:schemeClr val="accent3"/>
+            </a:solidFill>
+            <a:headEnd type="none" w="med" len="med"/>
+            <a:tailEnd type="arrow" w="med" len="med"/>
+          </a:ln>
+          <a:effectLst/>
+        </p:spPr>
+        <p:style>
+          <a:lnRef idx="1">
+            <a:schemeClr val="accent2"/>
+          </a:lnRef>
+          <a:fillRef idx="2">
+            <a:schemeClr val="accent2"/>
+          </a:fillRef>
+          <a:effectRef idx="1">
+            <a:schemeClr val="accent2"/>
+          </a:effectRef>
+          <a:fontRef idx="minor">
+            <a:schemeClr val="dk1"/>
+          </a:fontRef>
+        </p:style>
+      </p:cxnSp>
+      <p:sp>
+        <p:nvSpPr>
+          <p:cNvPr id="95" name="Rectangle 11"/>
+          <p:cNvSpPr/>
+          <p:nvPr/>
+        </p:nvSpPr>
+        <p:spPr>
+          <a:xfrm>
+            <a:off x="3941503" y="4990918"/>
+            <a:ext cx="1417801" cy="236841"/>
+          </a:xfrm>
+          <a:prstGeom prst="rect">
+            <a:avLst/>
+          </a:prstGeom>
+          <a:ln w="19050">
+            <a:solidFill>
+              <a:schemeClr val="accent3"/>
+            </a:solidFill>
+          </a:ln>
+          <a:effectLst/>
+        </p:spPr>
+        <p:style>
+          <a:lnRef idx="1">
+            <a:schemeClr val="accent3"/>
+          </a:lnRef>
+          <a:fillRef idx="2">
+            <a:schemeClr val="accent3"/>
+          </a:fillRef>
+          <a:effectRef idx="1">
+            <a:schemeClr val="accent3"/>
+          </a:effectRef>
+          <a:fontRef idx="minor">
+            <a:schemeClr val="dk1"/>
+          </a:fontRef>
+        </p:style>
+        <p:txBody>
+          <a:bodyPr rtlCol="0" anchor="ctr"/>
+          <a:lstStyle/>
+          <a:p>
+            <a:pPr algn="ctr"/>
+            <a:r>
+              <a:rPr lang="en-US" sz="1050" b="1" dirty="0" smtClean="0">
+                <a:solidFill>
+                  <a:schemeClr val="accent3">
+                    <a:lumMod val="75000"/>
+                  </a:schemeClr>
+                </a:solidFill>
+              </a:rPr>
+              <a:t>DeadlineOverdueCard</a:t>
+            </a:r>
+            <a:endParaRPr lang="en-SG" sz="1050" b="1" dirty="0">
+              <a:solidFill>
+                <a:schemeClr val="accent3">
+                  <a:lumMod val="75000"/>
+                </a:schemeClr>
+              </a:solidFill>
+            </a:endParaRPr>
+          </a:p>
+        </p:txBody>
+      </p:sp>
+      <p:cxnSp>
+        <p:nvCxnSpPr>
+          <p:cNvPr id="96" name="Elbow Connector 95"/>
+          <p:cNvCxnSpPr>
+            <a:stCxn id="55" idx="2"/>
+            <a:endCxn id="95" idx="1"/>
+          </p:cNvCxnSpPr>
+          <p:nvPr/>
+        </p:nvCxnSpPr>
+        <p:spPr>
+          <a:xfrm rot="16200000" flipH="1">
+            <a:off x="3431443" y="4599279"/>
+            <a:ext cx="280004" cy="740116"/>
+          </a:xfrm>
+          <a:prstGeom prst="bentConnector2">
+            <a:avLst/>
+          </a:prstGeom>
+          <a:ln w="19050">
+            <a:solidFill>
+              <a:schemeClr val="accent3"/>
+            </a:solidFill>
+            <a:headEnd type="none" w="med" len="med"/>
+            <a:tailEnd type="arrow" w="med" len="med"/>
+          </a:ln>
+          <a:effectLst/>
+        </p:spPr>
+        <p:style>
+          <a:lnRef idx="1">
+            <a:schemeClr val="accent2"/>
+          </a:lnRef>
+          <a:fillRef idx="2">
+            <a:schemeClr val="accent2"/>
+          </a:fillRef>
+          <a:effectRef idx="1">
+            <a:schemeClr val="accent2"/>
+          </a:effectRef>
+          <a:fontRef idx="minor">
+            <a:schemeClr val="dk1"/>
+          </a:fontRef>
+        </p:style>
+      </p:cxnSp>
+      <p:sp>
+        <p:nvSpPr>
+          <p:cNvPr id="100" name="Rectangle 11"/>
+          <p:cNvSpPr/>
+          <p:nvPr/>
+        </p:nvSpPr>
+        <p:spPr>
+          <a:xfrm>
+            <a:off x="3735954" y="4120582"/>
+            <a:ext cx="1247644" cy="236841"/>
+          </a:xfrm>
+          <a:prstGeom prst="rect">
+            <a:avLst/>
+          </a:prstGeom>
+          <a:ln w="19050">
+            <a:solidFill>
+              <a:schemeClr val="accent3"/>
+            </a:solidFill>
+          </a:ln>
+          <a:effectLst/>
+        </p:spPr>
+        <p:style>
+          <a:lnRef idx="1">
+            <a:schemeClr val="accent3"/>
+          </a:lnRef>
+          <a:fillRef idx="2">
+            <a:schemeClr val="accent3"/>
+          </a:fillRef>
+          <a:effectRef idx="1">
+            <a:schemeClr val="accent3"/>
+          </a:effectRef>
+          <a:fontRef idx="minor">
+            <a:schemeClr val="dk1"/>
+          </a:fontRef>
+        </p:style>
+        <p:txBody>
+          <a:bodyPr rtlCol="0" anchor="ctr"/>
+          <a:lstStyle/>
+          <a:p>
+            <a:pPr algn="ctr"/>
+            <a:r>
+              <a:rPr lang="en-US" sz="1050" b="1" dirty="0" smtClean="0">
+                <a:solidFill>
+                  <a:schemeClr val="accent3">
+                    <a:lumMod val="75000"/>
+                  </a:schemeClr>
+                </a:solidFill>
+              </a:rPr>
+              <a:t>EventOverdue</a:t>
+            </a:r>
+            <a:r>
+              <a:rPr lang="en-US" sz="1050" b="1" dirty="0" smtClean="0">
+                <a:solidFill>
+                  <a:schemeClr val="accent3">
+                    <a:lumMod val="75000"/>
+                  </a:schemeClr>
+                </a:solidFill>
+              </a:rPr>
+              <a:t>Card</a:t>
+            </a:r>
+            <a:endParaRPr lang="en-SG" sz="1050" b="1" dirty="0">
+              <a:solidFill>
+                <a:schemeClr val="accent3">
+                  <a:lumMod val="75000"/>
+                </a:schemeClr>
+              </a:solidFill>
+            </a:endParaRPr>
+          </a:p>
+        </p:txBody>
+      </p:sp>
+      <p:cxnSp>
+        <p:nvCxnSpPr>
+          <p:cNvPr id="101" name="Elbow Connector 100"/>
+          <p:cNvCxnSpPr>
+            <a:stCxn id="36" idx="2"/>
+            <a:endCxn id="100" idx="1"/>
+          </p:cNvCxnSpPr>
+          <p:nvPr/>
+        </p:nvCxnSpPr>
+        <p:spPr>
+          <a:xfrm rot="16200000" flipH="1">
+            <a:off x="3284060" y="3787108"/>
+            <a:ext cx="303477" cy="600312"/>
+          </a:xfrm>
+          <a:prstGeom prst="bentConnector2">
+            <a:avLst/>
+          </a:prstGeom>
+          <a:ln w="19050">
+            <a:solidFill>
+              <a:schemeClr val="accent3"/>
+            </a:solidFill>
+            <a:headEnd type="none" w="med" len="med"/>
+            <a:tailEnd type="arrow" w="med" len="med"/>
+          </a:ln>
+          <a:effectLst/>
+        </p:spPr>
+        <p:style>
+          <a:lnRef idx="1">
+            <a:schemeClr val="accent2"/>
+          </a:lnRef>
+          <a:fillRef idx="2">
+            <a:schemeClr val="accent2"/>
+          </a:fillRef>
+          <a:effectRef idx="1">
+            <a:schemeClr val="accent2"/>
+          </a:effectRef>
+          <a:fontRef idx="minor">
+            <a:schemeClr val="dk1"/>
+          </a:fontRef>
+        </p:style>
+      </p:cxnSp>
+      <p:sp>
+        <p:nvSpPr>
+          <p:cNvPr id="127" name="Rectangle 126"/>
+          <p:cNvSpPr/>
+          <p:nvPr/>
+        </p:nvSpPr>
+        <p:spPr>
+          <a:xfrm>
+            <a:off x="5413156" y="4376270"/>
+            <a:ext cx="229325" cy="160062"/>
+          </a:xfrm>
+          <a:prstGeom prst="rect">
+            <a:avLst/>
+          </a:prstGeom>
+          <a:solidFill>
+            <a:schemeClr val="accent3">
+              <a:lumMod val="20000"/>
+              <a:lumOff val="80000"/>
+              <a:alpha val="80000"/>
+            </a:schemeClr>
+          </a:solidFill>
+          <a:ln>
+            <a:noFill/>
+          </a:ln>
+          <a:effectLst>
+            <a:softEdge rad="31750"/>
+          </a:effectLst>
+        </p:spPr>
+        <p:style>
+          <a:lnRef idx="2">
+            <a:schemeClr val="accent1">
+              <a:shade val="50000"/>
+            </a:schemeClr>
+          </a:lnRef>
+          <a:fillRef idx="1">
+            <a:schemeClr val="accent1"/>
+          </a:fillRef>
+          <a:effectRef idx="0">
+            <a:schemeClr val="accent1"/>
+          </a:effectRef>
+          <a:fontRef idx="minor">
+            <a:schemeClr val="lt1"/>
+          </a:fontRef>
+        </p:style>
+        <p:txBody>
+          <a:bodyPr rtlCol="0" anchor="ctr"/>
+          <a:lstStyle/>
+          <a:p>
+            <a:pPr algn="ctr"/>
+            <a:endParaRPr lang="en-SG"/>
+          </a:p>
+        </p:txBody>
+      </p:sp>
+      <p:sp>
+        <p:nvSpPr>
+          <p:cNvPr id="128" name="Rectangle 127"/>
+          <p:cNvSpPr/>
+          <p:nvPr/>
+        </p:nvSpPr>
+        <p:spPr>
+          <a:xfrm>
+            <a:off x="5426134" y="5246050"/>
+            <a:ext cx="229325" cy="160062"/>
+          </a:xfrm>
+          <a:prstGeom prst="rect">
+            <a:avLst/>
+          </a:prstGeom>
+          <a:solidFill>
+            <a:schemeClr val="accent3">
+              <a:lumMod val="20000"/>
+              <a:lumOff val="80000"/>
+              <a:alpha val="80000"/>
+            </a:schemeClr>
+          </a:solidFill>
+          <a:ln>
+            <a:noFill/>
+          </a:ln>
+          <a:effectLst>
+            <a:softEdge rad="31750"/>
+          </a:effectLst>
+        </p:spPr>
+        <p:style>
+          <a:lnRef idx="2">
+            <a:schemeClr val="accent1">
+              <a:shade val="50000"/>
+            </a:schemeClr>
+          </a:lnRef>
+          <a:fillRef idx="1">
+            <a:schemeClr val="accent1"/>
+          </a:fillRef>
+          <a:effectRef idx="0">
+            <a:schemeClr val="accent1"/>
+          </a:effectRef>
+          <a:fontRef idx="minor">
+            <a:schemeClr val="lt1"/>
+          </a:fontRef>
+        </p:style>
+        <p:txBody>
+          <a:bodyPr rtlCol="0" anchor="ctr"/>
+          <a:lstStyle/>
+          <a:p>
+            <a:pPr algn="ctr"/>
+            <a:endParaRPr lang="en-SG"/>
+          </a:p>
+        </p:txBody>
+      </p:sp>
+      <p:sp>
+        <p:nvSpPr>
+          <p:cNvPr id="80" name="Freeform 79"/>
+          <p:cNvSpPr/>
+          <p:nvPr/>
+        </p:nvSpPr>
+        <p:spPr>
+          <a:xfrm>
+            <a:off x="3962919" y="5311300"/>
+            <a:ext cx="3733156" cy="119858"/>
           </a:xfrm>
           <a:custGeom>
             <a:avLst/>
@@ -5509,6 +6354,763 @@
           </a:p>
         </p:txBody>
       </p:sp>
+      <p:sp>
+        <p:nvSpPr>
+          <p:cNvPr id="79" name="Freeform 78"/>
+          <p:cNvSpPr/>
+          <p:nvPr/>
+        </p:nvSpPr>
+        <p:spPr>
+          <a:xfrm>
+            <a:off x="3529207" y="4463055"/>
+            <a:ext cx="4166868" cy="129438"/>
+          </a:xfrm>
+          <a:custGeom>
+            <a:avLst/>
+            <a:gdLst>
+              <a:gd name="connsiteX0" fmla="*/ 0 w 3048000"/>
+              <a:gd name="connsiteY0" fmla="*/ 203200 h 203200"/>
+              <a:gd name="connsiteX1" fmla="*/ 221673 w 3048000"/>
+              <a:gd name="connsiteY1" fmla="*/ 0 h 203200"/>
+              <a:gd name="connsiteX2" fmla="*/ 3048000 w 3048000"/>
+              <a:gd name="connsiteY2" fmla="*/ 0 h 203200"/>
+            </a:gdLst>
+            <a:ahLst/>
+            <a:cxnLst>
+              <a:cxn ang="0">
+                <a:pos x="connsiteX0" y="connsiteY0"/>
+              </a:cxn>
+              <a:cxn ang="0">
+                <a:pos x="connsiteX1" y="connsiteY1"/>
+              </a:cxn>
+              <a:cxn ang="0">
+                <a:pos x="connsiteX2" y="connsiteY2"/>
+              </a:cxn>
+            </a:cxnLst>
+            <a:rect l="l" t="t" r="r" b="b"/>
+            <a:pathLst>
+              <a:path w="3048000" h="203200">
+                <a:moveTo>
+                  <a:pt x="0" y="203200"/>
+                </a:moveTo>
+                <a:lnTo>
+                  <a:pt x="221673" y="0"/>
+                </a:lnTo>
+                <a:lnTo>
+                  <a:pt x="3048000" y="0"/>
+                </a:lnTo>
+              </a:path>
+            </a:pathLst>
+          </a:custGeom>
+          <a:noFill/>
+          <a:ln w="19050">
+            <a:solidFill>
+              <a:schemeClr val="accent3"/>
+            </a:solidFill>
+            <a:prstDash val="sysDot"/>
+            <a:headEnd type="none" w="med" len="med"/>
+            <a:tailEnd type="arrow" w="med" len="med"/>
+          </a:ln>
+          <a:effectLst/>
+        </p:spPr>
+        <p:style>
+          <a:lnRef idx="1">
+            <a:schemeClr val="accent2"/>
+          </a:lnRef>
+          <a:fillRef idx="2">
+            <a:schemeClr val="accent2"/>
+          </a:fillRef>
+          <a:effectRef idx="1">
+            <a:schemeClr val="accent2"/>
+          </a:effectRef>
+          <a:fontRef idx="minor">
+            <a:schemeClr val="dk1"/>
+          </a:fontRef>
+        </p:style>
+        <p:txBody>
+          <a:bodyPr rtlCol="0" anchor="ctr"/>
+          <a:lstStyle/>
+          <a:p>
+            <a:pPr algn="ctr"/>
+            <a:endParaRPr lang="en-SG"/>
+          </a:p>
+        </p:txBody>
+      </p:sp>
+      <p:sp>
+        <p:nvSpPr>
+          <p:cNvPr id="118" name="Freeform 117"/>
+          <p:cNvSpPr/>
+          <p:nvPr/>
+        </p:nvSpPr>
+        <p:spPr>
+          <a:xfrm>
+            <a:off x="3569821" y="3546077"/>
+            <a:ext cx="4126254" cy="149490"/>
+          </a:xfrm>
+          <a:custGeom>
+            <a:avLst/>
+            <a:gdLst>
+              <a:gd name="connsiteX0" fmla="*/ 0 w 3048000"/>
+              <a:gd name="connsiteY0" fmla="*/ 203200 h 203200"/>
+              <a:gd name="connsiteX1" fmla="*/ 221673 w 3048000"/>
+              <a:gd name="connsiteY1" fmla="*/ 0 h 203200"/>
+              <a:gd name="connsiteX2" fmla="*/ 3048000 w 3048000"/>
+              <a:gd name="connsiteY2" fmla="*/ 0 h 203200"/>
+            </a:gdLst>
+            <a:ahLst/>
+            <a:cxnLst>
+              <a:cxn ang="0">
+                <a:pos x="connsiteX0" y="connsiteY0"/>
+              </a:cxn>
+              <a:cxn ang="0">
+                <a:pos x="connsiteX1" y="connsiteY1"/>
+              </a:cxn>
+              <a:cxn ang="0">
+                <a:pos x="connsiteX2" y="connsiteY2"/>
+              </a:cxn>
+            </a:cxnLst>
+            <a:rect l="l" t="t" r="r" b="b"/>
+            <a:pathLst>
+              <a:path w="3048000" h="203200">
+                <a:moveTo>
+                  <a:pt x="0" y="203200"/>
+                </a:moveTo>
+                <a:lnTo>
+                  <a:pt x="221673" y="0"/>
+                </a:lnTo>
+                <a:lnTo>
+                  <a:pt x="3048000" y="0"/>
+                </a:lnTo>
+              </a:path>
+            </a:pathLst>
+          </a:custGeom>
+          <a:noFill/>
+          <a:ln w="19050">
+            <a:solidFill>
+              <a:schemeClr val="accent3"/>
+            </a:solidFill>
+            <a:prstDash val="sysDot"/>
+            <a:headEnd type="none" w="med" len="med"/>
+            <a:tailEnd type="arrow" w="med" len="med"/>
+          </a:ln>
+          <a:effectLst/>
+        </p:spPr>
+        <p:style>
+          <a:lnRef idx="1">
+            <a:schemeClr val="accent2"/>
+          </a:lnRef>
+          <a:fillRef idx="2">
+            <a:schemeClr val="accent2"/>
+          </a:fillRef>
+          <a:effectRef idx="1">
+            <a:schemeClr val="accent2"/>
+          </a:effectRef>
+          <a:fontRef idx="minor">
+            <a:schemeClr val="dk1"/>
+          </a:fontRef>
+        </p:style>
+        <p:txBody>
+          <a:bodyPr rtlCol="0" anchor="ctr"/>
+          <a:lstStyle/>
+          <a:p>
+            <a:pPr algn="ctr"/>
+            <a:endParaRPr lang="en-SG"/>
+          </a:p>
+        </p:txBody>
+      </p:sp>
+      <p:sp>
+        <p:nvSpPr>
+          <p:cNvPr id="129" name="Rectangle 62"/>
+          <p:cNvSpPr/>
+          <p:nvPr/>
+        </p:nvSpPr>
+        <p:spPr>
+          <a:xfrm>
+            <a:off x="6102699" y="1768391"/>
+            <a:ext cx="772043" cy="346760"/>
+          </a:xfrm>
+          <a:prstGeom prst="rect">
+            <a:avLst/>
+          </a:prstGeom>
+          <a:ln w="6350">
+            <a:solidFill>
+              <a:schemeClr val="accent3"/>
+            </a:solidFill>
+          </a:ln>
+          <a:effectLst/>
+        </p:spPr>
+        <p:style>
+          <a:lnRef idx="1">
+            <a:schemeClr val="accent3"/>
+          </a:lnRef>
+          <a:fillRef idx="2">
+            <a:schemeClr val="accent3"/>
+          </a:fillRef>
+          <a:effectRef idx="1">
+            <a:schemeClr val="accent3"/>
+          </a:effectRef>
+          <a:fontRef idx="minor">
+            <a:schemeClr val="dk1"/>
+          </a:fontRef>
+        </p:style>
+        <p:txBody>
+          <a:bodyPr rtlCol="0" anchor="ctr"/>
+          <a:lstStyle/>
+          <a:p>
+            <a:pPr algn="ctr"/>
+            <a:r>
+              <a:rPr lang="en-US" sz="1050" b="1" dirty="0">
+                <a:solidFill>
+                  <a:schemeClr val="accent3">
+                    <a:lumMod val="75000"/>
+                  </a:schemeClr>
+                </a:solidFill>
+              </a:rPr>
+              <a:t>{abstract}</a:t>
+            </a:r>
+            <a:br>
+              <a:rPr lang="en-US" sz="1050" b="1" dirty="0">
+                <a:solidFill>
+                  <a:schemeClr val="accent3">
+                    <a:lumMod val="75000"/>
+                  </a:schemeClr>
+                </a:solidFill>
+              </a:rPr>
+            </a:br>
+            <a:r>
+              <a:rPr lang="en-US" sz="1050" b="1" dirty="0" smtClean="0">
+                <a:solidFill>
+                  <a:schemeClr val="accent3">
+                    <a:lumMod val="75000"/>
+                  </a:schemeClr>
+                </a:solidFill>
+              </a:rPr>
+              <a:t>EntryCard</a:t>
+            </a:r>
+          </a:p>
+        </p:txBody>
+      </p:sp>
+      <p:sp>
+        <p:nvSpPr>
+          <p:cNvPr id="130" name="Isosceles Triangle 102"/>
+          <p:cNvSpPr/>
+          <p:nvPr/>
+        </p:nvSpPr>
+        <p:spPr>
+          <a:xfrm rot="10800000" flipV="1">
+            <a:off x="6353468" y="2117683"/>
+            <a:ext cx="270504" cy="175523"/>
+          </a:xfrm>
+          <a:prstGeom prst="triangle">
+            <a:avLst/>
+          </a:prstGeom>
+          <a:ln w="6350">
+            <a:solidFill>
+              <a:schemeClr val="accent3"/>
+            </a:solidFill>
+          </a:ln>
+          <a:effectLst/>
+        </p:spPr>
+        <p:style>
+          <a:lnRef idx="1">
+            <a:schemeClr val="accent3"/>
+          </a:lnRef>
+          <a:fillRef idx="2">
+            <a:schemeClr val="accent3"/>
+          </a:fillRef>
+          <a:effectRef idx="1">
+            <a:schemeClr val="accent3"/>
+          </a:effectRef>
+          <a:fontRef idx="minor">
+            <a:schemeClr val="dk1"/>
+          </a:fontRef>
+        </p:style>
+        <p:txBody>
+          <a:bodyPr rtlCol="0" anchor="ctr"/>
+          <a:lstStyle/>
+          <a:p>
+            <a:pPr algn="ctr"/>
+            <a:endParaRPr lang="en-SG" sz="1050" b="1">
+              <a:solidFill>
+                <a:srgbClr val="92D050"/>
+              </a:solidFill>
+            </a:endParaRPr>
+          </a:p>
+        </p:txBody>
+      </p:sp>
+      <p:sp>
+        <p:nvSpPr>
+          <p:cNvPr id="147" name="Rectangle 146"/>
+          <p:cNvSpPr/>
+          <p:nvPr/>
+        </p:nvSpPr>
+        <p:spPr>
+          <a:xfrm>
+            <a:off x="5415307" y="3808115"/>
+            <a:ext cx="229325" cy="160062"/>
+          </a:xfrm>
+          <a:prstGeom prst="rect">
+            <a:avLst/>
+          </a:prstGeom>
+          <a:solidFill>
+            <a:schemeClr val="accent3">
+              <a:lumMod val="20000"/>
+              <a:lumOff val="80000"/>
+              <a:alpha val="80000"/>
+            </a:schemeClr>
+          </a:solidFill>
+          <a:ln>
+            <a:noFill/>
+          </a:ln>
+          <a:effectLst>
+            <a:softEdge rad="31750"/>
+          </a:effectLst>
+        </p:spPr>
+        <p:style>
+          <a:lnRef idx="2">
+            <a:schemeClr val="accent1">
+              <a:shade val="50000"/>
+            </a:schemeClr>
+          </a:lnRef>
+          <a:fillRef idx="1">
+            <a:schemeClr val="accent1"/>
+          </a:fillRef>
+          <a:effectRef idx="0">
+            <a:schemeClr val="accent1"/>
+          </a:effectRef>
+          <a:fontRef idx="minor">
+            <a:schemeClr val="lt1"/>
+          </a:fontRef>
+        </p:style>
+        <p:txBody>
+          <a:bodyPr rtlCol="0" anchor="ctr"/>
+          <a:lstStyle/>
+          <a:p>
+            <a:pPr algn="ctr"/>
+            <a:endParaRPr lang="en-SG"/>
+          </a:p>
+        </p:txBody>
+      </p:sp>
+      <p:sp>
+        <p:nvSpPr>
+          <p:cNvPr id="148" name="Rectangle 147"/>
+          <p:cNvSpPr/>
+          <p:nvPr/>
+        </p:nvSpPr>
+        <p:spPr>
+          <a:xfrm>
+            <a:off x="5396841" y="4042546"/>
+            <a:ext cx="229325" cy="160062"/>
+          </a:xfrm>
+          <a:prstGeom prst="rect">
+            <a:avLst/>
+          </a:prstGeom>
+          <a:solidFill>
+            <a:schemeClr val="accent3">
+              <a:lumMod val="20000"/>
+              <a:lumOff val="80000"/>
+              <a:alpha val="80000"/>
+            </a:schemeClr>
+          </a:solidFill>
+          <a:ln>
+            <a:noFill/>
+          </a:ln>
+          <a:effectLst>
+            <a:softEdge rad="31750"/>
+          </a:effectLst>
+        </p:spPr>
+        <p:style>
+          <a:lnRef idx="2">
+            <a:schemeClr val="accent1">
+              <a:shade val="50000"/>
+            </a:schemeClr>
+          </a:lnRef>
+          <a:fillRef idx="1">
+            <a:schemeClr val="accent1"/>
+          </a:fillRef>
+          <a:effectRef idx="0">
+            <a:schemeClr val="accent1"/>
+          </a:effectRef>
+          <a:fontRef idx="minor">
+            <a:schemeClr val="lt1"/>
+          </a:fontRef>
+        </p:style>
+        <p:txBody>
+          <a:bodyPr rtlCol="0" anchor="ctr"/>
+          <a:lstStyle/>
+          <a:p>
+            <a:pPr algn="ctr"/>
+            <a:endParaRPr lang="en-SG"/>
+          </a:p>
+        </p:txBody>
+      </p:sp>
+      <p:cxnSp>
+        <p:nvCxnSpPr>
+          <p:cNvPr id="133" name="Elbow Connector 63"/>
+          <p:cNvCxnSpPr>
+            <a:stCxn id="130" idx="3"/>
+          </p:cNvCxnSpPr>
+          <p:nvPr/>
+        </p:nvCxnSpPr>
+        <p:spPr>
+          <a:xfrm rot="5400000">
+            <a:off x="4841986" y="2230572"/>
+            <a:ext cx="1584101" cy="1709368"/>
+          </a:xfrm>
+          <a:prstGeom prst="bentConnector2">
+            <a:avLst/>
+          </a:prstGeom>
+          <a:ln w="6350">
+            <a:solidFill>
+              <a:schemeClr val="accent3"/>
+            </a:solidFill>
+            <a:headEnd type="none" w="med" len="med"/>
+            <a:tailEnd type="none" w="med" len="med"/>
+          </a:ln>
+          <a:effectLst/>
+        </p:spPr>
+        <p:style>
+          <a:lnRef idx="1">
+            <a:schemeClr val="accent2"/>
+          </a:lnRef>
+          <a:fillRef idx="2">
+            <a:schemeClr val="accent2"/>
+          </a:fillRef>
+          <a:effectRef idx="1">
+            <a:schemeClr val="accent2"/>
+          </a:effectRef>
+          <a:fontRef idx="minor">
+            <a:schemeClr val="dk1"/>
+          </a:fontRef>
+        </p:style>
+      </p:cxnSp>
+      <p:cxnSp>
+        <p:nvCxnSpPr>
+          <p:cNvPr id="138" name="Elbow Connector 63"/>
+          <p:cNvCxnSpPr>
+            <a:stCxn id="130" idx="3"/>
+          </p:cNvCxnSpPr>
+          <p:nvPr/>
+        </p:nvCxnSpPr>
+        <p:spPr>
+          <a:xfrm rot="5400000">
+            <a:off x="4823820" y="2450756"/>
+            <a:ext cx="1822450" cy="1507350"/>
+          </a:xfrm>
+          <a:prstGeom prst="bentConnector3">
+            <a:avLst>
+              <a:gd name="adj1" fmla="val 99846"/>
+            </a:avLst>
+          </a:prstGeom>
+          <a:ln w="6350">
+            <a:solidFill>
+              <a:schemeClr val="accent3"/>
+            </a:solidFill>
+            <a:headEnd type="none" w="med" len="med"/>
+            <a:tailEnd type="none" w="med" len="med"/>
+          </a:ln>
+          <a:effectLst/>
+        </p:spPr>
+        <p:style>
+          <a:lnRef idx="1">
+            <a:schemeClr val="accent2"/>
+          </a:lnRef>
+          <a:fillRef idx="2">
+            <a:schemeClr val="accent2"/>
+          </a:fillRef>
+          <a:effectRef idx="1">
+            <a:schemeClr val="accent2"/>
+          </a:effectRef>
+          <a:fontRef idx="minor">
+            <a:schemeClr val="dk1"/>
+          </a:fontRef>
+        </p:style>
+      </p:cxnSp>
+      <p:sp>
+        <p:nvSpPr>
+          <p:cNvPr id="153" name="Rectangle 152"/>
+          <p:cNvSpPr/>
+          <p:nvPr/>
+        </p:nvSpPr>
+        <p:spPr>
+          <a:xfrm>
+            <a:off x="5421813" y="4691378"/>
+            <a:ext cx="229325" cy="160062"/>
+          </a:xfrm>
+          <a:prstGeom prst="rect">
+            <a:avLst/>
+          </a:prstGeom>
+          <a:solidFill>
+            <a:schemeClr val="accent3">
+              <a:lumMod val="20000"/>
+              <a:lumOff val="80000"/>
+              <a:alpha val="80000"/>
+            </a:schemeClr>
+          </a:solidFill>
+          <a:ln>
+            <a:noFill/>
+          </a:ln>
+          <a:effectLst>
+            <a:softEdge rad="31750"/>
+          </a:effectLst>
+        </p:spPr>
+        <p:style>
+          <a:lnRef idx="2">
+            <a:schemeClr val="accent1">
+              <a:shade val="50000"/>
+            </a:schemeClr>
+          </a:lnRef>
+          <a:fillRef idx="1">
+            <a:schemeClr val="accent1"/>
+          </a:fillRef>
+          <a:effectRef idx="0">
+            <a:schemeClr val="accent1"/>
+          </a:effectRef>
+          <a:fontRef idx="minor">
+            <a:schemeClr val="lt1"/>
+          </a:fontRef>
+        </p:style>
+        <p:txBody>
+          <a:bodyPr rtlCol="0" anchor="ctr"/>
+          <a:lstStyle/>
+          <a:p>
+            <a:pPr algn="ctr"/>
+            <a:endParaRPr lang="en-SG"/>
+          </a:p>
+        </p:txBody>
+      </p:sp>
+      <p:cxnSp>
+        <p:nvCxnSpPr>
+          <p:cNvPr id="149" name="Elbow Connector 63"/>
+          <p:cNvCxnSpPr>
+            <a:stCxn id="130" idx="3"/>
+          </p:cNvCxnSpPr>
+          <p:nvPr/>
+        </p:nvCxnSpPr>
+        <p:spPr>
+          <a:xfrm rot="5400000">
+            <a:off x="4507888" y="2769956"/>
+            <a:ext cx="2457582" cy="1504083"/>
+          </a:xfrm>
+          <a:prstGeom prst="bentConnector3">
+            <a:avLst>
+              <a:gd name="adj1" fmla="val 100433"/>
+            </a:avLst>
+          </a:prstGeom>
+          <a:ln w="6350">
+            <a:solidFill>
+              <a:schemeClr val="accent3"/>
+            </a:solidFill>
+            <a:headEnd type="none" w="med" len="med"/>
+            <a:tailEnd type="none" w="med" len="med"/>
+          </a:ln>
+          <a:effectLst/>
+        </p:spPr>
+        <p:style>
+          <a:lnRef idx="1">
+            <a:schemeClr val="accent2"/>
+          </a:lnRef>
+          <a:fillRef idx="2">
+            <a:schemeClr val="accent2"/>
+          </a:fillRef>
+          <a:effectRef idx="1">
+            <a:schemeClr val="accent2"/>
+          </a:effectRef>
+          <a:fontRef idx="minor">
+            <a:schemeClr val="dk1"/>
+          </a:fontRef>
+        </p:style>
+      </p:cxnSp>
+      <p:sp>
+        <p:nvSpPr>
+          <p:cNvPr id="158" name="Rectangle 157"/>
+          <p:cNvSpPr/>
+          <p:nvPr/>
+        </p:nvSpPr>
+        <p:spPr>
+          <a:xfrm>
+            <a:off x="5419193" y="4910273"/>
+            <a:ext cx="229325" cy="160062"/>
+          </a:xfrm>
+          <a:prstGeom prst="rect">
+            <a:avLst/>
+          </a:prstGeom>
+          <a:solidFill>
+            <a:schemeClr val="accent3">
+              <a:lumMod val="20000"/>
+              <a:lumOff val="80000"/>
+              <a:alpha val="80000"/>
+            </a:schemeClr>
+          </a:solidFill>
+          <a:ln>
+            <a:noFill/>
+          </a:ln>
+          <a:effectLst>
+            <a:softEdge rad="31750"/>
+          </a:effectLst>
+        </p:spPr>
+        <p:style>
+          <a:lnRef idx="2">
+            <a:schemeClr val="accent1">
+              <a:shade val="50000"/>
+            </a:schemeClr>
+          </a:lnRef>
+          <a:fillRef idx="1">
+            <a:schemeClr val="accent1"/>
+          </a:fillRef>
+          <a:effectRef idx="0">
+            <a:schemeClr val="accent1"/>
+          </a:effectRef>
+          <a:fontRef idx="minor">
+            <a:schemeClr val="lt1"/>
+          </a:fontRef>
+        </p:style>
+        <p:txBody>
+          <a:bodyPr rtlCol="0" anchor="ctr"/>
+          <a:lstStyle/>
+          <a:p>
+            <a:pPr algn="ctr"/>
+            <a:endParaRPr lang="en-SG"/>
+          </a:p>
+        </p:txBody>
+      </p:sp>
+      <p:cxnSp>
+        <p:nvCxnSpPr>
+          <p:cNvPr id="154" name="Elbow Connector 63"/>
+          <p:cNvCxnSpPr>
+            <a:stCxn id="130" idx="3"/>
+          </p:cNvCxnSpPr>
+          <p:nvPr/>
+        </p:nvCxnSpPr>
+        <p:spPr>
+          <a:xfrm rot="5400000">
+            <a:off x="4575465" y="3077047"/>
+            <a:ext cx="2697096" cy="1129415"/>
+          </a:xfrm>
+          <a:prstGeom prst="bentConnector3">
+            <a:avLst>
+              <a:gd name="adj1" fmla="val 100292"/>
+            </a:avLst>
+          </a:prstGeom>
+          <a:ln w="6350">
+            <a:solidFill>
+              <a:schemeClr val="accent3"/>
+            </a:solidFill>
+            <a:headEnd type="none" w="med" len="med"/>
+            <a:tailEnd type="none" w="med" len="med"/>
+          </a:ln>
+          <a:effectLst/>
+        </p:spPr>
+        <p:style>
+          <a:lnRef idx="1">
+            <a:schemeClr val="accent2"/>
+          </a:lnRef>
+          <a:fillRef idx="2">
+            <a:schemeClr val="accent2"/>
+          </a:fillRef>
+          <a:effectRef idx="1">
+            <a:schemeClr val="accent2"/>
+          </a:effectRef>
+          <a:fontRef idx="minor">
+            <a:schemeClr val="dk1"/>
+          </a:fontRef>
+        </p:style>
+      </p:cxnSp>
+      <p:sp>
+        <p:nvSpPr>
+          <p:cNvPr id="163" name="Rectangle 162"/>
+          <p:cNvSpPr/>
+          <p:nvPr/>
+        </p:nvSpPr>
+        <p:spPr>
+          <a:xfrm>
+            <a:off x="5416334" y="5497388"/>
+            <a:ext cx="229325" cy="160062"/>
+          </a:xfrm>
+          <a:prstGeom prst="rect">
+            <a:avLst/>
+          </a:prstGeom>
+          <a:solidFill>
+            <a:schemeClr val="accent3">
+              <a:lumMod val="20000"/>
+              <a:lumOff val="80000"/>
+              <a:alpha val="80000"/>
+            </a:schemeClr>
+          </a:solidFill>
+          <a:ln>
+            <a:noFill/>
+          </a:ln>
+          <a:effectLst>
+            <a:softEdge rad="31750"/>
+          </a:effectLst>
+        </p:spPr>
+        <p:style>
+          <a:lnRef idx="2">
+            <a:schemeClr val="accent1">
+              <a:shade val="50000"/>
+            </a:schemeClr>
+          </a:lnRef>
+          <a:fillRef idx="1">
+            <a:schemeClr val="accent1"/>
+          </a:fillRef>
+          <a:effectRef idx="0">
+            <a:schemeClr val="accent1"/>
+          </a:effectRef>
+          <a:fontRef idx="minor">
+            <a:schemeClr val="lt1"/>
+          </a:fontRef>
+        </p:style>
+        <p:txBody>
+          <a:bodyPr rtlCol="0" anchor="ctr"/>
+          <a:lstStyle/>
+          <a:p>
+            <a:pPr algn="ctr"/>
+            <a:endParaRPr lang="en-SG"/>
+          </a:p>
+        </p:txBody>
+      </p:sp>
+      <p:cxnSp>
+        <p:nvCxnSpPr>
+          <p:cNvPr id="159" name="Elbow Connector 63"/>
+          <p:cNvCxnSpPr>
+            <a:stCxn id="130" idx="3"/>
+          </p:cNvCxnSpPr>
+          <p:nvPr/>
+        </p:nvCxnSpPr>
+        <p:spPr>
+          <a:xfrm rot="5400000">
+            <a:off x="4199421" y="3285059"/>
+            <a:ext cx="3281153" cy="1297446"/>
+          </a:xfrm>
+          <a:prstGeom prst="bentConnector3">
+            <a:avLst>
+              <a:gd name="adj1" fmla="val 100189"/>
+            </a:avLst>
+          </a:prstGeom>
+          <a:ln w="6350">
+            <a:solidFill>
+              <a:schemeClr val="accent3"/>
+            </a:solidFill>
+            <a:headEnd type="none" w="med" len="med"/>
+            <a:tailEnd type="none" w="med" len="med"/>
+          </a:ln>
+          <a:effectLst/>
+        </p:spPr>
+        <p:style>
+          <a:lnRef idx="1">
+            <a:schemeClr val="accent2"/>
+          </a:lnRef>
+          <a:fillRef idx="2">
+            <a:schemeClr val="accent2"/>
+          </a:fillRef>
+          <a:effectRef idx="1">
+            <a:schemeClr val="accent2"/>
+          </a:effectRef>
+          <a:fontRef idx="minor">
+            <a:schemeClr val="dk1"/>
+          </a:fontRef>
+        </p:style>
+      </p:cxnSp>
     </p:spTree>
     <p:extLst>
       <p:ext uri="{BB962C8B-B14F-4D97-AF65-F5344CB8AC3E}">

</xml_diff>

<commit_message>
Update UI component class diagram
</commit_message>
<xml_diff>
--- a/docs/diagrams/UiComponentClassDiagram.pptx
+++ b/docs/diagrams/UiComponentClassDiagram.pptx
@@ -4331,17 +4331,7 @@
                   </a:schemeClr>
                 </a:solidFill>
               </a:rPr>
-              <a:t>Event</a:t>
-            </a:r>
-            <a:r>
-              <a:rPr lang="en-US" sz="1050" b="1" dirty="0" smtClean="0">
-                <a:solidFill>
-                  <a:schemeClr val="accent3">
-                    <a:lumMod val="75000"/>
-                  </a:schemeClr>
-                </a:solidFill>
-              </a:rPr>
-              <a:t>Card</a:t>
+              <a:t>EventCard</a:t>
             </a:r>
             <a:endParaRPr lang="en-SG" sz="1050" b="1" dirty="0">
               <a:solidFill>
@@ -5360,7 +5350,7 @@
         </p:nvSpPr>
         <p:spPr>
           <a:xfrm>
-            <a:off x="5435896" y="2743200"/>
+            <a:off x="5421747" y="2745702"/>
             <a:ext cx="229325" cy="166560"/>
           </a:xfrm>
           <a:prstGeom prst="rect">
@@ -5394,6 +5384,1822 @@
           </a:effectRef>
           <a:fontRef idx="minor">
             <a:schemeClr val="lt1"/>
+          </a:fontRef>
+        </p:style>
+        <p:txBody>
+          <a:bodyPr rtlCol="0" anchor="ctr"/>
+          <a:lstStyle/>
+          <a:p>
+            <a:pPr algn="ctr"/>
+            <a:endParaRPr lang="en-SG"/>
+          </a:p>
+        </p:txBody>
+      </p:sp>
+      <p:sp>
+        <p:nvSpPr>
+          <p:cNvPr id="144" name="Rectangle 143"/>
+          <p:cNvSpPr/>
+          <p:nvPr/>
+        </p:nvSpPr>
+        <p:spPr>
+          <a:xfrm>
+            <a:off x="5415307" y="3468965"/>
+            <a:ext cx="229325" cy="160062"/>
+          </a:xfrm>
+          <a:prstGeom prst="rect">
+            <a:avLst/>
+          </a:prstGeom>
+          <a:solidFill>
+            <a:schemeClr val="accent3">
+              <a:lumMod val="20000"/>
+              <a:lumOff val="80000"/>
+              <a:alpha val="80000"/>
+            </a:schemeClr>
+          </a:solidFill>
+          <a:ln>
+            <a:noFill/>
+          </a:ln>
+          <a:effectLst>
+            <a:softEdge rad="31750"/>
+          </a:effectLst>
+        </p:spPr>
+        <p:style>
+          <a:lnRef idx="2">
+            <a:schemeClr val="accent1">
+              <a:shade val="50000"/>
+            </a:schemeClr>
+          </a:lnRef>
+          <a:fillRef idx="1">
+            <a:schemeClr val="accent1"/>
+          </a:fillRef>
+          <a:effectRef idx="0">
+            <a:schemeClr val="accent1"/>
+          </a:effectRef>
+          <a:fontRef idx="minor">
+            <a:schemeClr val="lt1"/>
+          </a:fontRef>
+        </p:style>
+        <p:txBody>
+          <a:bodyPr rtlCol="0" anchor="ctr"/>
+          <a:lstStyle/>
+          <a:p>
+            <a:pPr algn="ctr"/>
+            <a:endParaRPr lang="en-SG"/>
+          </a:p>
+        </p:txBody>
+      </p:sp>
+      <p:sp>
+        <p:nvSpPr>
+          <p:cNvPr id="55" name="Rectangle 11"/>
+          <p:cNvSpPr/>
+          <p:nvPr/>
+        </p:nvSpPr>
+        <p:spPr>
+          <a:xfrm>
+            <a:off x="2590799" y="4592494"/>
+            <a:ext cx="1221176" cy="236841"/>
+          </a:xfrm>
+          <a:prstGeom prst="rect">
+            <a:avLst/>
+          </a:prstGeom>
+          <a:ln w="19050">
+            <a:solidFill>
+              <a:schemeClr val="accent3"/>
+            </a:solidFill>
+          </a:ln>
+          <a:effectLst/>
+        </p:spPr>
+        <p:style>
+          <a:lnRef idx="1">
+            <a:schemeClr val="accent3"/>
+          </a:lnRef>
+          <a:fillRef idx="2">
+            <a:schemeClr val="accent3"/>
+          </a:fillRef>
+          <a:effectRef idx="1">
+            <a:schemeClr val="accent3"/>
+          </a:effectRef>
+          <a:fontRef idx="minor">
+            <a:schemeClr val="dk1"/>
+          </a:fontRef>
+        </p:style>
+        <p:txBody>
+          <a:bodyPr rtlCol="0" anchor="ctr"/>
+          <a:lstStyle/>
+          <a:p>
+            <a:pPr algn="ctr"/>
+            <a:r>
+              <a:rPr lang="en-US" sz="1050" b="1" dirty="0" smtClean="0">
+                <a:solidFill>
+                  <a:schemeClr val="accent3">
+                    <a:lumMod val="75000"/>
+                  </a:schemeClr>
+                </a:solidFill>
+              </a:rPr>
+              <a:t>DeadlineListPanel</a:t>
+            </a:r>
+            <a:endParaRPr lang="en-SG" sz="1050" b="1" dirty="0">
+              <a:solidFill>
+                <a:schemeClr val="accent3">
+                  <a:lumMod val="75000"/>
+                </a:schemeClr>
+              </a:solidFill>
+            </a:endParaRPr>
+          </a:p>
+        </p:txBody>
+      </p:sp>
+      <p:sp>
+        <p:nvSpPr>
+          <p:cNvPr id="56" name="Rectangle 11"/>
+          <p:cNvSpPr/>
+          <p:nvPr/>
+        </p:nvSpPr>
+        <p:spPr>
+          <a:xfrm>
+            <a:off x="2583424" y="5385148"/>
+            <a:ext cx="1379495" cy="236841"/>
+          </a:xfrm>
+          <a:prstGeom prst="rect">
+            <a:avLst/>
+          </a:prstGeom>
+          <a:ln w="19050">
+            <a:solidFill>
+              <a:schemeClr val="accent3"/>
+            </a:solidFill>
+          </a:ln>
+          <a:effectLst/>
+        </p:spPr>
+        <p:style>
+          <a:lnRef idx="1">
+            <a:schemeClr val="accent3"/>
+          </a:lnRef>
+          <a:fillRef idx="2">
+            <a:schemeClr val="accent3"/>
+          </a:fillRef>
+          <a:effectRef idx="1">
+            <a:schemeClr val="accent3"/>
+          </a:effectRef>
+          <a:fontRef idx="minor">
+            <a:schemeClr val="dk1"/>
+          </a:fontRef>
+        </p:style>
+        <p:txBody>
+          <a:bodyPr rtlCol="0" anchor="ctr"/>
+          <a:lstStyle/>
+          <a:p>
+            <a:pPr algn="ctr"/>
+            <a:r>
+              <a:rPr lang="en-US" sz="1050" b="1" dirty="0" smtClean="0">
+                <a:solidFill>
+                  <a:schemeClr val="accent3">
+                    <a:lumMod val="75000"/>
+                  </a:schemeClr>
+                </a:solidFill>
+              </a:rPr>
+              <a:t>FloatingTaskListPanel</a:t>
+            </a:r>
+            <a:endParaRPr lang="en-SG" sz="1050" b="1" dirty="0">
+              <a:solidFill>
+                <a:schemeClr val="accent3">
+                  <a:lumMod val="75000"/>
+                </a:schemeClr>
+              </a:solidFill>
+            </a:endParaRPr>
+          </a:p>
+        </p:txBody>
+      </p:sp>
+      <p:cxnSp>
+        <p:nvCxnSpPr>
+          <p:cNvPr id="57" name="Elbow Connector 63"/>
+          <p:cNvCxnSpPr>
+            <a:stCxn id="39" idx="2"/>
+            <a:endCxn id="55" idx="1"/>
+          </p:cNvCxnSpPr>
+          <p:nvPr/>
+        </p:nvCxnSpPr>
+        <p:spPr>
+          <a:xfrm rot="16200000" flipH="1">
+            <a:off x="1582017" y="3702133"/>
+            <a:ext cx="1842890" cy="174673"/>
+          </a:xfrm>
+          <a:prstGeom prst="bentConnector2">
+            <a:avLst/>
+          </a:prstGeom>
+          <a:ln w="19050">
+            <a:solidFill>
+              <a:schemeClr val="accent3"/>
+            </a:solidFill>
+            <a:headEnd type="none" w="med" len="med"/>
+            <a:tailEnd type="arrow" w="med" len="med"/>
+          </a:ln>
+          <a:effectLst/>
+        </p:spPr>
+        <p:style>
+          <a:lnRef idx="1">
+            <a:schemeClr val="accent2"/>
+          </a:lnRef>
+          <a:fillRef idx="2">
+            <a:schemeClr val="accent2"/>
+          </a:fillRef>
+          <a:effectRef idx="1">
+            <a:schemeClr val="accent2"/>
+          </a:effectRef>
+          <a:fontRef idx="minor">
+            <a:schemeClr val="dk1"/>
+          </a:fontRef>
+        </p:style>
+      </p:cxnSp>
+      <p:cxnSp>
+        <p:nvCxnSpPr>
+          <p:cNvPr id="60" name="Elbow Connector 63"/>
+          <p:cNvCxnSpPr>
+            <a:stCxn id="39" idx="2"/>
+            <a:endCxn id="56" idx="1"/>
+          </p:cNvCxnSpPr>
+          <p:nvPr/>
+        </p:nvCxnSpPr>
+        <p:spPr>
+          <a:xfrm rot="16200000" flipH="1">
+            <a:off x="1182003" y="4102148"/>
+            <a:ext cx="2635544" cy="167298"/>
+          </a:xfrm>
+          <a:prstGeom prst="bentConnector2">
+            <a:avLst/>
+          </a:prstGeom>
+          <a:ln w="19050">
+            <a:solidFill>
+              <a:schemeClr val="accent3"/>
+            </a:solidFill>
+            <a:headEnd type="none" w="med" len="med"/>
+            <a:tailEnd type="arrow" w="med" len="med"/>
+          </a:ln>
+          <a:effectLst/>
+        </p:spPr>
+        <p:style>
+          <a:lnRef idx="1">
+            <a:schemeClr val="accent2"/>
+          </a:lnRef>
+          <a:fillRef idx="2">
+            <a:schemeClr val="accent2"/>
+          </a:fillRef>
+          <a:effectRef idx="1">
+            <a:schemeClr val="accent2"/>
+          </a:effectRef>
+          <a:fontRef idx="minor">
+            <a:schemeClr val="dk1"/>
+          </a:fontRef>
+        </p:style>
+      </p:cxnSp>
+      <p:sp>
+        <p:nvSpPr>
+          <p:cNvPr id="69" name="Rectangle 11"/>
+          <p:cNvSpPr/>
+          <p:nvPr/>
+        </p:nvSpPr>
+        <p:spPr>
+          <a:xfrm>
+            <a:off x="3941503" y="4754078"/>
+            <a:ext cx="1040906" cy="236841"/>
+          </a:xfrm>
+          <a:prstGeom prst="rect">
+            <a:avLst/>
+          </a:prstGeom>
+          <a:ln w="19050">
+            <a:solidFill>
+              <a:schemeClr val="accent3"/>
+            </a:solidFill>
+          </a:ln>
+          <a:effectLst/>
+        </p:spPr>
+        <p:style>
+          <a:lnRef idx="1">
+            <a:schemeClr val="accent3"/>
+          </a:lnRef>
+          <a:fillRef idx="2">
+            <a:schemeClr val="accent3"/>
+          </a:fillRef>
+          <a:effectRef idx="1">
+            <a:schemeClr val="accent3"/>
+          </a:effectRef>
+          <a:fontRef idx="minor">
+            <a:schemeClr val="dk1"/>
+          </a:fontRef>
+        </p:style>
+        <p:txBody>
+          <a:bodyPr rtlCol="0" anchor="ctr"/>
+          <a:lstStyle/>
+          <a:p>
+            <a:pPr algn="ctr"/>
+            <a:r>
+              <a:rPr lang="en-US" sz="1050" b="1" dirty="0" smtClean="0">
+                <a:solidFill>
+                  <a:schemeClr val="accent3">
+                    <a:lumMod val="75000"/>
+                  </a:schemeClr>
+                </a:solidFill>
+              </a:rPr>
+              <a:t>DeadlineCard</a:t>
+            </a:r>
+            <a:endParaRPr lang="en-SG" sz="1050" b="1" dirty="0">
+              <a:solidFill>
+                <a:schemeClr val="accent3">
+                  <a:lumMod val="75000"/>
+                </a:schemeClr>
+              </a:solidFill>
+            </a:endParaRPr>
+          </a:p>
+        </p:txBody>
+      </p:sp>
+      <p:cxnSp>
+        <p:nvCxnSpPr>
+          <p:cNvPr id="71" name="Elbow Connector 70"/>
+          <p:cNvCxnSpPr>
+            <a:stCxn id="55" idx="2"/>
+            <a:endCxn id="69" idx="1"/>
+          </p:cNvCxnSpPr>
+          <p:nvPr/>
+        </p:nvCxnSpPr>
+        <p:spPr>
+          <a:xfrm rot="16200000" flipH="1">
+            <a:off x="3549863" y="4480859"/>
+            <a:ext cx="43164" cy="740116"/>
+          </a:xfrm>
+          <a:prstGeom prst="bentConnector2">
+            <a:avLst/>
+          </a:prstGeom>
+          <a:ln w="19050">
+            <a:solidFill>
+              <a:schemeClr val="accent3"/>
+            </a:solidFill>
+            <a:headEnd type="none" w="med" len="med"/>
+            <a:tailEnd type="arrow" w="med" len="med"/>
+          </a:ln>
+          <a:effectLst/>
+        </p:spPr>
+        <p:style>
+          <a:lnRef idx="1">
+            <a:schemeClr val="accent2"/>
+          </a:lnRef>
+          <a:fillRef idx="2">
+            <a:schemeClr val="accent2"/>
+          </a:fillRef>
+          <a:effectRef idx="1">
+            <a:schemeClr val="accent2"/>
+          </a:effectRef>
+          <a:fontRef idx="minor">
+            <a:schemeClr val="dk1"/>
+          </a:fontRef>
+        </p:style>
+      </p:cxnSp>
+      <p:sp>
+        <p:nvSpPr>
+          <p:cNvPr id="75" name="Rectangle 11"/>
+          <p:cNvSpPr/>
+          <p:nvPr/>
+        </p:nvSpPr>
+        <p:spPr>
+          <a:xfrm>
+            <a:off x="3982871" y="5574357"/>
+            <a:ext cx="1208922" cy="236841"/>
+          </a:xfrm>
+          <a:prstGeom prst="rect">
+            <a:avLst/>
+          </a:prstGeom>
+          <a:ln w="19050">
+            <a:solidFill>
+              <a:schemeClr val="accent3"/>
+            </a:solidFill>
+          </a:ln>
+          <a:effectLst/>
+        </p:spPr>
+        <p:style>
+          <a:lnRef idx="1">
+            <a:schemeClr val="accent3"/>
+          </a:lnRef>
+          <a:fillRef idx="2">
+            <a:schemeClr val="accent3"/>
+          </a:fillRef>
+          <a:effectRef idx="1">
+            <a:schemeClr val="accent3"/>
+          </a:effectRef>
+          <a:fontRef idx="minor">
+            <a:schemeClr val="dk1"/>
+          </a:fontRef>
+        </p:style>
+        <p:txBody>
+          <a:bodyPr rtlCol="0" anchor="ctr"/>
+          <a:lstStyle/>
+          <a:p>
+            <a:pPr algn="ctr"/>
+            <a:r>
+              <a:rPr lang="en-US" sz="1050" b="1" dirty="0" smtClean="0">
+                <a:solidFill>
+                  <a:schemeClr val="accent3">
+                    <a:lumMod val="75000"/>
+                  </a:schemeClr>
+                </a:solidFill>
+              </a:rPr>
+              <a:t>FloatingTaskCard</a:t>
+            </a:r>
+            <a:endParaRPr lang="en-SG" sz="1050" b="1" dirty="0">
+              <a:solidFill>
+                <a:schemeClr val="accent3">
+                  <a:lumMod val="75000"/>
+                </a:schemeClr>
+              </a:solidFill>
+            </a:endParaRPr>
+          </a:p>
+        </p:txBody>
+      </p:sp>
+      <p:cxnSp>
+        <p:nvCxnSpPr>
+          <p:cNvPr id="78" name="Elbow Connector 77"/>
+          <p:cNvCxnSpPr>
+            <a:stCxn id="56" idx="2"/>
+            <a:endCxn id="75" idx="1"/>
+          </p:cNvCxnSpPr>
+          <p:nvPr/>
+        </p:nvCxnSpPr>
+        <p:spPr>
+          <a:xfrm rot="16200000" flipH="1">
+            <a:off x="3592627" y="5302533"/>
+            <a:ext cx="70789" cy="709699"/>
+          </a:xfrm>
+          <a:prstGeom prst="bentConnector2">
+            <a:avLst/>
+          </a:prstGeom>
+          <a:ln w="19050">
+            <a:solidFill>
+              <a:schemeClr val="accent3"/>
+            </a:solidFill>
+            <a:headEnd type="none" w="med" len="med"/>
+            <a:tailEnd type="arrow" w="med" len="med"/>
+          </a:ln>
+          <a:effectLst/>
+        </p:spPr>
+        <p:style>
+          <a:lnRef idx="1">
+            <a:schemeClr val="accent2"/>
+          </a:lnRef>
+          <a:fillRef idx="2">
+            <a:schemeClr val="accent2"/>
+          </a:fillRef>
+          <a:effectRef idx="1">
+            <a:schemeClr val="accent2"/>
+          </a:effectRef>
+          <a:fontRef idx="minor">
+            <a:schemeClr val="dk1"/>
+          </a:fontRef>
+        </p:style>
+      </p:cxnSp>
+      <p:sp>
+        <p:nvSpPr>
+          <p:cNvPr id="95" name="Rectangle 11"/>
+          <p:cNvSpPr/>
+          <p:nvPr/>
+        </p:nvSpPr>
+        <p:spPr>
+          <a:xfrm>
+            <a:off x="3941503" y="4990918"/>
+            <a:ext cx="1417801" cy="236841"/>
+          </a:xfrm>
+          <a:prstGeom prst="rect">
+            <a:avLst/>
+          </a:prstGeom>
+          <a:ln w="19050">
+            <a:solidFill>
+              <a:schemeClr val="accent3"/>
+            </a:solidFill>
+          </a:ln>
+          <a:effectLst/>
+        </p:spPr>
+        <p:style>
+          <a:lnRef idx="1">
+            <a:schemeClr val="accent3"/>
+          </a:lnRef>
+          <a:fillRef idx="2">
+            <a:schemeClr val="accent3"/>
+          </a:fillRef>
+          <a:effectRef idx="1">
+            <a:schemeClr val="accent3"/>
+          </a:effectRef>
+          <a:fontRef idx="minor">
+            <a:schemeClr val="dk1"/>
+          </a:fontRef>
+        </p:style>
+        <p:txBody>
+          <a:bodyPr rtlCol="0" anchor="ctr"/>
+          <a:lstStyle/>
+          <a:p>
+            <a:pPr algn="ctr"/>
+            <a:r>
+              <a:rPr lang="en-US" sz="1050" b="1" dirty="0" smtClean="0">
+                <a:solidFill>
+                  <a:schemeClr val="accent3">
+                    <a:lumMod val="75000"/>
+                  </a:schemeClr>
+                </a:solidFill>
+              </a:rPr>
+              <a:t>DeadlineOverdueCard</a:t>
+            </a:r>
+            <a:endParaRPr lang="en-SG" sz="1050" b="1" dirty="0">
+              <a:solidFill>
+                <a:schemeClr val="accent3">
+                  <a:lumMod val="75000"/>
+                </a:schemeClr>
+              </a:solidFill>
+            </a:endParaRPr>
+          </a:p>
+        </p:txBody>
+      </p:sp>
+      <p:cxnSp>
+        <p:nvCxnSpPr>
+          <p:cNvPr id="96" name="Elbow Connector 95"/>
+          <p:cNvCxnSpPr>
+            <a:stCxn id="55" idx="2"/>
+            <a:endCxn id="95" idx="1"/>
+          </p:cNvCxnSpPr>
+          <p:nvPr/>
+        </p:nvCxnSpPr>
+        <p:spPr>
+          <a:xfrm rot="16200000" flipH="1">
+            <a:off x="3431443" y="4599279"/>
+            <a:ext cx="280004" cy="740116"/>
+          </a:xfrm>
+          <a:prstGeom prst="bentConnector2">
+            <a:avLst/>
+          </a:prstGeom>
+          <a:ln w="19050">
+            <a:solidFill>
+              <a:schemeClr val="accent3"/>
+            </a:solidFill>
+            <a:headEnd type="none" w="med" len="med"/>
+            <a:tailEnd type="arrow" w="med" len="med"/>
+          </a:ln>
+          <a:effectLst/>
+        </p:spPr>
+        <p:style>
+          <a:lnRef idx="1">
+            <a:schemeClr val="accent2"/>
+          </a:lnRef>
+          <a:fillRef idx="2">
+            <a:schemeClr val="accent2"/>
+          </a:fillRef>
+          <a:effectRef idx="1">
+            <a:schemeClr val="accent2"/>
+          </a:effectRef>
+          <a:fontRef idx="minor">
+            <a:schemeClr val="dk1"/>
+          </a:fontRef>
+        </p:style>
+      </p:cxnSp>
+      <p:sp>
+        <p:nvSpPr>
+          <p:cNvPr id="100" name="Rectangle 11"/>
+          <p:cNvSpPr/>
+          <p:nvPr/>
+        </p:nvSpPr>
+        <p:spPr>
+          <a:xfrm>
+            <a:off x="3735954" y="4120582"/>
+            <a:ext cx="1247644" cy="236841"/>
+          </a:xfrm>
+          <a:prstGeom prst="rect">
+            <a:avLst/>
+          </a:prstGeom>
+          <a:ln w="19050">
+            <a:solidFill>
+              <a:schemeClr val="accent3"/>
+            </a:solidFill>
+          </a:ln>
+          <a:effectLst/>
+        </p:spPr>
+        <p:style>
+          <a:lnRef idx="1">
+            <a:schemeClr val="accent3"/>
+          </a:lnRef>
+          <a:fillRef idx="2">
+            <a:schemeClr val="accent3"/>
+          </a:fillRef>
+          <a:effectRef idx="1">
+            <a:schemeClr val="accent3"/>
+          </a:effectRef>
+          <a:fontRef idx="minor">
+            <a:schemeClr val="dk1"/>
+          </a:fontRef>
+        </p:style>
+        <p:txBody>
+          <a:bodyPr rtlCol="0" anchor="ctr"/>
+          <a:lstStyle/>
+          <a:p>
+            <a:pPr algn="ctr"/>
+            <a:r>
+              <a:rPr lang="en-US" sz="1050" b="1" dirty="0" smtClean="0">
+                <a:solidFill>
+                  <a:schemeClr val="accent3">
+                    <a:lumMod val="75000"/>
+                  </a:schemeClr>
+                </a:solidFill>
+              </a:rPr>
+              <a:t>EventOverdueCard</a:t>
+            </a:r>
+            <a:endParaRPr lang="en-SG" sz="1050" b="1" dirty="0">
+              <a:solidFill>
+                <a:schemeClr val="accent3">
+                  <a:lumMod val="75000"/>
+                </a:schemeClr>
+              </a:solidFill>
+            </a:endParaRPr>
+          </a:p>
+        </p:txBody>
+      </p:sp>
+      <p:cxnSp>
+        <p:nvCxnSpPr>
+          <p:cNvPr id="101" name="Elbow Connector 100"/>
+          <p:cNvCxnSpPr>
+            <a:stCxn id="36" idx="2"/>
+            <a:endCxn id="100" idx="1"/>
+          </p:cNvCxnSpPr>
+          <p:nvPr/>
+        </p:nvCxnSpPr>
+        <p:spPr>
+          <a:xfrm rot="16200000" flipH="1">
+            <a:off x="3284060" y="3787108"/>
+            <a:ext cx="303477" cy="600312"/>
+          </a:xfrm>
+          <a:prstGeom prst="bentConnector2">
+            <a:avLst/>
+          </a:prstGeom>
+          <a:ln w="19050">
+            <a:solidFill>
+              <a:schemeClr val="accent3"/>
+            </a:solidFill>
+            <a:headEnd type="none" w="med" len="med"/>
+            <a:tailEnd type="arrow" w="med" len="med"/>
+          </a:ln>
+          <a:effectLst/>
+        </p:spPr>
+        <p:style>
+          <a:lnRef idx="1">
+            <a:schemeClr val="accent2"/>
+          </a:lnRef>
+          <a:fillRef idx="2">
+            <a:schemeClr val="accent2"/>
+          </a:fillRef>
+          <a:effectRef idx="1">
+            <a:schemeClr val="accent2"/>
+          </a:effectRef>
+          <a:fontRef idx="minor">
+            <a:schemeClr val="dk1"/>
+          </a:fontRef>
+        </p:style>
+      </p:cxnSp>
+      <p:sp>
+        <p:nvSpPr>
+          <p:cNvPr id="127" name="Rectangle 126"/>
+          <p:cNvSpPr/>
+          <p:nvPr/>
+        </p:nvSpPr>
+        <p:spPr>
+          <a:xfrm>
+            <a:off x="5413156" y="4376270"/>
+            <a:ext cx="229325" cy="160062"/>
+          </a:xfrm>
+          <a:prstGeom prst="rect">
+            <a:avLst/>
+          </a:prstGeom>
+          <a:solidFill>
+            <a:schemeClr val="accent3">
+              <a:lumMod val="20000"/>
+              <a:lumOff val="80000"/>
+              <a:alpha val="80000"/>
+            </a:schemeClr>
+          </a:solidFill>
+          <a:ln>
+            <a:noFill/>
+          </a:ln>
+          <a:effectLst>
+            <a:softEdge rad="31750"/>
+          </a:effectLst>
+        </p:spPr>
+        <p:style>
+          <a:lnRef idx="2">
+            <a:schemeClr val="accent1">
+              <a:shade val="50000"/>
+            </a:schemeClr>
+          </a:lnRef>
+          <a:fillRef idx="1">
+            <a:schemeClr val="accent1"/>
+          </a:fillRef>
+          <a:effectRef idx="0">
+            <a:schemeClr val="accent1"/>
+          </a:effectRef>
+          <a:fontRef idx="minor">
+            <a:schemeClr val="lt1"/>
+          </a:fontRef>
+        </p:style>
+        <p:txBody>
+          <a:bodyPr rtlCol="0" anchor="ctr"/>
+          <a:lstStyle/>
+          <a:p>
+            <a:pPr algn="ctr"/>
+            <a:endParaRPr lang="en-SG"/>
+          </a:p>
+        </p:txBody>
+      </p:sp>
+      <p:sp>
+        <p:nvSpPr>
+          <p:cNvPr id="128" name="Rectangle 127"/>
+          <p:cNvSpPr/>
+          <p:nvPr/>
+        </p:nvSpPr>
+        <p:spPr>
+          <a:xfrm>
+            <a:off x="5426134" y="5246050"/>
+            <a:ext cx="229325" cy="160062"/>
+          </a:xfrm>
+          <a:prstGeom prst="rect">
+            <a:avLst/>
+          </a:prstGeom>
+          <a:solidFill>
+            <a:schemeClr val="accent3">
+              <a:lumMod val="20000"/>
+              <a:lumOff val="80000"/>
+              <a:alpha val="80000"/>
+            </a:schemeClr>
+          </a:solidFill>
+          <a:ln>
+            <a:noFill/>
+          </a:ln>
+          <a:effectLst>
+            <a:softEdge rad="31750"/>
+          </a:effectLst>
+        </p:spPr>
+        <p:style>
+          <a:lnRef idx="2">
+            <a:schemeClr val="accent1">
+              <a:shade val="50000"/>
+            </a:schemeClr>
+          </a:lnRef>
+          <a:fillRef idx="1">
+            <a:schemeClr val="accent1"/>
+          </a:fillRef>
+          <a:effectRef idx="0">
+            <a:schemeClr val="accent1"/>
+          </a:effectRef>
+          <a:fontRef idx="minor">
+            <a:schemeClr val="lt1"/>
+          </a:fontRef>
+        </p:style>
+        <p:txBody>
+          <a:bodyPr rtlCol="0" anchor="ctr"/>
+          <a:lstStyle/>
+          <a:p>
+            <a:pPr algn="ctr"/>
+            <a:endParaRPr lang="en-SG"/>
+          </a:p>
+        </p:txBody>
+      </p:sp>
+      <p:sp>
+        <p:nvSpPr>
+          <p:cNvPr id="129" name="Rectangle 62"/>
+          <p:cNvSpPr/>
+          <p:nvPr/>
+        </p:nvSpPr>
+        <p:spPr>
+          <a:xfrm>
+            <a:off x="6102699" y="1768391"/>
+            <a:ext cx="772043" cy="346760"/>
+          </a:xfrm>
+          <a:prstGeom prst="rect">
+            <a:avLst/>
+          </a:prstGeom>
+          <a:ln w="6350">
+            <a:solidFill>
+              <a:schemeClr val="accent3"/>
+            </a:solidFill>
+          </a:ln>
+          <a:effectLst/>
+        </p:spPr>
+        <p:style>
+          <a:lnRef idx="1">
+            <a:schemeClr val="accent3"/>
+          </a:lnRef>
+          <a:fillRef idx="2">
+            <a:schemeClr val="accent3"/>
+          </a:fillRef>
+          <a:effectRef idx="1">
+            <a:schemeClr val="accent3"/>
+          </a:effectRef>
+          <a:fontRef idx="minor">
+            <a:schemeClr val="dk1"/>
+          </a:fontRef>
+        </p:style>
+        <p:txBody>
+          <a:bodyPr rtlCol="0" anchor="ctr"/>
+          <a:lstStyle/>
+          <a:p>
+            <a:pPr algn="ctr"/>
+            <a:r>
+              <a:rPr lang="en-US" sz="1050" b="1" dirty="0">
+                <a:solidFill>
+                  <a:schemeClr val="accent3">
+                    <a:lumMod val="75000"/>
+                  </a:schemeClr>
+                </a:solidFill>
+              </a:rPr>
+              <a:t>{abstract}</a:t>
+            </a:r>
+            <a:br>
+              <a:rPr lang="en-US" sz="1050" b="1" dirty="0">
+                <a:solidFill>
+                  <a:schemeClr val="accent3">
+                    <a:lumMod val="75000"/>
+                  </a:schemeClr>
+                </a:solidFill>
+              </a:rPr>
+            </a:br>
+            <a:r>
+              <a:rPr lang="en-US" sz="1050" b="1" dirty="0" smtClean="0">
+                <a:solidFill>
+                  <a:schemeClr val="accent3">
+                    <a:lumMod val="75000"/>
+                  </a:schemeClr>
+                </a:solidFill>
+              </a:rPr>
+              <a:t>EntryCard</a:t>
+            </a:r>
+          </a:p>
+        </p:txBody>
+      </p:sp>
+      <p:sp>
+        <p:nvSpPr>
+          <p:cNvPr id="130" name="Isosceles Triangle 102"/>
+          <p:cNvSpPr/>
+          <p:nvPr/>
+        </p:nvSpPr>
+        <p:spPr>
+          <a:xfrm rot="10800000" flipV="1">
+            <a:off x="6353468" y="2117683"/>
+            <a:ext cx="270504" cy="175523"/>
+          </a:xfrm>
+          <a:prstGeom prst="triangle">
+            <a:avLst/>
+          </a:prstGeom>
+          <a:ln w="6350">
+            <a:solidFill>
+              <a:schemeClr val="accent3"/>
+            </a:solidFill>
+          </a:ln>
+          <a:effectLst/>
+        </p:spPr>
+        <p:style>
+          <a:lnRef idx="1">
+            <a:schemeClr val="accent3"/>
+          </a:lnRef>
+          <a:fillRef idx="2">
+            <a:schemeClr val="accent3"/>
+          </a:fillRef>
+          <a:effectRef idx="1">
+            <a:schemeClr val="accent3"/>
+          </a:effectRef>
+          <a:fontRef idx="minor">
+            <a:schemeClr val="dk1"/>
+          </a:fontRef>
+        </p:style>
+        <p:txBody>
+          <a:bodyPr rtlCol="0" anchor="ctr"/>
+          <a:lstStyle/>
+          <a:p>
+            <a:pPr algn="ctr"/>
+            <a:endParaRPr lang="en-SG" sz="1050" b="1">
+              <a:solidFill>
+                <a:srgbClr val="92D050"/>
+              </a:solidFill>
+            </a:endParaRPr>
+          </a:p>
+        </p:txBody>
+      </p:sp>
+      <p:sp>
+        <p:nvSpPr>
+          <p:cNvPr id="147" name="Rectangle 146"/>
+          <p:cNvSpPr/>
+          <p:nvPr/>
+        </p:nvSpPr>
+        <p:spPr>
+          <a:xfrm>
+            <a:off x="5415307" y="3808115"/>
+            <a:ext cx="229325" cy="160062"/>
+          </a:xfrm>
+          <a:prstGeom prst="rect">
+            <a:avLst/>
+          </a:prstGeom>
+          <a:solidFill>
+            <a:schemeClr val="accent3">
+              <a:lumMod val="20000"/>
+              <a:lumOff val="80000"/>
+              <a:alpha val="80000"/>
+            </a:schemeClr>
+          </a:solidFill>
+          <a:ln>
+            <a:noFill/>
+          </a:ln>
+          <a:effectLst>
+            <a:softEdge rad="31750"/>
+          </a:effectLst>
+        </p:spPr>
+        <p:style>
+          <a:lnRef idx="2">
+            <a:schemeClr val="accent1">
+              <a:shade val="50000"/>
+            </a:schemeClr>
+          </a:lnRef>
+          <a:fillRef idx="1">
+            <a:schemeClr val="accent1"/>
+          </a:fillRef>
+          <a:effectRef idx="0">
+            <a:schemeClr val="accent1"/>
+          </a:effectRef>
+          <a:fontRef idx="minor">
+            <a:schemeClr val="lt1"/>
+          </a:fontRef>
+        </p:style>
+        <p:txBody>
+          <a:bodyPr rtlCol="0" anchor="ctr"/>
+          <a:lstStyle/>
+          <a:p>
+            <a:pPr algn="ctr"/>
+            <a:endParaRPr lang="en-SG"/>
+          </a:p>
+        </p:txBody>
+      </p:sp>
+      <p:sp>
+        <p:nvSpPr>
+          <p:cNvPr id="148" name="Rectangle 147"/>
+          <p:cNvSpPr/>
+          <p:nvPr/>
+        </p:nvSpPr>
+        <p:spPr>
+          <a:xfrm>
+            <a:off x="5396841" y="4042546"/>
+            <a:ext cx="229325" cy="160062"/>
+          </a:xfrm>
+          <a:prstGeom prst="rect">
+            <a:avLst/>
+          </a:prstGeom>
+          <a:solidFill>
+            <a:schemeClr val="accent3">
+              <a:lumMod val="20000"/>
+              <a:lumOff val="80000"/>
+              <a:alpha val="80000"/>
+            </a:schemeClr>
+          </a:solidFill>
+          <a:ln>
+            <a:noFill/>
+          </a:ln>
+          <a:effectLst>
+            <a:softEdge rad="31750"/>
+          </a:effectLst>
+        </p:spPr>
+        <p:style>
+          <a:lnRef idx="2">
+            <a:schemeClr val="accent1">
+              <a:shade val="50000"/>
+            </a:schemeClr>
+          </a:lnRef>
+          <a:fillRef idx="1">
+            <a:schemeClr val="accent1"/>
+          </a:fillRef>
+          <a:effectRef idx="0">
+            <a:schemeClr val="accent1"/>
+          </a:effectRef>
+          <a:fontRef idx="minor">
+            <a:schemeClr val="lt1"/>
+          </a:fontRef>
+        </p:style>
+        <p:txBody>
+          <a:bodyPr rtlCol="0" anchor="ctr"/>
+          <a:lstStyle/>
+          <a:p>
+            <a:pPr algn="ctr"/>
+            <a:endParaRPr lang="en-SG"/>
+          </a:p>
+        </p:txBody>
+      </p:sp>
+      <p:cxnSp>
+        <p:nvCxnSpPr>
+          <p:cNvPr id="133" name="Elbow Connector 63"/>
+          <p:cNvCxnSpPr>
+            <a:stCxn id="130" idx="3"/>
+          </p:cNvCxnSpPr>
+          <p:nvPr/>
+        </p:nvCxnSpPr>
+        <p:spPr>
+          <a:xfrm rot="5400000">
+            <a:off x="4841986" y="2230572"/>
+            <a:ext cx="1584101" cy="1709368"/>
+          </a:xfrm>
+          <a:prstGeom prst="bentConnector2">
+            <a:avLst/>
+          </a:prstGeom>
+          <a:ln w="6350">
+            <a:solidFill>
+              <a:schemeClr val="accent3"/>
+            </a:solidFill>
+            <a:headEnd type="none" w="med" len="med"/>
+            <a:tailEnd type="none" w="med" len="med"/>
+          </a:ln>
+          <a:effectLst/>
+        </p:spPr>
+        <p:style>
+          <a:lnRef idx="1">
+            <a:schemeClr val="accent2"/>
+          </a:lnRef>
+          <a:fillRef idx="2">
+            <a:schemeClr val="accent2"/>
+          </a:fillRef>
+          <a:effectRef idx="1">
+            <a:schemeClr val="accent2"/>
+          </a:effectRef>
+          <a:fontRef idx="minor">
+            <a:schemeClr val="dk1"/>
+          </a:fontRef>
+        </p:style>
+      </p:cxnSp>
+      <p:cxnSp>
+        <p:nvCxnSpPr>
+          <p:cNvPr id="138" name="Elbow Connector 63"/>
+          <p:cNvCxnSpPr>
+            <a:stCxn id="130" idx="3"/>
+          </p:cNvCxnSpPr>
+          <p:nvPr/>
+        </p:nvCxnSpPr>
+        <p:spPr>
+          <a:xfrm rot="5400000">
+            <a:off x="4823820" y="2450756"/>
+            <a:ext cx="1822450" cy="1507350"/>
+          </a:xfrm>
+          <a:prstGeom prst="bentConnector3">
+            <a:avLst>
+              <a:gd name="adj1" fmla="val 99846"/>
+            </a:avLst>
+          </a:prstGeom>
+          <a:ln w="6350">
+            <a:solidFill>
+              <a:schemeClr val="accent3"/>
+            </a:solidFill>
+            <a:headEnd type="none" w="med" len="med"/>
+            <a:tailEnd type="none" w="med" len="med"/>
+          </a:ln>
+          <a:effectLst/>
+        </p:spPr>
+        <p:style>
+          <a:lnRef idx="1">
+            <a:schemeClr val="accent2"/>
+          </a:lnRef>
+          <a:fillRef idx="2">
+            <a:schemeClr val="accent2"/>
+          </a:fillRef>
+          <a:effectRef idx="1">
+            <a:schemeClr val="accent2"/>
+          </a:effectRef>
+          <a:fontRef idx="minor">
+            <a:schemeClr val="dk1"/>
+          </a:fontRef>
+        </p:style>
+      </p:cxnSp>
+      <p:sp>
+        <p:nvSpPr>
+          <p:cNvPr id="153" name="Rectangle 152"/>
+          <p:cNvSpPr/>
+          <p:nvPr/>
+        </p:nvSpPr>
+        <p:spPr>
+          <a:xfrm>
+            <a:off x="5421813" y="4691378"/>
+            <a:ext cx="229325" cy="160062"/>
+          </a:xfrm>
+          <a:prstGeom prst="rect">
+            <a:avLst/>
+          </a:prstGeom>
+          <a:solidFill>
+            <a:schemeClr val="accent3">
+              <a:lumMod val="20000"/>
+              <a:lumOff val="80000"/>
+              <a:alpha val="80000"/>
+            </a:schemeClr>
+          </a:solidFill>
+          <a:ln>
+            <a:noFill/>
+          </a:ln>
+          <a:effectLst>
+            <a:softEdge rad="31750"/>
+          </a:effectLst>
+        </p:spPr>
+        <p:style>
+          <a:lnRef idx="2">
+            <a:schemeClr val="accent1">
+              <a:shade val="50000"/>
+            </a:schemeClr>
+          </a:lnRef>
+          <a:fillRef idx="1">
+            <a:schemeClr val="accent1"/>
+          </a:fillRef>
+          <a:effectRef idx="0">
+            <a:schemeClr val="accent1"/>
+          </a:effectRef>
+          <a:fontRef idx="minor">
+            <a:schemeClr val="lt1"/>
+          </a:fontRef>
+        </p:style>
+        <p:txBody>
+          <a:bodyPr rtlCol="0" anchor="ctr"/>
+          <a:lstStyle/>
+          <a:p>
+            <a:pPr algn="ctr"/>
+            <a:endParaRPr lang="en-SG"/>
+          </a:p>
+        </p:txBody>
+      </p:sp>
+      <p:cxnSp>
+        <p:nvCxnSpPr>
+          <p:cNvPr id="149" name="Elbow Connector 63"/>
+          <p:cNvCxnSpPr>
+            <a:stCxn id="130" idx="3"/>
+          </p:cNvCxnSpPr>
+          <p:nvPr/>
+        </p:nvCxnSpPr>
+        <p:spPr>
+          <a:xfrm rot="5400000">
+            <a:off x="4507888" y="2769956"/>
+            <a:ext cx="2457582" cy="1504083"/>
+          </a:xfrm>
+          <a:prstGeom prst="bentConnector3">
+            <a:avLst>
+              <a:gd name="adj1" fmla="val 100433"/>
+            </a:avLst>
+          </a:prstGeom>
+          <a:ln w="6350">
+            <a:solidFill>
+              <a:schemeClr val="accent3"/>
+            </a:solidFill>
+            <a:headEnd type="none" w="med" len="med"/>
+            <a:tailEnd type="none" w="med" len="med"/>
+          </a:ln>
+          <a:effectLst/>
+        </p:spPr>
+        <p:style>
+          <a:lnRef idx="1">
+            <a:schemeClr val="accent2"/>
+          </a:lnRef>
+          <a:fillRef idx="2">
+            <a:schemeClr val="accent2"/>
+          </a:fillRef>
+          <a:effectRef idx="1">
+            <a:schemeClr val="accent2"/>
+          </a:effectRef>
+          <a:fontRef idx="minor">
+            <a:schemeClr val="dk1"/>
+          </a:fontRef>
+        </p:style>
+      </p:cxnSp>
+      <p:sp>
+        <p:nvSpPr>
+          <p:cNvPr id="158" name="Rectangle 157"/>
+          <p:cNvSpPr/>
+          <p:nvPr/>
+        </p:nvSpPr>
+        <p:spPr>
+          <a:xfrm>
+            <a:off x="5419193" y="4910273"/>
+            <a:ext cx="229325" cy="160062"/>
+          </a:xfrm>
+          <a:prstGeom prst="rect">
+            <a:avLst/>
+          </a:prstGeom>
+          <a:solidFill>
+            <a:schemeClr val="accent3">
+              <a:lumMod val="20000"/>
+              <a:lumOff val="80000"/>
+              <a:alpha val="80000"/>
+            </a:schemeClr>
+          </a:solidFill>
+          <a:ln>
+            <a:noFill/>
+          </a:ln>
+          <a:effectLst>
+            <a:softEdge rad="31750"/>
+          </a:effectLst>
+        </p:spPr>
+        <p:style>
+          <a:lnRef idx="2">
+            <a:schemeClr val="accent1">
+              <a:shade val="50000"/>
+            </a:schemeClr>
+          </a:lnRef>
+          <a:fillRef idx="1">
+            <a:schemeClr val="accent1"/>
+          </a:fillRef>
+          <a:effectRef idx="0">
+            <a:schemeClr val="accent1"/>
+          </a:effectRef>
+          <a:fontRef idx="minor">
+            <a:schemeClr val="lt1"/>
+          </a:fontRef>
+        </p:style>
+        <p:txBody>
+          <a:bodyPr rtlCol="0" anchor="ctr"/>
+          <a:lstStyle/>
+          <a:p>
+            <a:pPr algn="ctr"/>
+            <a:endParaRPr lang="en-SG"/>
+          </a:p>
+        </p:txBody>
+      </p:sp>
+      <p:cxnSp>
+        <p:nvCxnSpPr>
+          <p:cNvPr id="154" name="Elbow Connector 63"/>
+          <p:cNvCxnSpPr>
+            <a:stCxn id="130" idx="3"/>
+          </p:cNvCxnSpPr>
+          <p:nvPr/>
+        </p:nvCxnSpPr>
+        <p:spPr>
+          <a:xfrm rot="5400000">
+            <a:off x="4575465" y="3077047"/>
+            <a:ext cx="2697096" cy="1129415"/>
+          </a:xfrm>
+          <a:prstGeom prst="bentConnector3">
+            <a:avLst>
+              <a:gd name="adj1" fmla="val 100292"/>
+            </a:avLst>
+          </a:prstGeom>
+          <a:ln w="6350">
+            <a:solidFill>
+              <a:schemeClr val="accent3"/>
+            </a:solidFill>
+            <a:headEnd type="none" w="med" len="med"/>
+            <a:tailEnd type="none" w="med" len="med"/>
+          </a:ln>
+          <a:effectLst/>
+        </p:spPr>
+        <p:style>
+          <a:lnRef idx="1">
+            <a:schemeClr val="accent2"/>
+          </a:lnRef>
+          <a:fillRef idx="2">
+            <a:schemeClr val="accent2"/>
+          </a:fillRef>
+          <a:effectRef idx="1">
+            <a:schemeClr val="accent2"/>
+          </a:effectRef>
+          <a:fontRef idx="minor">
+            <a:schemeClr val="dk1"/>
+          </a:fontRef>
+        </p:style>
+      </p:cxnSp>
+      <p:sp>
+        <p:nvSpPr>
+          <p:cNvPr id="163" name="Rectangle 162"/>
+          <p:cNvSpPr/>
+          <p:nvPr/>
+        </p:nvSpPr>
+        <p:spPr>
+          <a:xfrm>
+            <a:off x="5416334" y="5497388"/>
+            <a:ext cx="229325" cy="160062"/>
+          </a:xfrm>
+          <a:prstGeom prst="rect">
+            <a:avLst/>
+          </a:prstGeom>
+          <a:solidFill>
+            <a:schemeClr val="accent3">
+              <a:lumMod val="20000"/>
+              <a:lumOff val="80000"/>
+              <a:alpha val="80000"/>
+            </a:schemeClr>
+          </a:solidFill>
+          <a:ln>
+            <a:noFill/>
+          </a:ln>
+          <a:effectLst>
+            <a:softEdge rad="31750"/>
+          </a:effectLst>
+        </p:spPr>
+        <p:style>
+          <a:lnRef idx="2">
+            <a:schemeClr val="accent1">
+              <a:shade val="50000"/>
+            </a:schemeClr>
+          </a:lnRef>
+          <a:fillRef idx="1">
+            <a:schemeClr val="accent1"/>
+          </a:fillRef>
+          <a:effectRef idx="0">
+            <a:schemeClr val="accent1"/>
+          </a:effectRef>
+          <a:fontRef idx="minor">
+            <a:schemeClr val="lt1"/>
+          </a:fontRef>
+        </p:style>
+        <p:txBody>
+          <a:bodyPr rtlCol="0" anchor="ctr"/>
+          <a:lstStyle/>
+          <a:p>
+            <a:pPr algn="ctr"/>
+            <a:endParaRPr lang="en-SG"/>
+          </a:p>
+        </p:txBody>
+      </p:sp>
+      <p:cxnSp>
+        <p:nvCxnSpPr>
+          <p:cNvPr id="159" name="Elbow Connector 63"/>
+          <p:cNvCxnSpPr>
+            <a:stCxn id="130" idx="3"/>
+          </p:cNvCxnSpPr>
+          <p:nvPr/>
+        </p:nvCxnSpPr>
+        <p:spPr>
+          <a:xfrm rot="5400000">
+            <a:off x="4199421" y="3285059"/>
+            <a:ext cx="3281153" cy="1297446"/>
+          </a:xfrm>
+          <a:prstGeom prst="bentConnector3">
+            <a:avLst>
+              <a:gd name="adj1" fmla="val 100189"/>
+            </a:avLst>
+          </a:prstGeom>
+          <a:ln w="6350">
+            <a:solidFill>
+              <a:schemeClr val="accent3"/>
+            </a:solidFill>
+            <a:headEnd type="none" w="med" len="med"/>
+            <a:tailEnd type="none" w="med" len="med"/>
+          </a:ln>
+          <a:effectLst/>
+        </p:spPr>
+        <p:style>
+          <a:lnRef idx="1">
+            <a:schemeClr val="accent2"/>
+          </a:lnRef>
+          <a:fillRef idx="2">
+            <a:schemeClr val="accent2"/>
+          </a:fillRef>
+          <a:effectRef idx="1">
+            <a:schemeClr val="accent2"/>
+          </a:effectRef>
+          <a:fontRef idx="minor">
+            <a:schemeClr val="dk1"/>
+          </a:fontRef>
+        </p:style>
+      </p:cxnSp>
+      <p:sp>
+        <p:nvSpPr>
+          <p:cNvPr id="81" name="Rectangle 80"/>
+          <p:cNvSpPr/>
+          <p:nvPr/>
+        </p:nvSpPr>
+        <p:spPr>
+          <a:xfrm>
+            <a:off x="6381644" y="2731865"/>
+            <a:ext cx="229325" cy="166560"/>
+          </a:xfrm>
+          <a:prstGeom prst="rect">
+            <a:avLst/>
+          </a:prstGeom>
+          <a:solidFill>
+            <a:schemeClr val="accent3">
+              <a:lumMod val="20000"/>
+              <a:lumOff val="80000"/>
+              <a:alpha val="80000"/>
+            </a:schemeClr>
+          </a:solidFill>
+          <a:ln>
+            <a:noFill/>
+          </a:ln>
+          <a:effectLst>
+            <a:softEdge rad="31750"/>
+          </a:effectLst>
+        </p:spPr>
+        <p:style>
+          <a:lnRef idx="2">
+            <a:schemeClr val="accent1">
+              <a:shade val="50000"/>
+            </a:schemeClr>
+          </a:lnRef>
+          <a:fillRef idx="1">
+            <a:schemeClr val="accent1"/>
+          </a:fillRef>
+          <a:effectRef idx="0">
+            <a:schemeClr val="accent1"/>
+          </a:effectRef>
+          <a:fontRef idx="minor">
+            <a:schemeClr val="lt1"/>
+          </a:fontRef>
+        </p:style>
+        <p:txBody>
+          <a:bodyPr rtlCol="0" anchor="ctr"/>
+          <a:lstStyle/>
+          <a:p>
+            <a:pPr algn="ctr"/>
+            <a:endParaRPr lang="en-SG"/>
+          </a:p>
+        </p:txBody>
+      </p:sp>
+      <p:sp>
+        <p:nvSpPr>
+          <p:cNvPr id="82" name="Rectangle 81"/>
+          <p:cNvSpPr/>
+          <p:nvPr/>
+        </p:nvSpPr>
+        <p:spPr>
+          <a:xfrm>
+            <a:off x="6368802" y="3467703"/>
+            <a:ext cx="229325" cy="166560"/>
+          </a:xfrm>
+          <a:prstGeom prst="rect">
+            <a:avLst/>
+          </a:prstGeom>
+          <a:solidFill>
+            <a:schemeClr val="accent3">
+              <a:lumMod val="20000"/>
+              <a:lumOff val="80000"/>
+              <a:alpha val="80000"/>
+            </a:schemeClr>
+          </a:solidFill>
+          <a:ln>
+            <a:noFill/>
+          </a:ln>
+          <a:effectLst>
+            <a:softEdge rad="31750"/>
+          </a:effectLst>
+        </p:spPr>
+        <p:style>
+          <a:lnRef idx="2">
+            <a:schemeClr val="accent1">
+              <a:shade val="50000"/>
+            </a:schemeClr>
+          </a:lnRef>
+          <a:fillRef idx="1">
+            <a:schemeClr val="accent1"/>
+          </a:fillRef>
+          <a:effectRef idx="0">
+            <a:schemeClr val="accent1"/>
+          </a:effectRef>
+          <a:fontRef idx="minor">
+            <a:schemeClr val="lt1"/>
+          </a:fontRef>
+        </p:style>
+        <p:txBody>
+          <a:bodyPr rtlCol="0" anchor="ctr"/>
+          <a:lstStyle/>
+          <a:p>
+            <a:pPr algn="ctr"/>
+            <a:endParaRPr lang="en-SG"/>
+          </a:p>
+        </p:txBody>
+      </p:sp>
+      <p:sp>
+        <p:nvSpPr>
+          <p:cNvPr id="83" name="Rectangle 82"/>
+          <p:cNvSpPr/>
+          <p:nvPr/>
+        </p:nvSpPr>
+        <p:spPr>
+          <a:xfrm>
+            <a:off x="6402455" y="4354538"/>
+            <a:ext cx="229325" cy="166560"/>
+          </a:xfrm>
+          <a:prstGeom prst="rect">
+            <a:avLst/>
+          </a:prstGeom>
+          <a:solidFill>
+            <a:schemeClr val="accent3">
+              <a:lumMod val="20000"/>
+              <a:lumOff val="80000"/>
+              <a:alpha val="80000"/>
+            </a:schemeClr>
+          </a:solidFill>
+          <a:ln>
+            <a:noFill/>
+          </a:ln>
+          <a:effectLst>
+            <a:softEdge rad="31750"/>
+          </a:effectLst>
+        </p:spPr>
+        <p:style>
+          <a:lnRef idx="2">
+            <a:schemeClr val="accent1">
+              <a:shade val="50000"/>
+            </a:schemeClr>
+          </a:lnRef>
+          <a:fillRef idx="1">
+            <a:schemeClr val="accent1"/>
+          </a:fillRef>
+          <a:effectRef idx="0">
+            <a:schemeClr val="accent1"/>
+          </a:effectRef>
+          <a:fontRef idx="minor">
+            <a:schemeClr val="lt1"/>
+          </a:fontRef>
+        </p:style>
+        <p:txBody>
+          <a:bodyPr rtlCol="0" anchor="ctr"/>
+          <a:lstStyle/>
+          <a:p>
+            <a:pPr algn="ctr"/>
+            <a:endParaRPr lang="en-SG"/>
+          </a:p>
+        </p:txBody>
+      </p:sp>
+      <p:sp>
+        <p:nvSpPr>
+          <p:cNvPr id="84" name="Rectangle 83"/>
+          <p:cNvSpPr/>
+          <p:nvPr/>
+        </p:nvSpPr>
+        <p:spPr>
+          <a:xfrm>
+            <a:off x="6387134" y="5221450"/>
+            <a:ext cx="229325" cy="166560"/>
+          </a:xfrm>
+          <a:prstGeom prst="rect">
+            <a:avLst/>
+          </a:prstGeom>
+          <a:solidFill>
+            <a:schemeClr val="accent3">
+              <a:lumMod val="20000"/>
+              <a:lumOff val="80000"/>
+              <a:alpha val="80000"/>
+            </a:schemeClr>
+          </a:solidFill>
+          <a:ln>
+            <a:noFill/>
+          </a:ln>
+          <a:effectLst>
+            <a:softEdge rad="31750"/>
+          </a:effectLst>
+        </p:spPr>
+        <p:style>
+          <a:lnRef idx="2">
+            <a:schemeClr val="accent1">
+              <a:shade val="50000"/>
+            </a:schemeClr>
+          </a:lnRef>
+          <a:fillRef idx="1">
+            <a:schemeClr val="accent1"/>
+          </a:fillRef>
+          <a:effectRef idx="0">
+            <a:schemeClr val="accent1"/>
+          </a:effectRef>
+          <a:fontRef idx="minor">
+            <a:schemeClr val="lt1"/>
+          </a:fontRef>
+        </p:style>
+        <p:txBody>
+          <a:bodyPr rtlCol="0" anchor="ctr"/>
+          <a:lstStyle/>
+          <a:p>
+            <a:pPr algn="ctr"/>
+            <a:endParaRPr lang="en-SG"/>
+          </a:p>
+        </p:txBody>
+      </p:sp>
+      <p:sp>
+        <p:nvSpPr>
+          <p:cNvPr id="80" name="Freeform 79"/>
+          <p:cNvSpPr/>
+          <p:nvPr/>
+        </p:nvSpPr>
+        <p:spPr>
+          <a:xfrm>
+            <a:off x="3962919" y="5311300"/>
+            <a:ext cx="3733156" cy="119858"/>
+          </a:xfrm>
+          <a:custGeom>
+            <a:avLst/>
+            <a:gdLst>
+              <a:gd name="connsiteX0" fmla="*/ 0 w 3048000"/>
+              <a:gd name="connsiteY0" fmla="*/ 203200 h 203200"/>
+              <a:gd name="connsiteX1" fmla="*/ 221673 w 3048000"/>
+              <a:gd name="connsiteY1" fmla="*/ 0 h 203200"/>
+              <a:gd name="connsiteX2" fmla="*/ 3048000 w 3048000"/>
+              <a:gd name="connsiteY2" fmla="*/ 0 h 203200"/>
+            </a:gdLst>
+            <a:ahLst/>
+            <a:cxnLst>
+              <a:cxn ang="0">
+                <a:pos x="connsiteX0" y="connsiteY0"/>
+              </a:cxn>
+              <a:cxn ang="0">
+                <a:pos x="connsiteX1" y="connsiteY1"/>
+              </a:cxn>
+              <a:cxn ang="0">
+                <a:pos x="connsiteX2" y="connsiteY2"/>
+              </a:cxn>
+            </a:cxnLst>
+            <a:rect l="l" t="t" r="r" b="b"/>
+            <a:pathLst>
+              <a:path w="3048000" h="203200">
+                <a:moveTo>
+                  <a:pt x="0" y="203200"/>
+                </a:moveTo>
+                <a:lnTo>
+                  <a:pt x="221673" y="0"/>
+                </a:lnTo>
+                <a:lnTo>
+                  <a:pt x="3048000" y="0"/>
+                </a:lnTo>
+              </a:path>
+            </a:pathLst>
+          </a:custGeom>
+          <a:noFill/>
+          <a:ln w="19050">
+            <a:solidFill>
+              <a:schemeClr val="accent3"/>
+            </a:solidFill>
+            <a:prstDash val="sysDot"/>
+            <a:headEnd type="none" w="med" len="med"/>
+            <a:tailEnd type="arrow" w="med" len="med"/>
+          </a:ln>
+          <a:effectLst/>
+        </p:spPr>
+        <p:style>
+          <a:lnRef idx="1">
+            <a:schemeClr val="accent2"/>
+          </a:lnRef>
+          <a:fillRef idx="2">
+            <a:schemeClr val="accent2"/>
+          </a:fillRef>
+          <a:effectRef idx="1">
+            <a:schemeClr val="accent2"/>
+          </a:effectRef>
+          <a:fontRef idx="minor">
+            <a:schemeClr val="dk1"/>
+          </a:fontRef>
+        </p:style>
+        <p:txBody>
+          <a:bodyPr rtlCol="0" anchor="ctr"/>
+          <a:lstStyle/>
+          <a:p>
+            <a:pPr algn="ctr"/>
+            <a:endParaRPr lang="en-SG"/>
+          </a:p>
+        </p:txBody>
+      </p:sp>
+      <p:sp>
+        <p:nvSpPr>
+          <p:cNvPr id="79" name="Freeform 78"/>
+          <p:cNvSpPr/>
+          <p:nvPr/>
+        </p:nvSpPr>
+        <p:spPr>
+          <a:xfrm>
+            <a:off x="3529207" y="4463055"/>
+            <a:ext cx="4166868" cy="129438"/>
+          </a:xfrm>
+          <a:custGeom>
+            <a:avLst/>
+            <a:gdLst>
+              <a:gd name="connsiteX0" fmla="*/ 0 w 3048000"/>
+              <a:gd name="connsiteY0" fmla="*/ 203200 h 203200"/>
+              <a:gd name="connsiteX1" fmla="*/ 221673 w 3048000"/>
+              <a:gd name="connsiteY1" fmla="*/ 0 h 203200"/>
+              <a:gd name="connsiteX2" fmla="*/ 3048000 w 3048000"/>
+              <a:gd name="connsiteY2" fmla="*/ 0 h 203200"/>
+            </a:gdLst>
+            <a:ahLst/>
+            <a:cxnLst>
+              <a:cxn ang="0">
+                <a:pos x="connsiteX0" y="connsiteY0"/>
+              </a:cxn>
+              <a:cxn ang="0">
+                <a:pos x="connsiteX1" y="connsiteY1"/>
+              </a:cxn>
+              <a:cxn ang="0">
+                <a:pos x="connsiteX2" y="connsiteY2"/>
+              </a:cxn>
+            </a:cxnLst>
+            <a:rect l="l" t="t" r="r" b="b"/>
+            <a:pathLst>
+              <a:path w="3048000" h="203200">
+                <a:moveTo>
+                  <a:pt x="0" y="203200"/>
+                </a:moveTo>
+                <a:lnTo>
+                  <a:pt x="221673" y="0"/>
+                </a:lnTo>
+                <a:lnTo>
+                  <a:pt x="3048000" y="0"/>
+                </a:lnTo>
+              </a:path>
+            </a:pathLst>
+          </a:custGeom>
+          <a:noFill/>
+          <a:ln w="19050">
+            <a:solidFill>
+              <a:schemeClr val="accent3"/>
+            </a:solidFill>
+            <a:prstDash val="sysDot"/>
+            <a:headEnd type="none" w="med" len="med"/>
+            <a:tailEnd type="arrow" w="med" len="med"/>
+          </a:ln>
+          <a:effectLst/>
+        </p:spPr>
+        <p:style>
+          <a:lnRef idx="1">
+            <a:schemeClr val="accent2"/>
+          </a:lnRef>
+          <a:fillRef idx="2">
+            <a:schemeClr val="accent2"/>
+          </a:fillRef>
+          <a:effectRef idx="1">
+            <a:schemeClr val="accent2"/>
+          </a:effectRef>
+          <a:fontRef idx="minor">
+            <a:schemeClr val="dk1"/>
+          </a:fontRef>
+        </p:style>
+        <p:txBody>
+          <a:bodyPr rtlCol="0" anchor="ctr"/>
+          <a:lstStyle/>
+          <a:p>
+            <a:pPr algn="ctr"/>
+            <a:endParaRPr lang="en-SG"/>
+          </a:p>
+        </p:txBody>
+      </p:sp>
+      <p:sp>
+        <p:nvSpPr>
+          <p:cNvPr id="118" name="Freeform 117"/>
+          <p:cNvSpPr/>
+          <p:nvPr/>
+        </p:nvSpPr>
+        <p:spPr>
+          <a:xfrm>
+            <a:off x="3569821" y="3546077"/>
+            <a:ext cx="4126254" cy="149490"/>
+          </a:xfrm>
+          <a:custGeom>
+            <a:avLst/>
+            <a:gdLst>
+              <a:gd name="connsiteX0" fmla="*/ 0 w 3048000"/>
+              <a:gd name="connsiteY0" fmla="*/ 203200 h 203200"/>
+              <a:gd name="connsiteX1" fmla="*/ 221673 w 3048000"/>
+              <a:gd name="connsiteY1" fmla="*/ 0 h 203200"/>
+              <a:gd name="connsiteX2" fmla="*/ 3048000 w 3048000"/>
+              <a:gd name="connsiteY2" fmla="*/ 0 h 203200"/>
+            </a:gdLst>
+            <a:ahLst/>
+            <a:cxnLst>
+              <a:cxn ang="0">
+                <a:pos x="connsiteX0" y="connsiteY0"/>
+              </a:cxn>
+              <a:cxn ang="0">
+                <a:pos x="connsiteX1" y="connsiteY1"/>
+              </a:cxn>
+              <a:cxn ang="0">
+                <a:pos x="connsiteX2" y="connsiteY2"/>
+              </a:cxn>
+            </a:cxnLst>
+            <a:rect l="l" t="t" r="r" b="b"/>
+            <a:pathLst>
+              <a:path w="3048000" h="203200">
+                <a:moveTo>
+                  <a:pt x="0" y="203200"/>
+                </a:moveTo>
+                <a:lnTo>
+                  <a:pt x="221673" y="0"/>
+                </a:lnTo>
+                <a:lnTo>
+                  <a:pt x="3048000" y="0"/>
+                </a:lnTo>
+              </a:path>
+            </a:pathLst>
+          </a:custGeom>
+          <a:noFill/>
+          <a:ln w="19050">
+            <a:solidFill>
+              <a:schemeClr val="accent3"/>
+            </a:solidFill>
+            <a:prstDash val="sysDot"/>
+            <a:headEnd type="none" w="med" len="med"/>
+            <a:tailEnd type="arrow" w="med" len="med"/>
+          </a:ln>
+          <a:effectLst/>
+        </p:spPr>
+        <p:style>
+          <a:lnRef idx="1">
+            <a:schemeClr val="accent2"/>
+          </a:lnRef>
+          <a:fillRef idx="2">
+            <a:schemeClr val="accent2"/>
+          </a:fillRef>
+          <a:effectRef idx="1">
+            <a:schemeClr val="accent2"/>
+          </a:effectRef>
+          <a:fontRef idx="minor">
+            <a:schemeClr val="dk1"/>
           </a:fontRef>
         </p:style>
         <p:txBody>
@@ -5487,1630 +7293,6 @@
           </a:p>
         </p:txBody>
       </p:sp>
-      <p:sp>
-        <p:nvSpPr>
-          <p:cNvPr id="144" name="Rectangle 143"/>
-          <p:cNvSpPr/>
-          <p:nvPr/>
-        </p:nvSpPr>
-        <p:spPr>
-          <a:xfrm>
-            <a:off x="5415307" y="3468965"/>
-            <a:ext cx="229325" cy="160062"/>
-          </a:xfrm>
-          <a:prstGeom prst="rect">
-            <a:avLst/>
-          </a:prstGeom>
-          <a:solidFill>
-            <a:schemeClr val="accent3">
-              <a:lumMod val="20000"/>
-              <a:lumOff val="80000"/>
-              <a:alpha val="80000"/>
-            </a:schemeClr>
-          </a:solidFill>
-          <a:ln>
-            <a:noFill/>
-          </a:ln>
-          <a:effectLst>
-            <a:softEdge rad="31750"/>
-          </a:effectLst>
-        </p:spPr>
-        <p:style>
-          <a:lnRef idx="2">
-            <a:schemeClr val="accent1">
-              <a:shade val="50000"/>
-            </a:schemeClr>
-          </a:lnRef>
-          <a:fillRef idx="1">
-            <a:schemeClr val="accent1"/>
-          </a:fillRef>
-          <a:effectRef idx="0">
-            <a:schemeClr val="accent1"/>
-          </a:effectRef>
-          <a:fontRef idx="minor">
-            <a:schemeClr val="lt1"/>
-          </a:fontRef>
-        </p:style>
-        <p:txBody>
-          <a:bodyPr rtlCol="0" anchor="ctr"/>
-          <a:lstStyle/>
-          <a:p>
-            <a:pPr algn="ctr"/>
-            <a:endParaRPr lang="en-SG"/>
-          </a:p>
-        </p:txBody>
-      </p:sp>
-      <p:sp>
-        <p:nvSpPr>
-          <p:cNvPr id="55" name="Rectangle 11"/>
-          <p:cNvSpPr/>
-          <p:nvPr/>
-        </p:nvSpPr>
-        <p:spPr>
-          <a:xfrm>
-            <a:off x="2590799" y="4592494"/>
-            <a:ext cx="1221176" cy="236841"/>
-          </a:xfrm>
-          <a:prstGeom prst="rect">
-            <a:avLst/>
-          </a:prstGeom>
-          <a:ln w="19050">
-            <a:solidFill>
-              <a:schemeClr val="accent3"/>
-            </a:solidFill>
-          </a:ln>
-          <a:effectLst/>
-        </p:spPr>
-        <p:style>
-          <a:lnRef idx="1">
-            <a:schemeClr val="accent3"/>
-          </a:lnRef>
-          <a:fillRef idx="2">
-            <a:schemeClr val="accent3"/>
-          </a:fillRef>
-          <a:effectRef idx="1">
-            <a:schemeClr val="accent3"/>
-          </a:effectRef>
-          <a:fontRef idx="minor">
-            <a:schemeClr val="dk1"/>
-          </a:fontRef>
-        </p:style>
-        <p:txBody>
-          <a:bodyPr rtlCol="0" anchor="ctr"/>
-          <a:lstStyle/>
-          <a:p>
-            <a:pPr algn="ctr"/>
-            <a:r>
-              <a:rPr lang="en-US" sz="1050" b="1" dirty="0" smtClean="0">
-                <a:solidFill>
-                  <a:schemeClr val="accent3">
-                    <a:lumMod val="75000"/>
-                  </a:schemeClr>
-                </a:solidFill>
-              </a:rPr>
-              <a:t>Deadline</a:t>
-            </a:r>
-            <a:r>
-              <a:rPr lang="en-US" sz="1050" b="1" dirty="0" smtClean="0">
-                <a:solidFill>
-                  <a:schemeClr val="accent3">
-                    <a:lumMod val="75000"/>
-                  </a:schemeClr>
-                </a:solidFill>
-              </a:rPr>
-              <a:t>ListPanel</a:t>
-            </a:r>
-            <a:endParaRPr lang="en-SG" sz="1050" b="1" dirty="0">
-              <a:solidFill>
-                <a:schemeClr val="accent3">
-                  <a:lumMod val="75000"/>
-                </a:schemeClr>
-              </a:solidFill>
-            </a:endParaRPr>
-          </a:p>
-        </p:txBody>
-      </p:sp>
-      <p:sp>
-        <p:nvSpPr>
-          <p:cNvPr id="56" name="Rectangle 11"/>
-          <p:cNvSpPr/>
-          <p:nvPr/>
-        </p:nvSpPr>
-        <p:spPr>
-          <a:xfrm>
-            <a:off x="2583424" y="5385148"/>
-            <a:ext cx="1379495" cy="236841"/>
-          </a:xfrm>
-          <a:prstGeom prst="rect">
-            <a:avLst/>
-          </a:prstGeom>
-          <a:ln w="19050">
-            <a:solidFill>
-              <a:schemeClr val="accent3"/>
-            </a:solidFill>
-          </a:ln>
-          <a:effectLst/>
-        </p:spPr>
-        <p:style>
-          <a:lnRef idx="1">
-            <a:schemeClr val="accent3"/>
-          </a:lnRef>
-          <a:fillRef idx="2">
-            <a:schemeClr val="accent3"/>
-          </a:fillRef>
-          <a:effectRef idx="1">
-            <a:schemeClr val="accent3"/>
-          </a:effectRef>
-          <a:fontRef idx="minor">
-            <a:schemeClr val="dk1"/>
-          </a:fontRef>
-        </p:style>
-        <p:txBody>
-          <a:bodyPr rtlCol="0" anchor="ctr"/>
-          <a:lstStyle/>
-          <a:p>
-            <a:pPr algn="ctr"/>
-            <a:r>
-              <a:rPr lang="en-US" sz="1050" b="1" dirty="0" smtClean="0">
-                <a:solidFill>
-                  <a:schemeClr val="accent3">
-                    <a:lumMod val="75000"/>
-                  </a:schemeClr>
-                </a:solidFill>
-              </a:rPr>
-              <a:t>FloatingTaskListPanel</a:t>
-            </a:r>
-            <a:endParaRPr lang="en-SG" sz="1050" b="1" dirty="0">
-              <a:solidFill>
-                <a:schemeClr val="accent3">
-                  <a:lumMod val="75000"/>
-                </a:schemeClr>
-              </a:solidFill>
-            </a:endParaRPr>
-          </a:p>
-        </p:txBody>
-      </p:sp>
-      <p:cxnSp>
-        <p:nvCxnSpPr>
-          <p:cNvPr id="57" name="Elbow Connector 63"/>
-          <p:cNvCxnSpPr>
-            <a:stCxn id="39" idx="2"/>
-            <a:endCxn id="55" idx="1"/>
-          </p:cNvCxnSpPr>
-          <p:nvPr/>
-        </p:nvCxnSpPr>
-        <p:spPr>
-          <a:xfrm rot="16200000" flipH="1">
-            <a:off x="1582017" y="3702133"/>
-            <a:ext cx="1842890" cy="174673"/>
-          </a:xfrm>
-          <a:prstGeom prst="bentConnector2">
-            <a:avLst/>
-          </a:prstGeom>
-          <a:ln w="19050">
-            <a:solidFill>
-              <a:schemeClr val="accent3"/>
-            </a:solidFill>
-            <a:headEnd type="none" w="med" len="med"/>
-            <a:tailEnd type="arrow" w="med" len="med"/>
-          </a:ln>
-          <a:effectLst/>
-        </p:spPr>
-        <p:style>
-          <a:lnRef idx="1">
-            <a:schemeClr val="accent2"/>
-          </a:lnRef>
-          <a:fillRef idx="2">
-            <a:schemeClr val="accent2"/>
-          </a:fillRef>
-          <a:effectRef idx="1">
-            <a:schemeClr val="accent2"/>
-          </a:effectRef>
-          <a:fontRef idx="minor">
-            <a:schemeClr val="dk1"/>
-          </a:fontRef>
-        </p:style>
-      </p:cxnSp>
-      <p:cxnSp>
-        <p:nvCxnSpPr>
-          <p:cNvPr id="60" name="Elbow Connector 63"/>
-          <p:cNvCxnSpPr>
-            <a:stCxn id="39" idx="2"/>
-            <a:endCxn id="56" idx="1"/>
-          </p:cNvCxnSpPr>
-          <p:nvPr/>
-        </p:nvCxnSpPr>
-        <p:spPr>
-          <a:xfrm rot="16200000" flipH="1">
-            <a:off x="1182003" y="4102148"/>
-            <a:ext cx="2635544" cy="167298"/>
-          </a:xfrm>
-          <a:prstGeom prst="bentConnector2">
-            <a:avLst/>
-          </a:prstGeom>
-          <a:ln w="19050">
-            <a:solidFill>
-              <a:schemeClr val="accent3"/>
-            </a:solidFill>
-            <a:headEnd type="none" w="med" len="med"/>
-            <a:tailEnd type="arrow" w="med" len="med"/>
-          </a:ln>
-          <a:effectLst/>
-        </p:spPr>
-        <p:style>
-          <a:lnRef idx="1">
-            <a:schemeClr val="accent2"/>
-          </a:lnRef>
-          <a:fillRef idx="2">
-            <a:schemeClr val="accent2"/>
-          </a:fillRef>
-          <a:effectRef idx="1">
-            <a:schemeClr val="accent2"/>
-          </a:effectRef>
-          <a:fontRef idx="minor">
-            <a:schemeClr val="dk1"/>
-          </a:fontRef>
-        </p:style>
-      </p:cxnSp>
-      <p:sp>
-        <p:nvSpPr>
-          <p:cNvPr id="69" name="Rectangle 11"/>
-          <p:cNvSpPr/>
-          <p:nvPr/>
-        </p:nvSpPr>
-        <p:spPr>
-          <a:xfrm>
-            <a:off x="3941503" y="4754078"/>
-            <a:ext cx="1040906" cy="236841"/>
-          </a:xfrm>
-          <a:prstGeom prst="rect">
-            <a:avLst/>
-          </a:prstGeom>
-          <a:ln w="19050">
-            <a:solidFill>
-              <a:schemeClr val="accent3"/>
-            </a:solidFill>
-          </a:ln>
-          <a:effectLst/>
-        </p:spPr>
-        <p:style>
-          <a:lnRef idx="1">
-            <a:schemeClr val="accent3"/>
-          </a:lnRef>
-          <a:fillRef idx="2">
-            <a:schemeClr val="accent3"/>
-          </a:fillRef>
-          <a:effectRef idx="1">
-            <a:schemeClr val="accent3"/>
-          </a:effectRef>
-          <a:fontRef idx="minor">
-            <a:schemeClr val="dk1"/>
-          </a:fontRef>
-        </p:style>
-        <p:txBody>
-          <a:bodyPr rtlCol="0" anchor="ctr"/>
-          <a:lstStyle/>
-          <a:p>
-            <a:pPr algn="ctr"/>
-            <a:r>
-              <a:rPr lang="en-US" sz="1050" b="1" dirty="0" smtClean="0">
-                <a:solidFill>
-                  <a:schemeClr val="accent3">
-                    <a:lumMod val="75000"/>
-                  </a:schemeClr>
-                </a:solidFill>
-              </a:rPr>
-              <a:t>DeadlineCard</a:t>
-            </a:r>
-            <a:endParaRPr lang="en-SG" sz="1050" b="1" dirty="0">
-              <a:solidFill>
-                <a:schemeClr val="accent3">
-                  <a:lumMod val="75000"/>
-                </a:schemeClr>
-              </a:solidFill>
-            </a:endParaRPr>
-          </a:p>
-        </p:txBody>
-      </p:sp>
-      <p:cxnSp>
-        <p:nvCxnSpPr>
-          <p:cNvPr id="71" name="Elbow Connector 70"/>
-          <p:cNvCxnSpPr>
-            <a:stCxn id="55" idx="2"/>
-            <a:endCxn id="69" idx="1"/>
-          </p:cNvCxnSpPr>
-          <p:nvPr/>
-        </p:nvCxnSpPr>
-        <p:spPr>
-          <a:xfrm rot="16200000" flipH="1">
-            <a:off x="3549863" y="4480859"/>
-            <a:ext cx="43164" cy="740116"/>
-          </a:xfrm>
-          <a:prstGeom prst="bentConnector2">
-            <a:avLst/>
-          </a:prstGeom>
-          <a:ln w="19050">
-            <a:solidFill>
-              <a:schemeClr val="accent3"/>
-            </a:solidFill>
-            <a:headEnd type="none" w="med" len="med"/>
-            <a:tailEnd type="arrow" w="med" len="med"/>
-          </a:ln>
-          <a:effectLst/>
-        </p:spPr>
-        <p:style>
-          <a:lnRef idx="1">
-            <a:schemeClr val="accent2"/>
-          </a:lnRef>
-          <a:fillRef idx="2">
-            <a:schemeClr val="accent2"/>
-          </a:fillRef>
-          <a:effectRef idx="1">
-            <a:schemeClr val="accent2"/>
-          </a:effectRef>
-          <a:fontRef idx="minor">
-            <a:schemeClr val="dk1"/>
-          </a:fontRef>
-        </p:style>
-      </p:cxnSp>
-      <p:sp>
-        <p:nvSpPr>
-          <p:cNvPr id="75" name="Rectangle 11"/>
-          <p:cNvSpPr/>
-          <p:nvPr/>
-        </p:nvSpPr>
-        <p:spPr>
-          <a:xfrm>
-            <a:off x="3982871" y="5574357"/>
-            <a:ext cx="1208922" cy="236841"/>
-          </a:xfrm>
-          <a:prstGeom prst="rect">
-            <a:avLst/>
-          </a:prstGeom>
-          <a:ln w="19050">
-            <a:solidFill>
-              <a:schemeClr val="accent3"/>
-            </a:solidFill>
-          </a:ln>
-          <a:effectLst/>
-        </p:spPr>
-        <p:style>
-          <a:lnRef idx="1">
-            <a:schemeClr val="accent3"/>
-          </a:lnRef>
-          <a:fillRef idx="2">
-            <a:schemeClr val="accent3"/>
-          </a:fillRef>
-          <a:effectRef idx="1">
-            <a:schemeClr val="accent3"/>
-          </a:effectRef>
-          <a:fontRef idx="minor">
-            <a:schemeClr val="dk1"/>
-          </a:fontRef>
-        </p:style>
-        <p:txBody>
-          <a:bodyPr rtlCol="0" anchor="ctr"/>
-          <a:lstStyle/>
-          <a:p>
-            <a:pPr algn="ctr"/>
-            <a:r>
-              <a:rPr lang="en-US" sz="1050" b="1" dirty="0" smtClean="0">
-                <a:solidFill>
-                  <a:schemeClr val="accent3">
-                    <a:lumMod val="75000"/>
-                  </a:schemeClr>
-                </a:solidFill>
-              </a:rPr>
-              <a:t>FloatingTaskCard</a:t>
-            </a:r>
-            <a:endParaRPr lang="en-SG" sz="1050" b="1" dirty="0">
-              <a:solidFill>
-                <a:schemeClr val="accent3">
-                  <a:lumMod val="75000"/>
-                </a:schemeClr>
-              </a:solidFill>
-            </a:endParaRPr>
-          </a:p>
-        </p:txBody>
-      </p:sp>
-      <p:cxnSp>
-        <p:nvCxnSpPr>
-          <p:cNvPr id="78" name="Elbow Connector 77"/>
-          <p:cNvCxnSpPr>
-            <a:stCxn id="56" idx="2"/>
-            <a:endCxn id="75" idx="1"/>
-          </p:cNvCxnSpPr>
-          <p:nvPr/>
-        </p:nvCxnSpPr>
-        <p:spPr>
-          <a:xfrm rot="16200000" flipH="1">
-            <a:off x="3592627" y="5302533"/>
-            <a:ext cx="70789" cy="709699"/>
-          </a:xfrm>
-          <a:prstGeom prst="bentConnector2">
-            <a:avLst/>
-          </a:prstGeom>
-          <a:ln w="19050">
-            <a:solidFill>
-              <a:schemeClr val="accent3"/>
-            </a:solidFill>
-            <a:headEnd type="none" w="med" len="med"/>
-            <a:tailEnd type="arrow" w="med" len="med"/>
-          </a:ln>
-          <a:effectLst/>
-        </p:spPr>
-        <p:style>
-          <a:lnRef idx="1">
-            <a:schemeClr val="accent2"/>
-          </a:lnRef>
-          <a:fillRef idx="2">
-            <a:schemeClr val="accent2"/>
-          </a:fillRef>
-          <a:effectRef idx="1">
-            <a:schemeClr val="accent2"/>
-          </a:effectRef>
-          <a:fontRef idx="minor">
-            <a:schemeClr val="dk1"/>
-          </a:fontRef>
-        </p:style>
-      </p:cxnSp>
-      <p:sp>
-        <p:nvSpPr>
-          <p:cNvPr id="95" name="Rectangle 11"/>
-          <p:cNvSpPr/>
-          <p:nvPr/>
-        </p:nvSpPr>
-        <p:spPr>
-          <a:xfrm>
-            <a:off x="3941503" y="4990918"/>
-            <a:ext cx="1417801" cy="236841"/>
-          </a:xfrm>
-          <a:prstGeom prst="rect">
-            <a:avLst/>
-          </a:prstGeom>
-          <a:ln w="19050">
-            <a:solidFill>
-              <a:schemeClr val="accent3"/>
-            </a:solidFill>
-          </a:ln>
-          <a:effectLst/>
-        </p:spPr>
-        <p:style>
-          <a:lnRef idx="1">
-            <a:schemeClr val="accent3"/>
-          </a:lnRef>
-          <a:fillRef idx="2">
-            <a:schemeClr val="accent3"/>
-          </a:fillRef>
-          <a:effectRef idx="1">
-            <a:schemeClr val="accent3"/>
-          </a:effectRef>
-          <a:fontRef idx="minor">
-            <a:schemeClr val="dk1"/>
-          </a:fontRef>
-        </p:style>
-        <p:txBody>
-          <a:bodyPr rtlCol="0" anchor="ctr"/>
-          <a:lstStyle/>
-          <a:p>
-            <a:pPr algn="ctr"/>
-            <a:r>
-              <a:rPr lang="en-US" sz="1050" b="1" dirty="0" smtClean="0">
-                <a:solidFill>
-                  <a:schemeClr val="accent3">
-                    <a:lumMod val="75000"/>
-                  </a:schemeClr>
-                </a:solidFill>
-              </a:rPr>
-              <a:t>DeadlineOverdueCard</a:t>
-            </a:r>
-            <a:endParaRPr lang="en-SG" sz="1050" b="1" dirty="0">
-              <a:solidFill>
-                <a:schemeClr val="accent3">
-                  <a:lumMod val="75000"/>
-                </a:schemeClr>
-              </a:solidFill>
-            </a:endParaRPr>
-          </a:p>
-        </p:txBody>
-      </p:sp>
-      <p:cxnSp>
-        <p:nvCxnSpPr>
-          <p:cNvPr id="96" name="Elbow Connector 95"/>
-          <p:cNvCxnSpPr>
-            <a:stCxn id="55" idx="2"/>
-            <a:endCxn id="95" idx="1"/>
-          </p:cNvCxnSpPr>
-          <p:nvPr/>
-        </p:nvCxnSpPr>
-        <p:spPr>
-          <a:xfrm rot="16200000" flipH="1">
-            <a:off x="3431443" y="4599279"/>
-            <a:ext cx="280004" cy="740116"/>
-          </a:xfrm>
-          <a:prstGeom prst="bentConnector2">
-            <a:avLst/>
-          </a:prstGeom>
-          <a:ln w="19050">
-            <a:solidFill>
-              <a:schemeClr val="accent3"/>
-            </a:solidFill>
-            <a:headEnd type="none" w="med" len="med"/>
-            <a:tailEnd type="arrow" w="med" len="med"/>
-          </a:ln>
-          <a:effectLst/>
-        </p:spPr>
-        <p:style>
-          <a:lnRef idx="1">
-            <a:schemeClr val="accent2"/>
-          </a:lnRef>
-          <a:fillRef idx="2">
-            <a:schemeClr val="accent2"/>
-          </a:fillRef>
-          <a:effectRef idx="1">
-            <a:schemeClr val="accent2"/>
-          </a:effectRef>
-          <a:fontRef idx="minor">
-            <a:schemeClr val="dk1"/>
-          </a:fontRef>
-        </p:style>
-      </p:cxnSp>
-      <p:sp>
-        <p:nvSpPr>
-          <p:cNvPr id="100" name="Rectangle 11"/>
-          <p:cNvSpPr/>
-          <p:nvPr/>
-        </p:nvSpPr>
-        <p:spPr>
-          <a:xfrm>
-            <a:off x="3735954" y="4120582"/>
-            <a:ext cx="1247644" cy="236841"/>
-          </a:xfrm>
-          <a:prstGeom prst="rect">
-            <a:avLst/>
-          </a:prstGeom>
-          <a:ln w="19050">
-            <a:solidFill>
-              <a:schemeClr val="accent3"/>
-            </a:solidFill>
-          </a:ln>
-          <a:effectLst/>
-        </p:spPr>
-        <p:style>
-          <a:lnRef idx="1">
-            <a:schemeClr val="accent3"/>
-          </a:lnRef>
-          <a:fillRef idx="2">
-            <a:schemeClr val="accent3"/>
-          </a:fillRef>
-          <a:effectRef idx="1">
-            <a:schemeClr val="accent3"/>
-          </a:effectRef>
-          <a:fontRef idx="minor">
-            <a:schemeClr val="dk1"/>
-          </a:fontRef>
-        </p:style>
-        <p:txBody>
-          <a:bodyPr rtlCol="0" anchor="ctr"/>
-          <a:lstStyle/>
-          <a:p>
-            <a:pPr algn="ctr"/>
-            <a:r>
-              <a:rPr lang="en-US" sz="1050" b="1" dirty="0" smtClean="0">
-                <a:solidFill>
-                  <a:schemeClr val="accent3">
-                    <a:lumMod val="75000"/>
-                  </a:schemeClr>
-                </a:solidFill>
-              </a:rPr>
-              <a:t>EventOverdue</a:t>
-            </a:r>
-            <a:r>
-              <a:rPr lang="en-US" sz="1050" b="1" dirty="0" smtClean="0">
-                <a:solidFill>
-                  <a:schemeClr val="accent3">
-                    <a:lumMod val="75000"/>
-                  </a:schemeClr>
-                </a:solidFill>
-              </a:rPr>
-              <a:t>Card</a:t>
-            </a:r>
-            <a:endParaRPr lang="en-SG" sz="1050" b="1" dirty="0">
-              <a:solidFill>
-                <a:schemeClr val="accent3">
-                  <a:lumMod val="75000"/>
-                </a:schemeClr>
-              </a:solidFill>
-            </a:endParaRPr>
-          </a:p>
-        </p:txBody>
-      </p:sp>
-      <p:cxnSp>
-        <p:nvCxnSpPr>
-          <p:cNvPr id="101" name="Elbow Connector 100"/>
-          <p:cNvCxnSpPr>
-            <a:stCxn id="36" idx="2"/>
-            <a:endCxn id="100" idx="1"/>
-          </p:cNvCxnSpPr>
-          <p:nvPr/>
-        </p:nvCxnSpPr>
-        <p:spPr>
-          <a:xfrm rot="16200000" flipH="1">
-            <a:off x="3284060" y="3787108"/>
-            <a:ext cx="303477" cy="600312"/>
-          </a:xfrm>
-          <a:prstGeom prst="bentConnector2">
-            <a:avLst/>
-          </a:prstGeom>
-          <a:ln w="19050">
-            <a:solidFill>
-              <a:schemeClr val="accent3"/>
-            </a:solidFill>
-            <a:headEnd type="none" w="med" len="med"/>
-            <a:tailEnd type="arrow" w="med" len="med"/>
-          </a:ln>
-          <a:effectLst/>
-        </p:spPr>
-        <p:style>
-          <a:lnRef idx="1">
-            <a:schemeClr val="accent2"/>
-          </a:lnRef>
-          <a:fillRef idx="2">
-            <a:schemeClr val="accent2"/>
-          </a:fillRef>
-          <a:effectRef idx="1">
-            <a:schemeClr val="accent2"/>
-          </a:effectRef>
-          <a:fontRef idx="minor">
-            <a:schemeClr val="dk1"/>
-          </a:fontRef>
-        </p:style>
-      </p:cxnSp>
-      <p:sp>
-        <p:nvSpPr>
-          <p:cNvPr id="127" name="Rectangle 126"/>
-          <p:cNvSpPr/>
-          <p:nvPr/>
-        </p:nvSpPr>
-        <p:spPr>
-          <a:xfrm>
-            <a:off x="5413156" y="4376270"/>
-            <a:ext cx="229325" cy="160062"/>
-          </a:xfrm>
-          <a:prstGeom prst="rect">
-            <a:avLst/>
-          </a:prstGeom>
-          <a:solidFill>
-            <a:schemeClr val="accent3">
-              <a:lumMod val="20000"/>
-              <a:lumOff val="80000"/>
-              <a:alpha val="80000"/>
-            </a:schemeClr>
-          </a:solidFill>
-          <a:ln>
-            <a:noFill/>
-          </a:ln>
-          <a:effectLst>
-            <a:softEdge rad="31750"/>
-          </a:effectLst>
-        </p:spPr>
-        <p:style>
-          <a:lnRef idx="2">
-            <a:schemeClr val="accent1">
-              <a:shade val="50000"/>
-            </a:schemeClr>
-          </a:lnRef>
-          <a:fillRef idx="1">
-            <a:schemeClr val="accent1"/>
-          </a:fillRef>
-          <a:effectRef idx="0">
-            <a:schemeClr val="accent1"/>
-          </a:effectRef>
-          <a:fontRef idx="minor">
-            <a:schemeClr val="lt1"/>
-          </a:fontRef>
-        </p:style>
-        <p:txBody>
-          <a:bodyPr rtlCol="0" anchor="ctr"/>
-          <a:lstStyle/>
-          <a:p>
-            <a:pPr algn="ctr"/>
-            <a:endParaRPr lang="en-SG"/>
-          </a:p>
-        </p:txBody>
-      </p:sp>
-      <p:sp>
-        <p:nvSpPr>
-          <p:cNvPr id="128" name="Rectangle 127"/>
-          <p:cNvSpPr/>
-          <p:nvPr/>
-        </p:nvSpPr>
-        <p:spPr>
-          <a:xfrm>
-            <a:off x="5426134" y="5246050"/>
-            <a:ext cx="229325" cy="160062"/>
-          </a:xfrm>
-          <a:prstGeom prst="rect">
-            <a:avLst/>
-          </a:prstGeom>
-          <a:solidFill>
-            <a:schemeClr val="accent3">
-              <a:lumMod val="20000"/>
-              <a:lumOff val="80000"/>
-              <a:alpha val="80000"/>
-            </a:schemeClr>
-          </a:solidFill>
-          <a:ln>
-            <a:noFill/>
-          </a:ln>
-          <a:effectLst>
-            <a:softEdge rad="31750"/>
-          </a:effectLst>
-        </p:spPr>
-        <p:style>
-          <a:lnRef idx="2">
-            <a:schemeClr val="accent1">
-              <a:shade val="50000"/>
-            </a:schemeClr>
-          </a:lnRef>
-          <a:fillRef idx="1">
-            <a:schemeClr val="accent1"/>
-          </a:fillRef>
-          <a:effectRef idx="0">
-            <a:schemeClr val="accent1"/>
-          </a:effectRef>
-          <a:fontRef idx="minor">
-            <a:schemeClr val="lt1"/>
-          </a:fontRef>
-        </p:style>
-        <p:txBody>
-          <a:bodyPr rtlCol="0" anchor="ctr"/>
-          <a:lstStyle/>
-          <a:p>
-            <a:pPr algn="ctr"/>
-            <a:endParaRPr lang="en-SG"/>
-          </a:p>
-        </p:txBody>
-      </p:sp>
-      <p:sp>
-        <p:nvSpPr>
-          <p:cNvPr id="80" name="Freeform 79"/>
-          <p:cNvSpPr/>
-          <p:nvPr/>
-        </p:nvSpPr>
-        <p:spPr>
-          <a:xfrm>
-            <a:off x="3962919" y="5311300"/>
-            <a:ext cx="3733156" cy="119858"/>
-          </a:xfrm>
-          <a:custGeom>
-            <a:avLst/>
-            <a:gdLst>
-              <a:gd name="connsiteX0" fmla="*/ 0 w 3048000"/>
-              <a:gd name="connsiteY0" fmla="*/ 203200 h 203200"/>
-              <a:gd name="connsiteX1" fmla="*/ 221673 w 3048000"/>
-              <a:gd name="connsiteY1" fmla="*/ 0 h 203200"/>
-              <a:gd name="connsiteX2" fmla="*/ 3048000 w 3048000"/>
-              <a:gd name="connsiteY2" fmla="*/ 0 h 203200"/>
-            </a:gdLst>
-            <a:ahLst/>
-            <a:cxnLst>
-              <a:cxn ang="0">
-                <a:pos x="connsiteX0" y="connsiteY0"/>
-              </a:cxn>
-              <a:cxn ang="0">
-                <a:pos x="connsiteX1" y="connsiteY1"/>
-              </a:cxn>
-              <a:cxn ang="0">
-                <a:pos x="connsiteX2" y="connsiteY2"/>
-              </a:cxn>
-            </a:cxnLst>
-            <a:rect l="l" t="t" r="r" b="b"/>
-            <a:pathLst>
-              <a:path w="3048000" h="203200">
-                <a:moveTo>
-                  <a:pt x="0" y="203200"/>
-                </a:moveTo>
-                <a:lnTo>
-                  <a:pt x="221673" y="0"/>
-                </a:lnTo>
-                <a:lnTo>
-                  <a:pt x="3048000" y="0"/>
-                </a:lnTo>
-              </a:path>
-            </a:pathLst>
-          </a:custGeom>
-          <a:noFill/>
-          <a:ln w="19050">
-            <a:solidFill>
-              <a:schemeClr val="accent3"/>
-            </a:solidFill>
-            <a:prstDash val="sysDot"/>
-            <a:headEnd type="none" w="med" len="med"/>
-            <a:tailEnd type="arrow" w="med" len="med"/>
-          </a:ln>
-          <a:effectLst/>
-        </p:spPr>
-        <p:style>
-          <a:lnRef idx="1">
-            <a:schemeClr val="accent2"/>
-          </a:lnRef>
-          <a:fillRef idx="2">
-            <a:schemeClr val="accent2"/>
-          </a:fillRef>
-          <a:effectRef idx="1">
-            <a:schemeClr val="accent2"/>
-          </a:effectRef>
-          <a:fontRef idx="minor">
-            <a:schemeClr val="dk1"/>
-          </a:fontRef>
-        </p:style>
-        <p:txBody>
-          <a:bodyPr rtlCol="0" anchor="ctr"/>
-          <a:lstStyle/>
-          <a:p>
-            <a:pPr algn="ctr"/>
-            <a:endParaRPr lang="en-SG"/>
-          </a:p>
-        </p:txBody>
-      </p:sp>
-      <p:sp>
-        <p:nvSpPr>
-          <p:cNvPr id="79" name="Freeform 78"/>
-          <p:cNvSpPr/>
-          <p:nvPr/>
-        </p:nvSpPr>
-        <p:spPr>
-          <a:xfrm>
-            <a:off x="3529207" y="4463055"/>
-            <a:ext cx="4166868" cy="129438"/>
-          </a:xfrm>
-          <a:custGeom>
-            <a:avLst/>
-            <a:gdLst>
-              <a:gd name="connsiteX0" fmla="*/ 0 w 3048000"/>
-              <a:gd name="connsiteY0" fmla="*/ 203200 h 203200"/>
-              <a:gd name="connsiteX1" fmla="*/ 221673 w 3048000"/>
-              <a:gd name="connsiteY1" fmla="*/ 0 h 203200"/>
-              <a:gd name="connsiteX2" fmla="*/ 3048000 w 3048000"/>
-              <a:gd name="connsiteY2" fmla="*/ 0 h 203200"/>
-            </a:gdLst>
-            <a:ahLst/>
-            <a:cxnLst>
-              <a:cxn ang="0">
-                <a:pos x="connsiteX0" y="connsiteY0"/>
-              </a:cxn>
-              <a:cxn ang="0">
-                <a:pos x="connsiteX1" y="connsiteY1"/>
-              </a:cxn>
-              <a:cxn ang="0">
-                <a:pos x="connsiteX2" y="connsiteY2"/>
-              </a:cxn>
-            </a:cxnLst>
-            <a:rect l="l" t="t" r="r" b="b"/>
-            <a:pathLst>
-              <a:path w="3048000" h="203200">
-                <a:moveTo>
-                  <a:pt x="0" y="203200"/>
-                </a:moveTo>
-                <a:lnTo>
-                  <a:pt x="221673" y="0"/>
-                </a:lnTo>
-                <a:lnTo>
-                  <a:pt x="3048000" y="0"/>
-                </a:lnTo>
-              </a:path>
-            </a:pathLst>
-          </a:custGeom>
-          <a:noFill/>
-          <a:ln w="19050">
-            <a:solidFill>
-              <a:schemeClr val="accent3"/>
-            </a:solidFill>
-            <a:prstDash val="sysDot"/>
-            <a:headEnd type="none" w="med" len="med"/>
-            <a:tailEnd type="arrow" w="med" len="med"/>
-          </a:ln>
-          <a:effectLst/>
-        </p:spPr>
-        <p:style>
-          <a:lnRef idx="1">
-            <a:schemeClr val="accent2"/>
-          </a:lnRef>
-          <a:fillRef idx="2">
-            <a:schemeClr val="accent2"/>
-          </a:fillRef>
-          <a:effectRef idx="1">
-            <a:schemeClr val="accent2"/>
-          </a:effectRef>
-          <a:fontRef idx="minor">
-            <a:schemeClr val="dk1"/>
-          </a:fontRef>
-        </p:style>
-        <p:txBody>
-          <a:bodyPr rtlCol="0" anchor="ctr"/>
-          <a:lstStyle/>
-          <a:p>
-            <a:pPr algn="ctr"/>
-            <a:endParaRPr lang="en-SG"/>
-          </a:p>
-        </p:txBody>
-      </p:sp>
-      <p:sp>
-        <p:nvSpPr>
-          <p:cNvPr id="118" name="Freeform 117"/>
-          <p:cNvSpPr/>
-          <p:nvPr/>
-        </p:nvSpPr>
-        <p:spPr>
-          <a:xfrm>
-            <a:off x="3569821" y="3546077"/>
-            <a:ext cx="4126254" cy="149490"/>
-          </a:xfrm>
-          <a:custGeom>
-            <a:avLst/>
-            <a:gdLst>
-              <a:gd name="connsiteX0" fmla="*/ 0 w 3048000"/>
-              <a:gd name="connsiteY0" fmla="*/ 203200 h 203200"/>
-              <a:gd name="connsiteX1" fmla="*/ 221673 w 3048000"/>
-              <a:gd name="connsiteY1" fmla="*/ 0 h 203200"/>
-              <a:gd name="connsiteX2" fmla="*/ 3048000 w 3048000"/>
-              <a:gd name="connsiteY2" fmla="*/ 0 h 203200"/>
-            </a:gdLst>
-            <a:ahLst/>
-            <a:cxnLst>
-              <a:cxn ang="0">
-                <a:pos x="connsiteX0" y="connsiteY0"/>
-              </a:cxn>
-              <a:cxn ang="0">
-                <a:pos x="connsiteX1" y="connsiteY1"/>
-              </a:cxn>
-              <a:cxn ang="0">
-                <a:pos x="connsiteX2" y="connsiteY2"/>
-              </a:cxn>
-            </a:cxnLst>
-            <a:rect l="l" t="t" r="r" b="b"/>
-            <a:pathLst>
-              <a:path w="3048000" h="203200">
-                <a:moveTo>
-                  <a:pt x="0" y="203200"/>
-                </a:moveTo>
-                <a:lnTo>
-                  <a:pt x="221673" y="0"/>
-                </a:lnTo>
-                <a:lnTo>
-                  <a:pt x="3048000" y="0"/>
-                </a:lnTo>
-              </a:path>
-            </a:pathLst>
-          </a:custGeom>
-          <a:noFill/>
-          <a:ln w="19050">
-            <a:solidFill>
-              <a:schemeClr val="accent3"/>
-            </a:solidFill>
-            <a:prstDash val="sysDot"/>
-            <a:headEnd type="none" w="med" len="med"/>
-            <a:tailEnd type="arrow" w="med" len="med"/>
-          </a:ln>
-          <a:effectLst/>
-        </p:spPr>
-        <p:style>
-          <a:lnRef idx="1">
-            <a:schemeClr val="accent2"/>
-          </a:lnRef>
-          <a:fillRef idx="2">
-            <a:schemeClr val="accent2"/>
-          </a:fillRef>
-          <a:effectRef idx="1">
-            <a:schemeClr val="accent2"/>
-          </a:effectRef>
-          <a:fontRef idx="minor">
-            <a:schemeClr val="dk1"/>
-          </a:fontRef>
-        </p:style>
-        <p:txBody>
-          <a:bodyPr rtlCol="0" anchor="ctr"/>
-          <a:lstStyle/>
-          <a:p>
-            <a:pPr algn="ctr"/>
-            <a:endParaRPr lang="en-SG"/>
-          </a:p>
-        </p:txBody>
-      </p:sp>
-      <p:sp>
-        <p:nvSpPr>
-          <p:cNvPr id="129" name="Rectangle 62"/>
-          <p:cNvSpPr/>
-          <p:nvPr/>
-        </p:nvSpPr>
-        <p:spPr>
-          <a:xfrm>
-            <a:off x="6102699" y="1768391"/>
-            <a:ext cx="772043" cy="346760"/>
-          </a:xfrm>
-          <a:prstGeom prst="rect">
-            <a:avLst/>
-          </a:prstGeom>
-          <a:ln w="6350">
-            <a:solidFill>
-              <a:schemeClr val="accent3"/>
-            </a:solidFill>
-          </a:ln>
-          <a:effectLst/>
-        </p:spPr>
-        <p:style>
-          <a:lnRef idx="1">
-            <a:schemeClr val="accent3"/>
-          </a:lnRef>
-          <a:fillRef idx="2">
-            <a:schemeClr val="accent3"/>
-          </a:fillRef>
-          <a:effectRef idx="1">
-            <a:schemeClr val="accent3"/>
-          </a:effectRef>
-          <a:fontRef idx="minor">
-            <a:schemeClr val="dk1"/>
-          </a:fontRef>
-        </p:style>
-        <p:txBody>
-          <a:bodyPr rtlCol="0" anchor="ctr"/>
-          <a:lstStyle/>
-          <a:p>
-            <a:pPr algn="ctr"/>
-            <a:r>
-              <a:rPr lang="en-US" sz="1050" b="1" dirty="0">
-                <a:solidFill>
-                  <a:schemeClr val="accent3">
-                    <a:lumMod val="75000"/>
-                  </a:schemeClr>
-                </a:solidFill>
-              </a:rPr>
-              <a:t>{abstract}</a:t>
-            </a:r>
-            <a:br>
-              <a:rPr lang="en-US" sz="1050" b="1" dirty="0">
-                <a:solidFill>
-                  <a:schemeClr val="accent3">
-                    <a:lumMod val="75000"/>
-                  </a:schemeClr>
-                </a:solidFill>
-              </a:rPr>
-            </a:br>
-            <a:r>
-              <a:rPr lang="en-US" sz="1050" b="1" dirty="0" smtClean="0">
-                <a:solidFill>
-                  <a:schemeClr val="accent3">
-                    <a:lumMod val="75000"/>
-                  </a:schemeClr>
-                </a:solidFill>
-              </a:rPr>
-              <a:t>EntryCard</a:t>
-            </a:r>
-          </a:p>
-        </p:txBody>
-      </p:sp>
-      <p:sp>
-        <p:nvSpPr>
-          <p:cNvPr id="130" name="Isosceles Triangle 102"/>
-          <p:cNvSpPr/>
-          <p:nvPr/>
-        </p:nvSpPr>
-        <p:spPr>
-          <a:xfrm rot="10800000" flipV="1">
-            <a:off x="6353468" y="2117683"/>
-            <a:ext cx="270504" cy="175523"/>
-          </a:xfrm>
-          <a:prstGeom prst="triangle">
-            <a:avLst/>
-          </a:prstGeom>
-          <a:ln w="6350">
-            <a:solidFill>
-              <a:schemeClr val="accent3"/>
-            </a:solidFill>
-          </a:ln>
-          <a:effectLst/>
-        </p:spPr>
-        <p:style>
-          <a:lnRef idx="1">
-            <a:schemeClr val="accent3"/>
-          </a:lnRef>
-          <a:fillRef idx="2">
-            <a:schemeClr val="accent3"/>
-          </a:fillRef>
-          <a:effectRef idx="1">
-            <a:schemeClr val="accent3"/>
-          </a:effectRef>
-          <a:fontRef idx="minor">
-            <a:schemeClr val="dk1"/>
-          </a:fontRef>
-        </p:style>
-        <p:txBody>
-          <a:bodyPr rtlCol="0" anchor="ctr"/>
-          <a:lstStyle/>
-          <a:p>
-            <a:pPr algn="ctr"/>
-            <a:endParaRPr lang="en-SG" sz="1050" b="1">
-              <a:solidFill>
-                <a:srgbClr val="92D050"/>
-              </a:solidFill>
-            </a:endParaRPr>
-          </a:p>
-        </p:txBody>
-      </p:sp>
-      <p:sp>
-        <p:nvSpPr>
-          <p:cNvPr id="147" name="Rectangle 146"/>
-          <p:cNvSpPr/>
-          <p:nvPr/>
-        </p:nvSpPr>
-        <p:spPr>
-          <a:xfrm>
-            <a:off x="5415307" y="3808115"/>
-            <a:ext cx="229325" cy="160062"/>
-          </a:xfrm>
-          <a:prstGeom prst="rect">
-            <a:avLst/>
-          </a:prstGeom>
-          <a:solidFill>
-            <a:schemeClr val="accent3">
-              <a:lumMod val="20000"/>
-              <a:lumOff val="80000"/>
-              <a:alpha val="80000"/>
-            </a:schemeClr>
-          </a:solidFill>
-          <a:ln>
-            <a:noFill/>
-          </a:ln>
-          <a:effectLst>
-            <a:softEdge rad="31750"/>
-          </a:effectLst>
-        </p:spPr>
-        <p:style>
-          <a:lnRef idx="2">
-            <a:schemeClr val="accent1">
-              <a:shade val="50000"/>
-            </a:schemeClr>
-          </a:lnRef>
-          <a:fillRef idx="1">
-            <a:schemeClr val="accent1"/>
-          </a:fillRef>
-          <a:effectRef idx="0">
-            <a:schemeClr val="accent1"/>
-          </a:effectRef>
-          <a:fontRef idx="minor">
-            <a:schemeClr val="lt1"/>
-          </a:fontRef>
-        </p:style>
-        <p:txBody>
-          <a:bodyPr rtlCol="0" anchor="ctr"/>
-          <a:lstStyle/>
-          <a:p>
-            <a:pPr algn="ctr"/>
-            <a:endParaRPr lang="en-SG"/>
-          </a:p>
-        </p:txBody>
-      </p:sp>
-      <p:sp>
-        <p:nvSpPr>
-          <p:cNvPr id="148" name="Rectangle 147"/>
-          <p:cNvSpPr/>
-          <p:nvPr/>
-        </p:nvSpPr>
-        <p:spPr>
-          <a:xfrm>
-            <a:off x="5396841" y="4042546"/>
-            <a:ext cx="229325" cy="160062"/>
-          </a:xfrm>
-          <a:prstGeom prst="rect">
-            <a:avLst/>
-          </a:prstGeom>
-          <a:solidFill>
-            <a:schemeClr val="accent3">
-              <a:lumMod val="20000"/>
-              <a:lumOff val="80000"/>
-              <a:alpha val="80000"/>
-            </a:schemeClr>
-          </a:solidFill>
-          <a:ln>
-            <a:noFill/>
-          </a:ln>
-          <a:effectLst>
-            <a:softEdge rad="31750"/>
-          </a:effectLst>
-        </p:spPr>
-        <p:style>
-          <a:lnRef idx="2">
-            <a:schemeClr val="accent1">
-              <a:shade val="50000"/>
-            </a:schemeClr>
-          </a:lnRef>
-          <a:fillRef idx="1">
-            <a:schemeClr val="accent1"/>
-          </a:fillRef>
-          <a:effectRef idx="0">
-            <a:schemeClr val="accent1"/>
-          </a:effectRef>
-          <a:fontRef idx="minor">
-            <a:schemeClr val="lt1"/>
-          </a:fontRef>
-        </p:style>
-        <p:txBody>
-          <a:bodyPr rtlCol="0" anchor="ctr"/>
-          <a:lstStyle/>
-          <a:p>
-            <a:pPr algn="ctr"/>
-            <a:endParaRPr lang="en-SG"/>
-          </a:p>
-        </p:txBody>
-      </p:sp>
-      <p:cxnSp>
-        <p:nvCxnSpPr>
-          <p:cNvPr id="133" name="Elbow Connector 63"/>
-          <p:cNvCxnSpPr>
-            <a:stCxn id="130" idx="3"/>
-          </p:cNvCxnSpPr>
-          <p:nvPr/>
-        </p:nvCxnSpPr>
-        <p:spPr>
-          <a:xfrm rot="5400000">
-            <a:off x="4841986" y="2230572"/>
-            <a:ext cx="1584101" cy="1709368"/>
-          </a:xfrm>
-          <a:prstGeom prst="bentConnector2">
-            <a:avLst/>
-          </a:prstGeom>
-          <a:ln w="6350">
-            <a:solidFill>
-              <a:schemeClr val="accent3"/>
-            </a:solidFill>
-            <a:headEnd type="none" w="med" len="med"/>
-            <a:tailEnd type="none" w="med" len="med"/>
-          </a:ln>
-          <a:effectLst/>
-        </p:spPr>
-        <p:style>
-          <a:lnRef idx="1">
-            <a:schemeClr val="accent2"/>
-          </a:lnRef>
-          <a:fillRef idx="2">
-            <a:schemeClr val="accent2"/>
-          </a:fillRef>
-          <a:effectRef idx="1">
-            <a:schemeClr val="accent2"/>
-          </a:effectRef>
-          <a:fontRef idx="minor">
-            <a:schemeClr val="dk1"/>
-          </a:fontRef>
-        </p:style>
-      </p:cxnSp>
-      <p:cxnSp>
-        <p:nvCxnSpPr>
-          <p:cNvPr id="138" name="Elbow Connector 63"/>
-          <p:cNvCxnSpPr>
-            <a:stCxn id="130" idx="3"/>
-          </p:cNvCxnSpPr>
-          <p:nvPr/>
-        </p:nvCxnSpPr>
-        <p:spPr>
-          <a:xfrm rot="5400000">
-            <a:off x="4823820" y="2450756"/>
-            <a:ext cx="1822450" cy="1507350"/>
-          </a:xfrm>
-          <a:prstGeom prst="bentConnector3">
-            <a:avLst>
-              <a:gd name="adj1" fmla="val 99846"/>
-            </a:avLst>
-          </a:prstGeom>
-          <a:ln w="6350">
-            <a:solidFill>
-              <a:schemeClr val="accent3"/>
-            </a:solidFill>
-            <a:headEnd type="none" w="med" len="med"/>
-            <a:tailEnd type="none" w="med" len="med"/>
-          </a:ln>
-          <a:effectLst/>
-        </p:spPr>
-        <p:style>
-          <a:lnRef idx="1">
-            <a:schemeClr val="accent2"/>
-          </a:lnRef>
-          <a:fillRef idx="2">
-            <a:schemeClr val="accent2"/>
-          </a:fillRef>
-          <a:effectRef idx="1">
-            <a:schemeClr val="accent2"/>
-          </a:effectRef>
-          <a:fontRef idx="minor">
-            <a:schemeClr val="dk1"/>
-          </a:fontRef>
-        </p:style>
-      </p:cxnSp>
-      <p:sp>
-        <p:nvSpPr>
-          <p:cNvPr id="153" name="Rectangle 152"/>
-          <p:cNvSpPr/>
-          <p:nvPr/>
-        </p:nvSpPr>
-        <p:spPr>
-          <a:xfrm>
-            <a:off x="5421813" y="4691378"/>
-            <a:ext cx="229325" cy="160062"/>
-          </a:xfrm>
-          <a:prstGeom prst="rect">
-            <a:avLst/>
-          </a:prstGeom>
-          <a:solidFill>
-            <a:schemeClr val="accent3">
-              <a:lumMod val="20000"/>
-              <a:lumOff val="80000"/>
-              <a:alpha val="80000"/>
-            </a:schemeClr>
-          </a:solidFill>
-          <a:ln>
-            <a:noFill/>
-          </a:ln>
-          <a:effectLst>
-            <a:softEdge rad="31750"/>
-          </a:effectLst>
-        </p:spPr>
-        <p:style>
-          <a:lnRef idx="2">
-            <a:schemeClr val="accent1">
-              <a:shade val="50000"/>
-            </a:schemeClr>
-          </a:lnRef>
-          <a:fillRef idx="1">
-            <a:schemeClr val="accent1"/>
-          </a:fillRef>
-          <a:effectRef idx="0">
-            <a:schemeClr val="accent1"/>
-          </a:effectRef>
-          <a:fontRef idx="minor">
-            <a:schemeClr val="lt1"/>
-          </a:fontRef>
-        </p:style>
-        <p:txBody>
-          <a:bodyPr rtlCol="0" anchor="ctr"/>
-          <a:lstStyle/>
-          <a:p>
-            <a:pPr algn="ctr"/>
-            <a:endParaRPr lang="en-SG"/>
-          </a:p>
-        </p:txBody>
-      </p:sp>
-      <p:cxnSp>
-        <p:nvCxnSpPr>
-          <p:cNvPr id="149" name="Elbow Connector 63"/>
-          <p:cNvCxnSpPr>
-            <a:stCxn id="130" idx="3"/>
-          </p:cNvCxnSpPr>
-          <p:nvPr/>
-        </p:nvCxnSpPr>
-        <p:spPr>
-          <a:xfrm rot="5400000">
-            <a:off x="4507888" y="2769956"/>
-            <a:ext cx="2457582" cy="1504083"/>
-          </a:xfrm>
-          <a:prstGeom prst="bentConnector3">
-            <a:avLst>
-              <a:gd name="adj1" fmla="val 100433"/>
-            </a:avLst>
-          </a:prstGeom>
-          <a:ln w="6350">
-            <a:solidFill>
-              <a:schemeClr val="accent3"/>
-            </a:solidFill>
-            <a:headEnd type="none" w="med" len="med"/>
-            <a:tailEnd type="none" w="med" len="med"/>
-          </a:ln>
-          <a:effectLst/>
-        </p:spPr>
-        <p:style>
-          <a:lnRef idx="1">
-            <a:schemeClr val="accent2"/>
-          </a:lnRef>
-          <a:fillRef idx="2">
-            <a:schemeClr val="accent2"/>
-          </a:fillRef>
-          <a:effectRef idx="1">
-            <a:schemeClr val="accent2"/>
-          </a:effectRef>
-          <a:fontRef idx="minor">
-            <a:schemeClr val="dk1"/>
-          </a:fontRef>
-        </p:style>
-      </p:cxnSp>
-      <p:sp>
-        <p:nvSpPr>
-          <p:cNvPr id="158" name="Rectangle 157"/>
-          <p:cNvSpPr/>
-          <p:nvPr/>
-        </p:nvSpPr>
-        <p:spPr>
-          <a:xfrm>
-            <a:off x="5419193" y="4910273"/>
-            <a:ext cx="229325" cy="160062"/>
-          </a:xfrm>
-          <a:prstGeom prst="rect">
-            <a:avLst/>
-          </a:prstGeom>
-          <a:solidFill>
-            <a:schemeClr val="accent3">
-              <a:lumMod val="20000"/>
-              <a:lumOff val="80000"/>
-              <a:alpha val="80000"/>
-            </a:schemeClr>
-          </a:solidFill>
-          <a:ln>
-            <a:noFill/>
-          </a:ln>
-          <a:effectLst>
-            <a:softEdge rad="31750"/>
-          </a:effectLst>
-        </p:spPr>
-        <p:style>
-          <a:lnRef idx="2">
-            <a:schemeClr val="accent1">
-              <a:shade val="50000"/>
-            </a:schemeClr>
-          </a:lnRef>
-          <a:fillRef idx="1">
-            <a:schemeClr val="accent1"/>
-          </a:fillRef>
-          <a:effectRef idx="0">
-            <a:schemeClr val="accent1"/>
-          </a:effectRef>
-          <a:fontRef idx="minor">
-            <a:schemeClr val="lt1"/>
-          </a:fontRef>
-        </p:style>
-        <p:txBody>
-          <a:bodyPr rtlCol="0" anchor="ctr"/>
-          <a:lstStyle/>
-          <a:p>
-            <a:pPr algn="ctr"/>
-            <a:endParaRPr lang="en-SG"/>
-          </a:p>
-        </p:txBody>
-      </p:sp>
-      <p:cxnSp>
-        <p:nvCxnSpPr>
-          <p:cNvPr id="154" name="Elbow Connector 63"/>
-          <p:cNvCxnSpPr>
-            <a:stCxn id="130" idx="3"/>
-          </p:cNvCxnSpPr>
-          <p:nvPr/>
-        </p:nvCxnSpPr>
-        <p:spPr>
-          <a:xfrm rot="5400000">
-            <a:off x="4575465" y="3077047"/>
-            <a:ext cx="2697096" cy="1129415"/>
-          </a:xfrm>
-          <a:prstGeom prst="bentConnector3">
-            <a:avLst>
-              <a:gd name="adj1" fmla="val 100292"/>
-            </a:avLst>
-          </a:prstGeom>
-          <a:ln w="6350">
-            <a:solidFill>
-              <a:schemeClr val="accent3"/>
-            </a:solidFill>
-            <a:headEnd type="none" w="med" len="med"/>
-            <a:tailEnd type="none" w="med" len="med"/>
-          </a:ln>
-          <a:effectLst/>
-        </p:spPr>
-        <p:style>
-          <a:lnRef idx="1">
-            <a:schemeClr val="accent2"/>
-          </a:lnRef>
-          <a:fillRef idx="2">
-            <a:schemeClr val="accent2"/>
-          </a:fillRef>
-          <a:effectRef idx="1">
-            <a:schemeClr val="accent2"/>
-          </a:effectRef>
-          <a:fontRef idx="minor">
-            <a:schemeClr val="dk1"/>
-          </a:fontRef>
-        </p:style>
-      </p:cxnSp>
-      <p:sp>
-        <p:nvSpPr>
-          <p:cNvPr id="163" name="Rectangle 162"/>
-          <p:cNvSpPr/>
-          <p:nvPr/>
-        </p:nvSpPr>
-        <p:spPr>
-          <a:xfrm>
-            <a:off x="5416334" y="5497388"/>
-            <a:ext cx="229325" cy="160062"/>
-          </a:xfrm>
-          <a:prstGeom prst="rect">
-            <a:avLst/>
-          </a:prstGeom>
-          <a:solidFill>
-            <a:schemeClr val="accent3">
-              <a:lumMod val="20000"/>
-              <a:lumOff val="80000"/>
-              <a:alpha val="80000"/>
-            </a:schemeClr>
-          </a:solidFill>
-          <a:ln>
-            <a:noFill/>
-          </a:ln>
-          <a:effectLst>
-            <a:softEdge rad="31750"/>
-          </a:effectLst>
-        </p:spPr>
-        <p:style>
-          <a:lnRef idx="2">
-            <a:schemeClr val="accent1">
-              <a:shade val="50000"/>
-            </a:schemeClr>
-          </a:lnRef>
-          <a:fillRef idx="1">
-            <a:schemeClr val="accent1"/>
-          </a:fillRef>
-          <a:effectRef idx="0">
-            <a:schemeClr val="accent1"/>
-          </a:effectRef>
-          <a:fontRef idx="minor">
-            <a:schemeClr val="lt1"/>
-          </a:fontRef>
-        </p:style>
-        <p:txBody>
-          <a:bodyPr rtlCol="0" anchor="ctr"/>
-          <a:lstStyle/>
-          <a:p>
-            <a:pPr algn="ctr"/>
-            <a:endParaRPr lang="en-SG"/>
-          </a:p>
-        </p:txBody>
-      </p:sp>
-      <p:cxnSp>
-        <p:nvCxnSpPr>
-          <p:cNvPr id="159" name="Elbow Connector 63"/>
-          <p:cNvCxnSpPr>
-            <a:stCxn id="130" idx="3"/>
-          </p:cNvCxnSpPr>
-          <p:nvPr/>
-        </p:nvCxnSpPr>
-        <p:spPr>
-          <a:xfrm rot="5400000">
-            <a:off x="4199421" y="3285059"/>
-            <a:ext cx="3281153" cy="1297446"/>
-          </a:xfrm>
-          <a:prstGeom prst="bentConnector3">
-            <a:avLst>
-              <a:gd name="adj1" fmla="val 100189"/>
-            </a:avLst>
-          </a:prstGeom>
-          <a:ln w="6350">
-            <a:solidFill>
-              <a:schemeClr val="accent3"/>
-            </a:solidFill>
-            <a:headEnd type="none" w="med" len="med"/>
-            <a:tailEnd type="none" w="med" len="med"/>
-          </a:ln>
-          <a:effectLst/>
-        </p:spPr>
-        <p:style>
-          <a:lnRef idx="1">
-            <a:schemeClr val="accent2"/>
-          </a:lnRef>
-          <a:fillRef idx="2">
-            <a:schemeClr val="accent2"/>
-          </a:fillRef>
-          <a:effectRef idx="1">
-            <a:schemeClr val="accent2"/>
-          </a:effectRef>
-          <a:fontRef idx="minor">
-            <a:schemeClr val="dk1"/>
-          </a:fontRef>
-        </p:style>
-      </p:cxnSp>
     </p:spTree>
     <p:extLst>
       <p:ext uri="{BB962C8B-B14F-4D97-AF65-F5344CB8AC3E}">

</xml_diff>